<commit_message>
rearange slides acording to the stack
</commit_message>
<xml_diff>
--- a/SWADN Framework.pptx
+++ b/SWADN Framework.pptx
@@ -10,12 +10,12 @@
     <p:sldId id="272" r:id="rId4"/>
     <p:sldId id="268" r:id="rId5"/>
     <p:sldId id="266" r:id="rId6"/>
-    <p:sldId id="270" r:id="rId7"/>
-    <p:sldId id="263" r:id="rId8"/>
-    <p:sldId id="267" r:id="rId9"/>
-    <p:sldId id="260" r:id="rId10"/>
-    <p:sldId id="269" r:id="rId11"/>
-    <p:sldId id="261" r:id="rId12"/>
+    <p:sldId id="267" r:id="rId7"/>
+    <p:sldId id="260" r:id="rId8"/>
+    <p:sldId id="269" r:id="rId9"/>
+    <p:sldId id="261" r:id="rId10"/>
+    <p:sldId id="270" r:id="rId11"/>
+    <p:sldId id="263" r:id="rId12"/>
   </p:sldIdLst>
   <p:sldSz cx="12192000" cy="6858000"/>
   <p:notesSz cx="6858000" cy="9144000"/>
@@ -4645,445 +4645,6 @@
 <file path=ppt/diagrams/data2.xml><?xml version="1.0" encoding="utf-8"?>
 <dgm:dataModel xmlns:dgm="http://schemas.openxmlformats.org/drawingml/2006/diagram" xmlns:a="http://schemas.openxmlformats.org/drawingml/2006/main">
   <dgm:ptLst>
-    <dgm:pt modelId="{0537ED38-BF0B-4C88-A626-06380C7B4D72}" type="doc">
-      <dgm:prSet loTypeId="urn:microsoft.com/office/officeart/2018/2/layout/IconVerticalSolidList" loCatId="icon" qsTypeId="urn:microsoft.com/office/officeart/2005/8/quickstyle/simple4" qsCatId="simple" csTypeId="urn:microsoft.com/office/officeart/2018/5/colors/Iconchunking_neutralbg_colorful1" csCatId="colorful" phldr="1"/>
-      <dgm:spPr/>
-      <dgm:t>
-        <a:bodyPr/>
-        <a:lstStyle/>
-        <a:p>
-          <a:endParaRPr lang="en-US"/>
-        </a:p>
-      </dgm:t>
-    </dgm:pt>
-    <dgm:pt modelId="{36C422CE-A3FF-42E8-98F6-BB644EA7EDC1}">
-      <dgm:prSet/>
-      <dgm:spPr/>
-      <dgm:t>
-        <a:bodyPr/>
-        <a:lstStyle/>
-        <a:p>
-          <a:pPr>
-            <a:lnSpc>
-              <a:spcPct val="100000"/>
-            </a:lnSpc>
-          </a:pPr>
-          <a:r>
-            <a:rPr lang="en-US" dirty="0"/>
-            <a:t>Clean and explicit separation by logic domain</a:t>
-          </a:r>
-        </a:p>
-      </dgm:t>
-    </dgm:pt>
-    <dgm:pt modelId="{1517786E-16A3-4544-9F95-4B79B9124EAA}" type="parTrans" cxnId="{4A33D000-55AA-40AC-A878-82982577BD3B}">
-      <dgm:prSet/>
-      <dgm:spPr/>
-      <dgm:t>
-        <a:bodyPr/>
-        <a:lstStyle/>
-        <a:p>
-          <a:endParaRPr lang="en-US"/>
-        </a:p>
-      </dgm:t>
-    </dgm:pt>
-    <dgm:pt modelId="{7F0B5881-6EE3-4DDC-B856-14C2A6B7FBA3}" type="sibTrans" cxnId="{4A33D000-55AA-40AC-A878-82982577BD3B}">
-      <dgm:prSet/>
-      <dgm:spPr/>
-      <dgm:t>
-        <a:bodyPr/>
-        <a:lstStyle/>
-        <a:p>
-          <a:endParaRPr lang="en-US"/>
-        </a:p>
-      </dgm:t>
-    </dgm:pt>
-    <dgm:pt modelId="{25B3FC53-A852-4DDA-B5F6-D60167C5BFF5}">
-      <dgm:prSet/>
-      <dgm:spPr/>
-      <dgm:t>
-        <a:bodyPr/>
-        <a:lstStyle/>
-        <a:p>
-          <a:pPr>
-            <a:lnSpc>
-              <a:spcPct val="100000"/>
-            </a:lnSpc>
-          </a:pPr>
-          <a:r>
-            <a:rPr lang="pt-PT" b="0" i="0" dirty="0" err="1"/>
-            <a:t>Maintainability</a:t>
-          </a:r>
-          <a:endParaRPr lang="en-US" dirty="0"/>
-        </a:p>
-      </dgm:t>
-    </dgm:pt>
-    <dgm:pt modelId="{E67FF253-FBCF-45C2-AA87-714B537DACC4}" type="parTrans" cxnId="{9FD93808-12A3-495C-A0AB-107C34F3C7FE}">
-      <dgm:prSet/>
-      <dgm:spPr/>
-      <dgm:t>
-        <a:bodyPr/>
-        <a:lstStyle/>
-        <a:p>
-          <a:endParaRPr lang="en-US"/>
-        </a:p>
-      </dgm:t>
-    </dgm:pt>
-    <dgm:pt modelId="{6F82FF2B-BFA0-46FE-8B6F-FDFDF663B64F}" type="sibTrans" cxnId="{9FD93808-12A3-495C-A0AB-107C34F3C7FE}">
-      <dgm:prSet/>
-      <dgm:spPr/>
-      <dgm:t>
-        <a:bodyPr/>
-        <a:lstStyle/>
-        <a:p>
-          <a:endParaRPr lang="en-US"/>
-        </a:p>
-      </dgm:t>
-    </dgm:pt>
-    <dgm:pt modelId="{87978358-7B40-4E17-A440-347DECB50227}">
-      <dgm:prSet/>
-      <dgm:spPr/>
-      <dgm:t>
-        <a:bodyPr/>
-        <a:lstStyle/>
-        <a:p>
-          <a:pPr>
-            <a:lnSpc>
-              <a:spcPct val="100000"/>
-            </a:lnSpc>
-          </a:pPr>
-          <a:r>
-            <a:rPr lang="en-US" dirty="0"/>
-            <a:t>Documentation</a:t>
-          </a:r>
-        </a:p>
-      </dgm:t>
-    </dgm:pt>
-    <dgm:pt modelId="{8CE10EC8-4F8E-4013-A424-A5DA2F5526CD}" type="parTrans" cxnId="{433C51E6-BAB6-42C5-A302-9918F7819D64}">
-      <dgm:prSet/>
-      <dgm:spPr/>
-      <dgm:t>
-        <a:bodyPr/>
-        <a:lstStyle/>
-        <a:p>
-          <a:endParaRPr lang="en-US"/>
-        </a:p>
-      </dgm:t>
-    </dgm:pt>
-    <dgm:pt modelId="{D04CF680-8CCE-4B5E-8E88-DF49BD5D876B}" type="sibTrans" cxnId="{433C51E6-BAB6-42C5-A302-9918F7819D64}">
-      <dgm:prSet/>
-      <dgm:spPr/>
-      <dgm:t>
-        <a:bodyPr/>
-        <a:lstStyle/>
-        <a:p>
-          <a:endParaRPr lang="en-US"/>
-        </a:p>
-      </dgm:t>
-    </dgm:pt>
-    <dgm:pt modelId="{46C5E9F8-1751-4E89-84C5-C927704D3662}">
-      <dgm:prSet/>
-      <dgm:spPr/>
-      <dgm:t>
-        <a:bodyPr/>
-        <a:lstStyle/>
-        <a:p>
-          <a:pPr>
-            <a:lnSpc>
-              <a:spcPct val="100000"/>
-            </a:lnSpc>
-          </a:pPr>
-          <a:r>
-            <a:rPr lang="en-US" dirty="0"/>
-            <a:t>Readability</a:t>
-          </a:r>
-        </a:p>
-      </dgm:t>
-    </dgm:pt>
-    <dgm:pt modelId="{7FD005D0-DAC0-4FE4-AAF4-88DA739B99CC}" type="parTrans" cxnId="{7A14D9C4-234F-438E-9F72-F84DCD363CE9}">
-      <dgm:prSet/>
-      <dgm:spPr/>
-      <dgm:t>
-        <a:bodyPr/>
-        <a:lstStyle/>
-        <a:p>
-          <a:endParaRPr lang="pt-PT"/>
-        </a:p>
-      </dgm:t>
-    </dgm:pt>
-    <dgm:pt modelId="{95AE2CF7-EA0F-4BE3-BABA-C9BAC7251983}" type="sibTrans" cxnId="{7A14D9C4-234F-438E-9F72-F84DCD363CE9}">
-      <dgm:prSet/>
-      <dgm:spPr/>
-      <dgm:t>
-        <a:bodyPr/>
-        <a:lstStyle/>
-        <a:p>
-          <a:endParaRPr lang="pt-PT"/>
-        </a:p>
-      </dgm:t>
-    </dgm:pt>
-    <dgm:pt modelId="{1BC2D588-E430-4B3D-9F6F-8509AE218E15}" type="pres">
-      <dgm:prSet presAssocID="{0537ED38-BF0B-4C88-A626-06380C7B4D72}" presName="root" presStyleCnt="0">
-        <dgm:presLayoutVars>
-          <dgm:dir/>
-          <dgm:resizeHandles val="exact"/>
-        </dgm:presLayoutVars>
-      </dgm:prSet>
-      <dgm:spPr/>
-    </dgm:pt>
-    <dgm:pt modelId="{30E8552C-807E-4439-894C-9DFFF892AF69}" type="pres">
-      <dgm:prSet presAssocID="{36C422CE-A3FF-42E8-98F6-BB644EA7EDC1}" presName="compNode" presStyleCnt="0"/>
-      <dgm:spPr/>
-    </dgm:pt>
-    <dgm:pt modelId="{94375141-FD9C-47EE-89E7-B3B227B4FDA8}" type="pres">
-      <dgm:prSet presAssocID="{36C422CE-A3FF-42E8-98F6-BB644EA7EDC1}" presName="bgRect" presStyleLbl="bgShp" presStyleIdx="0" presStyleCnt="4"/>
-      <dgm:spPr/>
-    </dgm:pt>
-    <dgm:pt modelId="{D38CFDF5-935C-4794-936A-787015FD5A74}" type="pres">
-      <dgm:prSet presAssocID="{36C422CE-A3FF-42E8-98F6-BB644EA7EDC1}" presName="iconRect" presStyleLbl="node1" presStyleIdx="0" presStyleCnt="4"/>
-      <dgm:spPr>
-        <a:blipFill>
-          <a:blip xmlns:r="http://schemas.openxmlformats.org/officeDocument/2006/relationships" r:embed="rId1">
-            <a:extLst>
-              <a:ext uri="{28A0092B-C50C-407E-A947-70E740481C1C}">
-                <a14:useLocalDpi xmlns:a14="http://schemas.microsoft.com/office/drawing/2010/main" val="0"/>
-              </a:ext>
-              <a:ext uri="{96DAC541-7B7A-43D3-8B79-37D633B846F1}">
-                <asvg:svgBlip xmlns:asvg="http://schemas.microsoft.com/office/drawing/2016/SVG/main" r:embed="rId2"/>
-              </a:ext>
-            </a:extLst>
-          </a:blip>
-          <a:stretch>
-            <a:fillRect/>
-          </a:stretch>
-        </a:blipFill>
-        <a:ln>
-          <a:noFill/>
-        </a:ln>
-      </dgm:spPr>
-      <dgm:extLst>
-        <a:ext uri="{E40237B7-FDA0-4F09-8148-C483321AD2D9}">
-          <dgm14:cNvPr xmlns:dgm14="http://schemas.microsoft.com/office/drawing/2010/diagram" id="0" name="" descr="Checkmark"/>
-        </a:ext>
-      </dgm:extLst>
-    </dgm:pt>
-    <dgm:pt modelId="{B682A316-1E9A-4BA2-84FF-B8937C703A2E}" type="pres">
-      <dgm:prSet presAssocID="{36C422CE-A3FF-42E8-98F6-BB644EA7EDC1}" presName="spaceRect" presStyleCnt="0"/>
-      <dgm:spPr/>
-    </dgm:pt>
-    <dgm:pt modelId="{831750D4-AA00-4C10-8AB0-5DABCFF07204}" type="pres">
-      <dgm:prSet presAssocID="{36C422CE-A3FF-42E8-98F6-BB644EA7EDC1}" presName="parTx" presStyleLbl="revTx" presStyleIdx="0" presStyleCnt="4">
-        <dgm:presLayoutVars>
-          <dgm:chMax val="0"/>
-          <dgm:chPref val="0"/>
-        </dgm:presLayoutVars>
-      </dgm:prSet>
-      <dgm:spPr/>
-    </dgm:pt>
-    <dgm:pt modelId="{F4CAC8F4-4DB9-4776-A8F5-6C1C3732EA94}" type="pres">
-      <dgm:prSet presAssocID="{7F0B5881-6EE3-4DDC-B856-14C2A6B7FBA3}" presName="sibTrans" presStyleCnt="0"/>
-      <dgm:spPr/>
-    </dgm:pt>
-    <dgm:pt modelId="{46C423EF-DEC6-4E94-8AC2-52C2849C7A50}" type="pres">
-      <dgm:prSet presAssocID="{25B3FC53-A852-4DDA-B5F6-D60167C5BFF5}" presName="compNode" presStyleCnt="0"/>
-      <dgm:spPr/>
-    </dgm:pt>
-    <dgm:pt modelId="{EC6DFE2B-B099-4B46-9B21-2E631AB300B9}" type="pres">
-      <dgm:prSet presAssocID="{25B3FC53-A852-4DDA-B5F6-D60167C5BFF5}" presName="bgRect" presStyleLbl="bgShp" presStyleIdx="1" presStyleCnt="4"/>
-      <dgm:spPr/>
-    </dgm:pt>
-    <dgm:pt modelId="{49E7B3DA-7564-4DCD-8FC9-EFA12F4E3BC6}" type="pres">
-      <dgm:prSet presAssocID="{25B3FC53-A852-4DDA-B5F6-D60167C5BFF5}" presName="iconRect" presStyleLbl="node1" presStyleIdx="1" presStyleCnt="4"/>
-      <dgm:spPr>
-        <a:blipFill rotWithShape="1">
-          <a:blip xmlns:r="http://schemas.openxmlformats.org/officeDocument/2006/relationships" r:embed="rId3">
-            <a:extLst>
-              <a:ext uri="{28A0092B-C50C-407E-A947-70E740481C1C}">
-                <a14:useLocalDpi xmlns:a14="http://schemas.microsoft.com/office/drawing/2010/main" val="0"/>
-              </a:ext>
-              <a:ext uri="{96DAC541-7B7A-43D3-8B79-37D633B846F1}">
-                <asvg:svgBlip xmlns:asvg="http://schemas.microsoft.com/office/drawing/2016/SVG/main" r:embed="rId4"/>
-              </a:ext>
-            </a:extLst>
-          </a:blip>
-          <a:srcRect/>
-          <a:stretch>
-            <a:fillRect/>
-          </a:stretch>
-        </a:blipFill>
-        <a:ln>
-          <a:noFill/>
-        </a:ln>
-      </dgm:spPr>
-      <dgm:extLst>
-        <a:ext uri="{E40237B7-FDA0-4F09-8148-C483321AD2D9}">
-          <dgm14:cNvPr xmlns:dgm14="http://schemas.microsoft.com/office/drawing/2010/diagram" id="0" name="" descr="Line Arrow: Counterclockwise curve"/>
-        </a:ext>
-      </dgm:extLst>
-    </dgm:pt>
-    <dgm:pt modelId="{ADB07B59-46BB-4A50-A3A1-D0216CE1D5CE}" type="pres">
-      <dgm:prSet presAssocID="{25B3FC53-A852-4DDA-B5F6-D60167C5BFF5}" presName="spaceRect" presStyleCnt="0"/>
-      <dgm:spPr/>
-    </dgm:pt>
-    <dgm:pt modelId="{0BDEAD8D-7BEF-49ED-9637-521216F75506}" type="pres">
-      <dgm:prSet presAssocID="{25B3FC53-A852-4DDA-B5F6-D60167C5BFF5}" presName="parTx" presStyleLbl="revTx" presStyleIdx="1" presStyleCnt="4">
-        <dgm:presLayoutVars>
-          <dgm:chMax val="0"/>
-          <dgm:chPref val="0"/>
-        </dgm:presLayoutVars>
-      </dgm:prSet>
-      <dgm:spPr/>
-    </dgm:pt>
-    <dgm:pt modelId="{AB2F5363-5CFA-474E-9425-E3F9E20A0BC5}" type="pres">
-      <dgm:prSet presAssocID="{6F82FF2B-BFA0-46FE-8B6F-FDFDF663B64F}" presName="sibTrans" presStyleCnt="0"/>
-      <dgm:spPr/>
-    </dgm:pt>
-    <dgm:pt modelId="{BAF69DC0-FC5D-404C-B02A-5B5A45DFB835}" type="pres">
-      <dgm:prSet presAssocID="{46C5E9F8-1751-4E89-84C5-C927704D3662}" presName="compNode" presStyleCnt="0"/>
-      <dgm:spPr/>
-    </dgm:pt>
-    <dgm:pt modelId="{8E7A460B-78D8-40DA-ACC0-6FCDF6FD9036}" type="pres">
-      <dgm:prSet presAssocID="{46C5E9F8-1751-4E89-84C5-C927704D3662}" presName="bgRect" presStyleLbl="bgShp" presStyleIdx="2" presStyleCnt="4"/>
-      <dgm:spPr/>
-    </dgm:pt>
-    <dgm:pt modelId="{7E4FE248-CFB2-4C36-9660-D18262759B8E}" type="pres">
-      <dgm:prSet presAssocID="{46C5E9F8-1751-4E89-84C5-C927704D3662}" presName="iconRect" presStyleLbl="node1" presStyleIdx="2" presStyleCnt="4"/>
-      <dgm:spPr>
-        <a:blipFill>
-          <a:blip xmlns:r="http://schemas.openxmlformats.org/officeDocument/2006/relationships" r:embed="rId5">
-            <a:extLst>
-              <a:ext uri="{28A0092B-C50C-407E-A947-70E740481C1C}">
-                <a14:useLocalDpi xmlns:a14="http://schemas.microsoft.com/office/drawing/2010/main" val="0"/>
-              </a:ext>
-              <a:ext uri="{96DAC541-7B7A-43D3-8B79-37D633B846F1}">
-                <asvg:svgBlip xmlns:asvg="http://schemas.microsoft.com/office/drawing/2016/SVG/main" r:embed="rId6"/>
-              </a:ext>
-            </a:extLst>
-          </a:blip>
-          <a:stretch>
-            <a:fillRect/>
-          </a:stretch>
-        </a:blipFill>
-      </dgm:spPr>
-      <dgm:extLst>
-        <a:ext uri="{E40237B7-FDA0-4F09-8148-C483321AD2D9}">
-          <dgm14:cNvPr xmlns:dgm14="http://schemas.microsoft.com/office/drawing/2010/diagram" id="0" name="" descr="Line Arrow: Counterclockwise curve"/>
-        </a:ext>
-      </dgm:extLst>
-    </dgm:pt>
-    <dgm:pt modelId="{38975F87-99DB-4133-AE26-AAD03F4CECEE}" type="pres">
-      <dgm:prSet presAssocID="{46C5E9F8-1751-4E89-84C5-C927704D3662}" presName="spaceRect" presStyleCnt="0"/>
-      <dgm:spPr/>
-    </dgm:pt>
-    <dgm:pt modelId="{6AE62410-7894-4DE2-9BA2-B6263B76BEFB}" type="pres">
-      <dgm:prSet presAssocID="{46C5E9F8-1751-4E89-84C5-C927704D3662}" presName="parTx" presStyleLbl="revTx" presStyleIdx="2" presStyleCnt="4">
-        <dgm:presLayoutVars>
-          <dgm:chMax val="0"/>
-          <dgm:chPref val="0"/>
-        </dgm:presLayoutVars>
-      </dgm:prSet>
-      <dgm:spPr/>
-    </dgm:pt>
-    <dgm:pt modelId="{B937CF75-1184-46FB-B52E-C170ACCEE588}" type="pres">
-      <dgm:prSet presAssocID="{95AE2CF7-EA0F-4BE3-BABA-C9BAC7251983}" presName="sibTrans" presStyleCnt="0"/>
-      <dgm:spPr/>
-    </dgm:pt>
-    <dgm:pt modelId="{C10C9FBF-D895-4AE7-889C-20FFE56943F8}" type="pres">
-      <dgm:prSet presAssocID="{87978358-7B40-4E17-A440-347DECB50227}" presName="compNode" presStyleCnt="0"/>
-      <dgm:spPr/>
-    </dgm:pt>
-    <dgm:pt modelId="{0BDC2E0F-EA77-4DA1-92E4-3350AE966979}" type="pres">
-      <dgm:prSet presAssocID="{87978358-7B40-4E17-A440-347DECB50227}" presName="bgRect" presStyleLbl="bgShp" presStyleIdx="3" presStyleCnt="4"/>
-      <dgm:spPr/>
-    </dgm:pt>
-    <dgm:pt modelId="{FD57B1ED-3F16-4CDC-8738-F7E34E2E7382}" type="pres">
-      <dgm:prSet presAssocID="{87978358-7B40-4E17-A440-347DECB50227}" presName="iconRect" presStyleLbl="node1" presStyleIdx="3" presStyleCnt="4"/>
-      <dgm:spPr>
-        <a:blipFill>
-          <a:blip xmlns:r="http://schemas.openxmlformats.org/officeDocument/2006/relationships" r:embed="rId7">
-            <a:extLst>
-              <a:ext uri="{28A0092B-C50C-407E-A947-70E740481C1C}">
-                <a14:useLocalDpi xmlns:a14="http://schemas.microsoft.com/office/drawing/2010/main" val="0"/>
-              </a:ext>
-              <a:ext uri="{96DAC541-7B7A-43D3-8B79-37D633B846F1}">
-                <asvg:svgBlip xmlns:asvg="http://schemas.microsoft.com/office/drawing/2016/SVG/main" r:embed="rId8"/>
-              </a:ext>
-            </a:extLst>
-          </a:blip>
-          <a:stretch>
-            <a:fillRect/>
-          </a:stretch>
-        </a:blipFill>
-        <a:ln>
-          <a:noFill/>
-        </a:ln>
-      </dgm:spPr>
-      <dgm:extLst>
-        <a:ext uri="{E40237B7-FDA0-4F09-8148-C483321AD2D9}">
-          <dgm14:cNvPr xmlns:dgm14="http://schemas.microsoft.com/office/drawing/2010/diagram" id="0" name="" descr="Document"/>
-        </a:ext>
-      </dgm:extLst>
-    </dgm:pt>
-    <dgm:pt modelId="{8116C6D3-41E0-4B4F-9C6C-E9599A964D1E}" type="pres">
-      <dgm:prSet presAssocID="{87978358-7B40-4E17-A440-347DECB50227}" presName="spaceRect" presStyleCnt="0"/>
-      <dgm:spPr/>
-    </dgm:pt>
-    <dgm:pt modelId="{482659B5-27F9-44F9-B6BD-C28D2A144D04}" type="pres">
-      <dgm:prSet presAssocID="{87978358-7B40-4E17-A440-347DECB50227}" presName="parTx" presStyleLbl="revTx" presStyleIdx="3" presStyleCnt="4">
-        <dgm:presLayoutVars>
-          <dgm:chMax val="0"/>
-          <dgm:chPref val="0"/>
-        </dgm:presLayoutVars>
-      </dgm:prSet>
-      <dgm:spPr/>
-    </dgm:pt>
-  </dgm:ptLst>
-  <dgm:cxnLst>
-    <dgm:cxn modelId="{4A33D000-55AA-40AC-A878-82982577BD3B}" srcId="{0537ED38-BF0B-4C88-A626-06380C7B4D72}" destId="{36C422CE-A3FF-42E8-98F6-BB644EA7EDC1}" srcOrd="0" destOrd="0" parTransId="{1517786E-16A3-4544-9F95-4B79B9124EAA}" sibTransId="{7F0B5881-6EE3-4DDC-B856-14C2A6B7FBA3}"/>
-    <dgm:cxn modelId="{9FD93808-12A3-495C-A0AB-107C34F3C7FE}" srcId="{0537ED38-BF0B-4C88-A626-06380C7B4D72}" destId="{25B3FC53-A852-4DDA-B5F6-D60167C5BFF5}" srcOrd="1" destOrd="0" parTransId="{E67FF253-FBCF-45C2-AA87-714B537DACC4}" sibTransId="{6F82FF2B-BFA0-46FE-8B6F-FDFDF663B64F}"/>
-    <dgm:cxn modelId="{B39EE01A-3A38-4364-8AA7-29E6AB13D8E6}" type="presOf" srcId="{25B3FC53-A852-4DDA-B5F6-D60167C5BFF5}" destId="{0BDEAD8D-7BEF-49ED-9637-521216F75506}" srcOrd="0" destOrd="0" presId="urn:microsoft.com/office/officeart/2018/2/layout/IconVerticalSolidList"/>
-    <dgm:cxn modelId="{64913872-DC37-4D64-84E3-A6CB19F673AA}" type="presOf" srcId="{87978358-7B40-4E17-A440-347DECB50227}" destId="{482659B5-27F9-44F9-B6BD-C28D2A144D04}" srcOrd="0" destOrd="0" presId="urn:microsoft.com/office/officeart/2018/2/layout/IconVerticalSolidList"/>
-    <dgm:cxn modelId="{2B55F4B8-DC80-4102-8055-07833117649D}" type="presOf" srcId="{46C5E9F8-1751-4E89-84C5-C927704D3662}" destId="{6AE62410-7894-4DE2-9BA2-B6263B76BEFB}" srcOrd="0" destOrd="0" presId="urn:microsoft.com/office/officeart/2018/2/layout/IconVerticalSolidList"/>
-    <dgm:cxn modelId="{7A14D9C4-234F-438E-9F72-F84DCD363CE9}" srcId="{0537ED38-BF0B-4C88-A626-06380C7B4D72}" destId="{46C5E9F8-1751-4E89-84C5-C927704D3662}" srcOrd="2" destOrd="0" parTransId="{7FD005D0-DAC0-4FE4-AAF4-88DA739B99CC}" sibTransId="{95AE2CF7-EA0F-4BE3-BABA-C9BAC7251983}"/>
-    <dgm:cxn modelId="{433C51E6-BAB6-42C5-A302-9918F7819D64}" srcId="{0537ED38-BF0B-4C88-A626-06380C7B4D72}" destId="{87978358-7B40-4E17-A440-347DECB50227}" srcOrd="3" destOrd="0" parTransId="{8CE10EC8-4F8E-4013-A424-A5DA2F5526CD}" sibTransId="{D04CF680-8CCE-4B5E-8E88-DF49BD5D876B}"/>
-    <dgm:cxn modelId="{40B096F8-1B14-426F-B562-52C9361C8458}" type="presOf" srcId="{0537ED38-BF0B-4C88-A626-06380C7B4D72}" destId="{1BC2D588-E430-4B3D-9F6F-8509AE218E15}" srcOrd="0" destOrd="0" presId="urn:microsoft.com/office/officeart/2018/2/layout/IconVerticalSolidList"/>
-    <dgm:cxn modelId="{9F28CAFB-E623-43B0-9701-A5FF078B3FCE}" type="presOf" srcId="{36C422CE-A3FF-42E8-98F6-BB644EA7EDC1}" destId="{831750D4-AA00-4C10-8AB0-5DABCFF07204}" srcOrd="0" destOrd="0" presId="urn:microsoft.com/office/officeart/2018/2/layout/IconVerticalSolidList"/>
-    <dgm:cxn modelId="{EC68153F-D7A6-4EC0-AFB5-07EB4A0553D4}" type="presParOf" srcId="{1BC2D588-E430-4B3D-9F6F-8509AE218E15}" destId="{30E8552C-807E-4439-894C-9DFFF892AF69}" srcOrd="0" destOrd="0" presId="urn:microsoft.com/office/officeart/2018/2/layout/IconVerticalSolidList"/>
-    <dgm:cxn modelId="{FE9882E4-3305-4E1D-9B30-43388B5D89A4}" type="presParOf" srcId="{30E8552C-807E-4439-894C-9DFFF892AF69}" destId="{94375141-FD9C-47EE-89E7-B3B227B4FDA8}" srcOrd="0" destOrd="0" presId="urn:microsoft.com/office/officeart/2018/2/layout/IconVerticalSolidList"/>
-    <dgm:cxn modelId="{652616AE-1624-4164-A6F3-8507BE81662D}" type="presParOf" srcId="{30E8552C-807E-4439-894C-9DFFF892AF69}" destId="{D38CFDF5-935C-4794-936A-787015FD5A74}" srcOrd="1" destOrd="0" presId="urn:microsoft.com/office/officeart/2018/2/layout/IconVerticalSolidList"/>
-    <dgm:cxn modelId="{C58D4297-7C15-4EAC-8832-39FD8CCB7523}" type="presParOf" srcId="{30E8552C-807E-4439-894C-9DFFF892AF69}" destId="{B682A316-1E9A-4BA2-84FF-B8937C703A2E}" srcOrd="2" destOrd="0" presId="urn:microsoft.com/office/officeart/2018/2/layout/IconVerticalSolidList"/>
-    <dgm:cxn modelId="{0823AB1C-A7D6-410C-9230-74A47204FD19}" type="presParOf" srcId="{30E8552C-807E-4439-894C-9DFFF892AF69}" destId="{831750D4-AA00-4C10-8AB0-5DABCFF07204}" srcOrd="3" destOrd="0" presId="urn:microsoft.com/office/officeart/2018/2/layout/IconVerticalSolidList"/>
-    <dgm:cxn modelId="{0C192797-FF1C-496C-AA91-EAD82FE3B3F7}" type="presParOf" srcId="{1BC2D588-E430-4B3D-9F6F-8509AE218E15}" destId="{F4CAC8F4-4DB9-4776-A8F5-6C1C3732EA94}" srcOrd="1" destOrd="0" presId="urn:microsoft.com/office/officeart/2018/2/layout/IconVerticalSolidList"/>
-    <dgm:cxn modelId="{5585DB82-FA80-43ED-A515-CB23FE446876}" type="presParOf" srcId="{1BC2D588-E430-4B3D-9F6F-8509AE218E15}" destId="{46C423EF-DEC6-4E94-8AC2-52C2849C7A50}" srcOrd="2" destOrd="0" presId="urn:microsoft.com/office/officeart/2018/2/layout/IconVerticalSolidList"/>
-    <dgm:cxn modelId="{E0D73574-4B95-4902-9283-3689A55F9331}" type="presParOf" srcId="{46C423EF-DEC6-4E94-8AC2-52C2849C7A50}" destId="{EC6DFE2B-B099-4B46-9B21-2E631AB300B9}" srcOrd="0" destOrd="0" presId="urn:microsoft.com/office/officeart/2018/2/layout/IconVerticalSolidList"/>
-    <dgm:cxn modelId="{E3283CD4-21B5-43AF-BAC9-45CE07187008}" type="presParOf" srcId="{46C423EF-DEC6-4E94-8AC2-52C2849C7A50}" destId="{49E7B3DA-7564-4DCD-8FC9-EFA12F4E3BC6}" srcOrd="1" destOrd="0" presId="urn:microsoft.com/office/officeart/2018/2/layout/IconVerticalSolidList"/>
-    <dgm:cxn modelId="{A9A144DB-953F-4629-87B5-992F28057678}" type="presParOf" srcId="{46C423EF-DEC6-4E94-8AC2-52C2849C7A50}" destId="{ADB07B59-46BB-4A50-A3A1-D0216CE1D5CE}" srcOrd="2" destOrd="0" presId="urn:microsoft.com/office/officeart/2018/2/layout/IconVerticalSolidList"/>
-    <dgm:cxn modelId="{5416CA27-EB7F-404E-9F35-338FBC005506}" type="presParOf" srcId="{46C423EF-DEC6-4E94-8AC2-52C2849C7A50}" destId="{0BDEAD8D-7BEF-49ED-9637-521216F75506}" srcOrd="3" destOrd="0" presId="urn:microsoft.com/office/officeart/2018/2/layout/IconVerticalSolidList"/>
-    <dgm:cxn modelId="{C1D66606-94A1-4386-90B3-F5EEF86E73BE}" type="presParOf" srcId="{1BC2D588-E430-4B3D-9F6F-8509AE218E15}" destId="{AB2F5363-5CFA-474E-9425-E3F9E20A0BC5}" srcOrd="3" destOrd="0" presId="urn:microsoft.com/office/officeart/2018/2/layout/IconVerticalSolidList"/>
-    <dgm:cxn modelId="{8B2D4344-B60C-494E-AD3F-B8131CFCBD1D}" type="presParOf" srcId="{1BC2D588-E430-4B3D-9F6F-8509AE218E15}" destId="{BAF69DC0-FC5D-404C-B02A-5B5A45DFB835}" srcOrd="4" destOrd="0" presId="urn:microsoft.com/office/officeart/2018/2/layout/IconVerticalSolidList"/>
-    <dgm:cxn modelId="{5E8A6EE2-6FCA-486F-81AF-68A1BAA08AF0}" type="presParOf" srcId="{BAF69DC0-FC5D-404C-B02A-5B5A45DFB835}" destId="{8E7A460B-78D8-40DA-ACC0-6FCDF6FD9036}" srcOrd="0" destOrd="0" presId="urn:microsoft.com/office/officeart/2018/2/layout/IconVerticalSolidList"/>
-    <dgm:cxn modelId="{1C1EDD24-D647-4F30-9A14-B5D9F2BBEF7F}" type="presParOf" srcId="{BAF69DC0-FC5D-404C-B02A-5B5A45DFB835}" destId="{7E4FE248-CFB2-4C36-9660-D18262759B8E}" srcOrd="1" destOrd="0" presId="urn:microsoft.com/office/officeart/2018/2/layout/IconVerticalSolidList"/>
-    <dgm:cxn modelId="{7B1D9F85-74C5-4D9B-B303-1AFD4F3CB0C6}" type="presParOf" srcId="{BAF69DC0-FC5D-404C-B02A-5B5A45DFB835}" destId="{38975F87-99DB-4133-AE26-AAD03F4CECEE}" srcOrd="2" destOrd="0" presId="urn:microsoft.com/office/officeart/2018/2/layout/IconVerticalSolidList"/>
-    <dgm:cxn modelId="{62D0ABA3-81A2-411E-BFB4-AC6274043897}" type="presParOf" srcId="{BAF69DC0-FC5D-404C-B02A-5B5A45DFB835}" destId="{6AE62410-7894-4DE2-9BA2-B6263B76BEFB}" srcOrd="3" destOrd="0" presId="urn:microsoft.com/office/officeart/2018/2/layout/IconVerticalSolidList"/>
-    <dgm:cxn modelId="{9B12C54A-C0EF-47B0-88E8-DD505CDF658C}" type="presParOf" srcId="{1BC2D588-E430-4B3D-9F6F-8509AE218E15}" destId="{B937CF75-1184-46FB-B52E-C170ACCEE588}" srcOrd="5" destOrd="0" presId="urn:microsoft.com/office/officeart/2018/2/layout/IconVerticalSolidList"/>
-    <dgm:cxn modelId="{B1D46AD9-51D5-402F-9C23-C9D959935390}" type="presParOf" srcId="{1BC2D588-E430-4B3D-9F6F-8509AE218E15}" destId="{C10C9FBF-D895-4AE7-889C-20FFE56943F8}" srcOrd="6" destOrd="0" presId="urn:microsoft.com/office/officeart/2018/2/layout/IconVerticalSolidList"/>
-    <dgm:cxn modelId="{23FE595D-F69E-41C4-866E-52F173D87E64}" type="presParOf" srcId="{C10C9FBF-D895-4AE7-889C-20FFE56943F8}" destId="{0BDC2E0F-EA77-4DA1-92E4-3350AE966979}" srcOrd="0" destOrd="0" presId="urn:microsoft.com/office/officeart/2018/2/layout/IconVerticalSolidList"/>
-    <dgm:cxn modelId="{73C9E90B-6829-417E-AB20-84A04982ED45}" type="presParOf" srcId="{C10C9FBF-D895-4AE7-889C-20FFE56943F8}" destId="{FD57B1ED-3F16-4CDC-8738-F7E34E2E7382}" srcOrd="1" destOrd="0" presId="urn:microsoft.com/office/officeart/2018/2/layout/IconVerticalSolidList"/>
-    <dgm:cxn modelId="{F7B04616-8579-4181-9FE7-FD3D13B368BA}" type="presParOf" srcId="{C10C9FBF-D895-4AE7-889C-20FFE56943F8}" destId="{8116C6D3-41E0-4B4F-9C6C-E9599A964D1E}" srcOrd="2" destOrd="0" presId="urn:microsoft.com/office/officeart/2018/2/layout/IconVerticalSolidList"/>
-    <dgm:cxn modelId="{48D7E84A-E92A-4B44-9EE8-101B4456B094}" type="presParOf" srcId="{C10C9FBF-D895-4AE7-889C-20FFE56943F8}" destId="{482659B5-27F9-44F9-B6BD-C28D2A144D04}" srcOrd="3" destOrd="0" presId="urn:microsoft.com/office/officeart/2018/2/layout/IconVerticalSolidList"/>
-  </dgm:cxnLst>
-  <dgm:bg/>
-  <dgm:whole/>
-  <dgm:extLst>
-    <a:ext uri="http://schemas.microsoft.com/office/drawing/2008/diagram">
-      <dsp:dataModelExt xmlns:dsp="http://schemas.microsoft.com/office/drawing/2008/diagram" relId="rId6" minVer="http://schemas.openxmlformats.org/drawingml/2006/diagram"/>
-    </a:ext>
-  </dgm:extLst>
-</dgm:dataModel>
-</file>
-
-<file path=ppt/diagrams/data3.xml><?xml version="1.0" encoding="utf-8"?>
-<dgm:dataModel xmlns:dgm="http://schemas.openxmlformats.org/drawingml/2006/diagram" xmlns:a="http://schemas.openxmlformats.org/drawingml/2006/main">
-  <dgm:ptLst>
     <dgm:pt modelId="{ABDAC673-3E5F-4E5F-88E2-01ABD80189FF}" type="doc">
       <dgm:prSet loTypeId="urn:microsoft.com/office/officeart/2018/2/layout/IconVerticalSolidList" loCatId="icon" qsTypeId="urn:microsoft.com/office/officeart/2005/8/quickstyle/simple4" qsCatId="simple" csTypeId="urn:microsoft.com/office/officeart/2018/5/colors/Iconchunking_neutralbg_colorful1" csCatId="colorful" phldr="1"/>
       <dgm:spPr/>
@@ -5913,7 +5474,7 @@
 </dgm:dataModel>
 </file>
 
-<file path=ppt/diagrams/data4.xml><?xml version="1.0" encoding="utf-8"?>
+<file path=ppt/diagrams/data3.xml><?xml version="1.0" encoding="utf-8"?>
 <dgm:dataModel xmlns:dgm="http://schemas.openxmlformats.org/drawingml/2006/diagram" xmlns:a="http://schemas.openxmlformats.org/drawingml/2006/main">
   <dgm:ptLst>
     <dgm:pt modelId="{2EA8933E-ABE3-4739-9D1A-0DA45FA1AE2C}" type="doc">
@@ -6647,6 +6208,445 @@
     <dgm:cxn modelId="{4A6994B8-0F52-48EF-A8C2-C25BB1E484E0}" type="presParOf" srcId="{7813D391-A433-4EF0-8C2C-B1ED389A1F70}" destId="{80102A9D-C77E-4A50-9C01-6D80530C4AC9}" srcOrd="1" destOrd="0" presId="urn:microsoft.com/office/officeart/2018/2/layout/IconVerticalSolidList"/>
     <dgm:cxn modelId="{7EF95D3C-1104-4164-A699-87E93CAB7576}" type="presParOf" srcId="{7813D391-A433-4EF0-8C2C-B1ED389A1F70}" destId="{370A8925-0A46-4440-853E-7D4D96C53134}" srcOrd="2" destOrd="0" presId="urn:microsoft.com/office/officeart/2018/2/layout/IconVerticalSolidList"/>
     <dgm:cxn modelId="{1B13DB66-0EDB-4908-A4BA-73FEE8113905}" type="presParOf" srcId="{7813D391-A433-4EF0-8C2C-B1ED389A1F70}" destId="{97AEF5A7-CC70-42B3-A824-4A04166BF8F0}" srcOrd="3" destOrd="0" presId="urn:microsoft.com/office/officeart/2018/2/layout/IconVerticalSolidList"/>
+  </dgm:cxnLst>
+  <dgm:bg/>
+  <dgm:whole/>
+  <dgm:extLst>
+    <a:ext uri="http://schemas.microsoft.com/office/drawing/2008/diagram">
+      <dsp:dataModelExt xmlns:dsp="http://schemas.microsoft.com/office/drawing/2008/diagram" relId="rId6" minVer="http://schemas.openxmlformats.org/drawingml/2006/diagram"/>
+    </a:ext>
+  </dgm:extLst>
+</dgm:dataModel>
+</file>
+
+<file path=ppt/diagrams/data4.xml><?xml version="1.0" encoding="utf-8"?>
+<dgm:dataModel xmlns:dgm="http://schemas.openxmlformats.org/drawingml/2006/diagram" xmlns:a="http://schemas.openxmlformats.org/drawingml/2006/main">
+  <dgm:ptLst>
+    <dgm:pt modelId="{0537ED38-BF0B-4C88-A626-06380C7B4D72}" type="doc">
+      <dgm:prSet loTypeId="urn:microsoft.com/office/officeart/2018/2/layout/IconVerticalSolidList" loCatId="icon" qsTypeId="urn:microsoft.com/office/officeart/2005/8/quickstyle/simple4" qsCatId="simple" csTypeId="urn:microsoft.com/office/officeart/2018/5/colors/Iconchunking_neutralbg_colorful1" csCatId="colorful" phldr="1"/>
+      <dgm:spPr/>
+      <dgm:t>
+        <a:bodyPr/>
+        <a:lstStyle/>
+        <a:p>
+          <a:endParaRPr lang="en-US"/>
+        </a:p>
+      </dgm:t>
+    </dgm:pt>
+    <dgm:pt modelId="{36C422CE-A3FF-42E8-98F6-BB644EA7EDC1}">
+      <dgm:prSet/>
+      <dgm:spPr/>
+      <dgm:t>
+        <a:bodyPr/>
+        <a:lstStyle/>
+        <a:p>
+          <a:pPr>
+            <a:lnSpc>
+              <a:spcPct val="100000"/>
+            </a:lnSpc>
+          </a:pPr>
+          <a:r>
+            <a:rPr lang="en-US" dirty="0"/>
+            <a:t>Clean and explicit separation by logic domain</a:t>
+          </a:r>
+        </a:p>
+      </dgm:t>
+    </dgm:pt>
+    <dgm:pt modelId="{1517786E-16A3-4544-9F95-4B79B9124EAA}" type="parTrans" cxnId="{4A33D000-55AA-40AC-A878-82982577BD3B}">
+      <dgm:prSet/>
+      <dgm:spPr/>
+      <dgm:t>
+        <a:bodyPr/>
+        <a:lstStyle/>
+        <a:p>
+          <a:endParaRPr lang="en-US"/>
+        </a:p>
+      </dgm:t>
+    </dgm:pt>
+    <dgm:pt modelId="{7F0B5881-6EE3-4DDC-B856-14C2A6B7FBA3}" type="sibTrans" cxnId="{4A33D000-55AA-40AC-A878-82982577BD3B}">
+      <dgm:prSet/>
+      <dgm:spPr/>
+      <dgm:t>
+        <a:bodyPr/>
+        <a:lstStyle/>
+        <a:p>
+          <a:endParaRPr lang="en-US"/>
+        </a:p>
+      </dgm:t>
+    </dgm:pt>
+    <dgm:pt modelId="{25B3FC53-A852-4DDA-B5F6-D60167C5BFF5}">
+      <dgm:prSet/>
+      <dgm:spPr/>
+      <dgm:t>
+        <a:bodyPr/>
+        <a:lstStyle/>
+        <a:p>
+          <a:pPr>
+            <a:lnSpc>
+              <a:spcPct val="100000"/>
+            </a:lnSpc>
+          </a:pPr>
+          <a:r>
+            <a:rPr lang="pt-PT" b="0" i="0" dirty="0" err="1"/>
+            <a:t>Maintainability</a:t>
+          </a:r>
+          <a:endParaRPr lang="en-US" dirty="0"/>
+        </a:p>
+      </dgm:t>
+    </dgm:pt>
+    <dgm:pt modelId="{E67FF253-FBCF-45C2-AA87-714B537DACC4}" type="parTrans" cxnId="{9FD93808-12A3-495C-A0AB-107C34F3C7FE}">
+      <dgm:prSet/>
+      <dgm:spPr/>
+      <dgm:t>
+        <a:bodyPr/>
+        <a:lstStyle/>
+        <a:p>
+          <a:endParaRPr lang="en-US"/>
+        </a:p>
+      </dgm:t>
+    </dgm:pt>
+    <dgm:pt modelId="{6F82FF2B-BFA0-46FE-8B6F-FDFDF663B64F}" type="sibTrans" cxnId="{9FD93808-12A3-495C-A0AB-107C34F3C7FE}">
+      <dgm:prSet/>
+      <dgm:spPr/>
+      <dgm:t>
+        <a:bodyPr/>
+        <a:lstStyle/>
+        <a:p>
+          <a:endParaRPr lang="en-US"/>
+        </a:p>
+      </dgm:t>
+    </dgm:pt>
+    <dgm:pt modelId="{87978358-7B40-4E17-A440-347DECB50227}">
+      <dgm:prSet/>
+      <dgm:spPr/>
+      <dgm:t>
+        <a:bodyPr/>
+        <a:lstStyle/>
+        <a:p>
+          <a:pPr>
+            <a:lnSpc>
+              <a:spcPct val="100000"/>
+            </a:lnSpc>
+          </a:pPr>
+          <a:r>
+            <a:rPr lang="en-US" dirty="0"/>
+            <a:t>Documentation</a:t>
+          </a:r>
+        </a:p>
+      </dgm:t>
+    </dgm:pt>
+    <dgm:pt modelId="{8CE10EC8-4F8E-4013-A424-A5DA2F5526CD}" type="parTrans" cxnId="{433C51E6-BAB6-42C5-A302-9918F7819D64}">
+      <dgm:prSet/>
+      <dgm:spPr/>
+      <dgm:t>
+        <a:bodyPr/>
+        <a:lstStyle/>
+        <a:p>
+          <a:endParaRPr lang="en-US"/>
+        </a:p>
+      </dgm:t>
+    </dgm:pt>
+    <dgm:pt modelId="{D04CF680-8CCE-4B5E-8E88-DF49BD5D876B}" type="sibTrans" cxnId="{433C51E6-BAB6-42C5-A302-9918F7819D64}">
+      <dgm:prSet/>
+      <dgm:spPr/>
+      <dgm:t>
+        <a:bodyPr/>
+        <a:lstStyle/>
+        <a:p>
+          <a:endParaRPr lang="en-US"/>
+        </a:p>
+      </dgm:t>
+    </dgm:pt>
+    <dgm:pt modelId="{46C5E9F8-1751-4E89-84C5-C927704D3662}">
+      <dgm:prSet/>
+      <dgm:spPr/>
+      <dgm:t>
+        <a:bodyPr/>
+        <a:lstStyle/>
+        <a:p>
+          <a:pPr>
+            <a:lnSpc>
+              <a:spcPct val="100000"/>
+            </a:lnSpc>
+          </a:pPr>
+          <a:r>
+            <a:rPr lang="en-US" dirty="0"/>
+            <a:t>Readability</a:t>
+          </a:r>
+        </a:p>
+      </dgm:t>
+    </dgm:pt>
+    <dgm:pt modelId="{7FD005D0-DAC0-4FE4-AAF4-88DA739B99CC}" type="parTrans" cxnId="{7A14D9C4-234F-438E-9F72-F84DCD363CE9}">
+      <dgm:prSet/>
+      <dgm:spPr/>
+      <dgm:t>
+        <a:bodyPr/>
+        <a:lstStyle/>
+        <a:p>
+          <a:endParaRPr lang="pt-PT"/>
+        </a:p>
+      </dgm:t>
+    </dgm:pt>
+    <dgm:pt modelId="{95AE2CF7-EA0F-4BE3-BABA-C9BAC7251983}" type="sibTrans" cxnId="{7A14D9C4-234F-438E-9F72-F84DCD363CE9}">
+      <dgm:prSet/>
+      <dgm:spPr/>
+      <dgm:t>
+        <a:bodyPr/>
+        <a:lstStyle/>
+        <a:p>
+          <a:endParaRPr lang="pt-PT"/>
+        </a:p>
+      </dgm:t>
+    </dgm:pt>
+    <dgm:pt modelId="{1BC2D588-E430-4B3D-9F6F-8509AE218E15}" type="pres">
+      <dgm:prSet presAssocID="{0537ED38-BF0B-4C88-A626-06380C7B4D72}" presName="root" presStyleCnt="0">
+        <dgm:presLayoutVars>
+          <dgm:dir/>
+          <dgm:resizeHandles val="exact"/>
+        </dgm:presLayoutVars>
+      </dgm:prSet>
+      <dgm:spPr/>
+    </dgm:pt>
+    <dgm:pt modelId="{30E8552C-807E-4439-894C-9DFFF892AF69}" type="pres">
+      <dgm:prSet presAssocID="{36C422CE-A3FF-42E8-98F6-BB644EA7EDC1}" presName="compNode" presStyleCnt="0"/>
+      <dgm:spPr/>
+    </dgm:pt>
+    <dgm:pt modelId="{94375141-FD9C-47EE-89E7-B3B227B4FDA8}" type="pres">
+      <dgm:prSet presAssocID="{36C422CE-A3FF-42E8-98F6-BB644EA7EDC1}" presName="bgRect" presStyleLbl="bgShp" presStyleIdx="0" presStyleCnt="4"/>
+      <dgm:spPr/>
+    </dgm:pt>
+    <dgm:pt modelId="{D38CFDF5-935C-4794-936A-787015FD5A74}" type="pres">
+      <dgm:prSet presAssocID="{36C422CE-A3FF-42E8-98F6-BB644EA7EDC1}" presName="iconRect" presStyleLbl="node1" presStyleIdx="0" presStyleCnt="4"/>
+      <dgm:spPr>
+        <a:blipFill>
+          <a:blip xmlns:r="http://schemas.openxmlformats.org/officeDocument/2006/relationships" r:embed="rId1">
+            <a:extLst>
+              <a:ext uri="{28A0092B-C50C-407E-A947-70E740481C1C}">
+                <a14:useLocalDpi xmlns:a14="http://schemas.microsoft.com/office/drawing/2010/main" val="0"/>
+              </a:ext>
+              <a:ext uri="{96DAC541-7B7A-43D3-8B79-37D633B846F1}">
+                <asvg:svgBlip xmlns:asvg="http://schemas.microsoft.com/office/drawing/2016/SVG/main" r:embed="rId2"/>
+              </a:ext>
+            </a:extLst>
+          </a:blip>
+          <a:stretch>
+            <a:fillRect/>
+          </a:stretch>
+        </a:blipFill>
+        <a:ln>
+          <a:noFill/>
+        </a:ln>
+      </dgm:spPr>
+      <dgm:extLst>
+        <a:ext uri="{E40237B7-FDA0-4F09-8148-C483321AD2D9}">
+          <dgm14:cNvPr xmlns:dgm14="http://schemas.microsoft.com/office/drawing/2010/diagram" id="0" name="" descr="Checkmark"/>
+        </a:ext>
+      </dgm:extLst>
+    </dgm:pt>
+    <dgm:pt modelId="{B682A316-1E9A-4BA2-84FF-B8937C703A2E}" type="pres">
+      <dgm:prSet presAssocID="{36C422CE-A3FF-42E8-98F6-BB644EA7EDC1}" presName="spaceRect" presStyleCnt="0"/>
+      <dgm:spPr/>
+    </dgm:pt>
+    <dgm:pt modelId="{831750D4-AA00-4C10-8AB0-5DABCFF07204}" type="pres">
+      <dgm:prSet presAssocID="{36C422CE-A3FF-42E8-98F6-BB644EA7EDC1}" presName="parTx" presStyleLbl="revTx" presStyleIdx="0" presStyleCnt="4">
+        <dgm:presLayoutVars>
+          <dgm:chMax val="0"/>
+          <dgm:chPref val="0"/>
+        </dgm:presLayoutVars>
+      </dgm:prSet>
+      <dgm:spPr/>
+    </dgm:pt>
+    <dgm:pt modelId="{F4CAC8F4-4DB9-4776-A8F5-6C1C3732EA94}" type="pres">
+      <dgm:prSet presAssocID="{7F0B5881-6EE3-4DDC-B856-14C2A6B7FBA3}" presName="sibTrans" presStyleCnt="0"/>
+      <dgm:spPr/>
+    </dgm:pt>
+    <dgm:pt modelId="{46C423EF-DEC6-4E94-8AC2-52C2849C7A50}" type="pres">
+      <dgm:prSet presAssocID="{25B3FC53-A852-4DDA-B5F6-D60167C5BFF5}" presName="compNode" presStyleCnt="0"/>
+      <dgm:spPr/>
+    </dgm:pt>
+    <dgm:pt modelId="{EC6DFE2B-B099-4B46-9B21-2E631AB300B9}" type="pres">
+      <dgm:prSet presAssocID="{25B3FC53-A852-4DDA-B5F6-D60167C5BFF5}" presName="bgRect" presStyleLbl="bgShp" presStyleIdx="1" presStyleCnt="4"/>
+      <dgm:spPr/>
+    </dgm:pt>
+    <dgm:pt modelId="{49E7B3DA-7564-4DCD-8FC9-EFA12F4E3BC6}" type="pres">
+      <dgm:prSet presAssocID="{25B3FC53-A852-4DDA-B5F6-D60167C5BFF5}" presName="iconRect" presStyleLbl="node1" presStyleIdx="1" presStyleCnt="4"/>
+      <dgm:spPr>
+        <a:blipFill rotWithShape="1">
+          <a:blip xmlns:r="http://schemas.openxmlformats.org/officeDocument/2006/relationships" r:embed="rId3">
+            <a:extLst>
+              <a:ext uri="{28A0092B-C50C-407E-A947-70E740481C1C}">
+                <a14:useLocalDpi xmlns:a14="http://schemas.microsoft.com/office/drawing/2010/main" val="0"/>
+              </a:ext>
+              <a:ext uri="{96DAC541-7B7A-43D3-8B79-37D633B846F1}">
+                <asvg:svgBlip xmlns:asvg="http://schemas.microsoft.com/office/drawing/2016/SVG/main" r:embed="rId4"/>
+              </a:ext>
+            </a:extLst>
+          </a:blip>
+          <a:srcRect/>
+          <a:stretch>
+            <a:fillRect/>
+          </a:stretch>
+        </a:blipFill>
+        <a:ln>
+          <a:noFill/>
+        </a:ln>
+      </dgm:spPr>
+      <dgm:extLst>
+        <a:ext uri="{E40237B7-FDA0-4F09-8148-C483321AD2D9}">
+          <dgm14:cNvPr xmlns:dgm14="http://schemas.microsoft.com/office/drawing/2010/diagram" id="0" name="" descr="Line Arrow: Counterclockwise curve"/>
+        </a:ext>
+      </dgm:extLst>
+    </dgm:pt>
+    <dgm:pt modelId="{ADB07B59-46BB-4A50-A3A1-D0216CE1D5CE}" type="pres">
+      <dgm:prSet presAssocID="{25B3FC53-A852-4DDA-B5F6-D60167C5BFF5}" presName="spaceRect" presStyleCnt="0"/>
+      <dgm:spPr/>
+    </dgm:pt>
+    <dgm:pt modelId="{0BDEAD8D-7BEF-49ED-9637-521216F75506}" type="pres">
+      <dgm:prSet presAssocID="{25B3FC53-A852-4DDA-B5F6-D60167C5BFF5}" presName="parTx" presStyleLbl="revTx" presStyleIdx="1" presStyleCnt="4">
+        <dgm:presLayoutVars>
+          <dgm:chMax val="0"/>
+          <dgm:chPref val="0"/>
+        </dgm:presLayoutVars>
+      </dgm:prSet>
+      <dgm:spPr/>
+    </dgm:pt>
+    <dgm:pt modelId="{AB2F5363-5CFA-474E-9425-E3F9E20A0BC5}" type="pres">
+      <dgm:prSet presAssocID="{6F82FF2B-BFA0-46FE-8B6F-FDFDF663B64F}" presName="sibTrans" presStyleCnt="0"/>
+      <dgm:spPr/>
+    </dgm:pt>
+    <dgm:pt modelId="{BAF69DC0-FC5D-404C-B02A-5B5A45DFB835}" type="pres">
+      <dgm:prSet presAssocID="{46C5E9F8-1751-4E89-84C5-C927704D3662}" presName="compNode" presStyleCnt="0"/>
+      <dgm:spPr/>
+    </dgm:pt>
+    <dgm:pt modelId="{8E7A460B-78D8-40DA-ACC0-6FCDF6FD9036}" type="pres">
+      <dgm:prSet presAssocID="{46C5E9F8-1751-4E89-84C5-C927704D3662}" presName="bgRect" presStyleLbl="bgShp" presStyleIdx="2" presStyleCnt="4"/>
+      <dgm:spPr/>
+    </dgm:pt>
+    <dgm:pt modelId="{7E4FE248-CFB2-4C36-9660-D18262759B8E}" type="pres">
+      <dgm:prSet presAssocID="{46C5E9F8-1751-4E89-84C5-C927704D3662}" presName="iconRect" presStyleLbl="node1" presStyleIdx="2" presStyleCnt="4"/>
+      <dgm:spPr>
+        <a:blipFill>
+          <a:blip xmlns:r="http://schemas.openxmlformats.org/officeDocument/2006/relationships" r:embed="rId5">
+            <a:extLst>
+              <a:ext uri="{28A0092B-C50C-407E-A947-70E740481C1C}">
+                <a14:useLocalDpi xmlns:a14="http://schemas.microsoft.com/office/drawing/2010/main" val="0"/>
+              </a:ext>
+              <a:ext uri="{96DAC541-7B7A-43D3-8B79-37D633B846F1}">
+                <asvg:svgBlip xmlns:asvg="http://schemas.microsoft.com/office/drawing/2016/SVG/main" r:embed="rId6"/>
+              </a:ext>
+            </a:extLst>
+          </a:blip>
+          <a:stretch>
+            <a:fillRect/>
+          </a:stretch>
+        </a:blipFill>
+      </dgm:spPr>
+      <dgm:extLst>
+        <a:ext uri="{E40237B7-FDA0-4F09-8148-C483321AD2D9}">
+          <dgm14:cNvPr xmlns:dgm14="http://schemas.microsoft.com/office/drawing/2010/diagram" id="0" name="" descr="Line Arrow: Counterclockwise curve"/>
+        </a:ext>
+      </dgm:extLst>
+    </dgm:pt>
+    <dgm:pt modelId="{38975F87-99DB-4133-AE26-AAD03F4CECEE}" type="pres">
+      <dgm:prSet presAssocID="{46C5E9F8-1751-4E89-84C5-C927704D3662}" presName="spaceRect" presStyleCnt="0"/>
+      <dgm:spPr/>
+    </dgm:pt>
+    <dgm:pt modelId="{6AE62410-7894-4DE2-9BA2-B6263B76BEFB}" type="pres">
+      <dgm:prSet presAssocID="{46C5E9F8-1751-4E89-84C5-C927704D3662}" presName="parTx" presStyleLbl="revTx" presStyleIdx="2" presStyleCnt="4">
+        <dgm:presLayoutVars>
+          <dgm:chMax val="0"/>
+          <dgm:chPref val="0"/>
+        </dgm:presLayoutVars>
+      </dgm:prSet>
+      <dgm:spPr/>
+    </dgm:pt>
+    <dgm:pt modelId="{B937CF75-1184-46FB-B52E-C170ACCEE588}" type="pres">
+      <dgm:prSet presAssocID="{95AE2CF7-EA0F-4BE3-BABA-C9BAC7251983}" presName="sibTrans" presStyleCnt="0"/>
+      <dgm:spPr/>
+    </dgm:pt>
+    <dgm:pt modelId="{C10C9FBF-D895-4AE7-889C-20FFE56943F8}" type="pres">
+      <dgm:prSet presAssocID="{87978358-7B40-4E17-A440-347DECB50227}" presName="compNode" presStyleCnt="0"/>
+      <dgm:spPr/>
+    </dgm:pt>
+    <dgm:pt modelId="{0BDC2E0F-EA77-4DA1-92E4-3350AE966979}" type="pres">
+      <dgm:prSet presAssocID="{87978358-7B40-4E17-A440-347DECB50227}" presName="bgRect" presStyleLbl="bgShp" presStyleIdx="3" presStyleCnt="4"/>
+      <dgm:spPr/>
+    </dgm:pt>
+    <dgm:pt modelId="{FD57B1ED-3F16-4CDC-8738-F7E34E2E7382}" type="pres">
+      <dgm:prSet presAssocID="{87978358-7B40-4E17-A440-347DECB50227}" presName="iconRect" presStyleLbl="node1" presStyleIdx="3" presStyleCnt="4"/>
+      <dgm:spPr>
+        <a:blipFill>
+          <a:blip xmlns:r="http://schemas.openxmlformats.org/officeDocument/2006/relationships" r:embed="rId7">
+            <a:extLst>
+              <a:ext uri="{28A0092B-C50C-407E-A947-70E740481C1C}">
+                <a14:useLocalDpi xmlns:a14="http://schemas.microsoft.com/office/drawing/2010/main" val="0"/>
+              </a:ext>
+              <a:ext uri="{96DAC541-7B7A-43D3-8B79-37D633B846F1}">
+                <asvg:svgBlip xmlns:asvg="http://schemas.microsoft.com/office/drawing/2016/SVG/main" r:embed="rId8"/>
+              </a:ext>
+            </a:extLst>
+          </a:blip>
+          <a:stretch>
+            <a:fillRect/>
+          </a:stretch>
+        </a:blipFill>
+        <a:ln>
+          <a:noFill/>
+        </a:ln>
+      </dgm:spPr>
+      <dgm:extLst>
+        <a:ext uri="{E40237B7-FDA0-4F09-8148-C483321AD2D9}">
+          <dgm14:cNvPr xmlns:dgm14="http://schemas.microsoft.com/office/drawing/2010/diagram" id="0" name="" descr="Document"/>
+        </a:ext>
+      </dgm:extLst>
+    </dgm:pt>
+    <dgm:pt modelId="{8116C6D3-41E0-4B4F-9C6C-E9599A964D1E}" type="pres">
+      <dgm:prSet presAssocID="{87978358-7B40-4E17-A440-347DECB50227}" presName="spaceRect" presStyleCnt="0"/>
+      <dgm:spPr/>
+    </dgm:pt>
+    <dgm:pt modelId="{482659B5-27F9-44F9-B6BD-C28D2A144D04}" type="pres">
+      <dgm:prSet presAssocID="{87978358-7B40-4E17-A440-347DECB50227}" presName="parTx" presStyleLbl="revTx" presStyleIdx="3" presStyleCnt="4">
+        <dgm:presLayoutVars>
+          <dgm:chMax val="0"/>
+          <dgm:chPref val="0"/>
+        </dgm:presLayoutVars>
+      </dgm:prSet>
+      <dgm:spPr/>
+    </dgm:pt>
+  </dgm:ptLst>
+  <dgm:cxnLst>
+    <dgm:cxn modelId="{4A33D000-55AA-40AC-A878-82982577BD3B}" srcId="{0537ED38-BF0B-4C88-A626-06380C7B4D72}" destId="{36C422CE-A3FF-42E8-98F6-BB644EA7EDC1}" srcOrd="0" destOrd="0" parTransId="{1517786E-16A3-4544-9F95-4B79B9124EAA}" sibTransId="{7F0B5881-6EE3-4DDC-B856-14C2A6B7FBA3}"/>
+    <dgm:cxn modelId="{9FD93808-12A3-495C-A0AB-107C34F3C7FE}" srcId="{0537ED38-BF0B-4C88-A626-06380C7B4D72}" destId="{25B3FC53-A852-4DDA-B5F6-D60167C5BFF5}" srcOrd="1" destOrd="0" parTransId="{E67FF253-FBCF-45C2-AA87-714B537DACC4}" sibTransId="{6F82FF2B-BFA0-46FE-8B6F-FDFDF663B64F}"/>
+    <dgm:cxn modelId="{B39EE01A-3A38-4364-8AA7-29E6AB13D8E6}" type="presOf" srcId="{25B3FC53-A852-4DDA-B5F6-D60167C5BFF5}" destId="{0BDEAD8D-7BEF-49ED-9637-521216F75506}" srcOrd="0" destOrd="0" presId="urn:microsoft.com/office/officeart/2018/2/layout/IconVerticalSolidList"/>
+    <dgm:cxn modelId="{64913872-DC37-4D64-84E3-A6CB19F673AA}" type="presOf" srcId="{87978358-7B40-4E17-A440-347DECB50227}" destId="{482659B5-27F9-44F9-B6BD-C28D2A144D04}" srcOrd="0" destOrd="0" presId="urn:microsoft.com/office/officeart/2018/2/layout/IconVerticalSolidList"/>
+    <dgm:cxn modelId="{2B55F4B8-DC80-4102-8055-07833117649D}" type="presOf" srcId="{46C5E9F8-1751-4E89-84C5-C927704D3662}" destId="{6AE62410-7894-4DE2-9BA2-B6263B76BEFB}" srcOrd="0" destOrd="0" presId="urn:microsoft.com/office/officeart/2018/2/layout/IconVerticalSolidList"/>
+    <dgm:cxn modelId="{7A14D9C4-234F-438E-9F72-F84DCD363CE9}" srcId="{0537ED38-BF0B-4C88-A626-06380C7B4D72}" destId="{46C5E9F8-1751-4E89-84C5-C927704D3662}" srcOrd="2" destOrd="0" parTransId="{7FD005D0-DAC0-4FE4-AAF4-88DA739B99CC}" sibTransId="{95AE2CF7-EA0F-4BE3-BABA-C9BAC7251983}"/>
+    <dgm:cxn modelId="{433C51E6-BAB6-42C5-A302-9918F7819D64}" srcId="{0537ED38-BF0B-4C88-A626-06380C7B4D72}" destId="{87978358-7B40-4E17-A440-347DECB50227}" srcOrd="3" destOrd="0" parTransId="{8CE10EC8-4F8E-4013-A424-A5DA2F5526CD}" sibTransId="{D04CF680-8CCE-4B5E-8E88-DF49BD5D876B}"/>
+    <dgm:cxn modelId="{40B096F8-1B14-426F-B562-52C9361C8458}" type="presOf" srcId="{0537ED38-BF0B-4C88-A626-06380C7B4D72}" destId="{1BC2D588-E430-4B3D-9F6F-8509AE218E15}" srcOrd="0" destOrd="0" presId="urn:microsoft.com/office/officeart/2018/2/layout/IconVerticalSolidList"/>
+    <dgm:cxn modelId="{9F28CAFB-E623-43B0-9701-A5FF078B3FCE}" type="presOf" srcId="{36C422CE-A3FF-42E8-98F6-BB644EA7EDC1}" destId="{831750D4-AA00-4C10-8AB0-5DABCFF07204}" srcOrd="0" destOrd="0" presId="urn:microsoft.com/office/officeart/2018/2/layout/IconVerticalSolidList"/>
+    <dgm:cxn modelId="{EC68153F-D7A6-4EC0-AFB5-07EB4A0553D4}" type="presParOf" srcId="{1BC2D588-E430-4B3D-9F6F-8509AE218E15}" destId="{30E8552C-807E-4439-894C-9DFFF892AF69}" srcOrd="0" destOrd="0" presId="urn:microsoft.com/office/officeart/2018/2/layout/IconVerticalSolidList"/>
+    <dgm:cxn modelId="{FE9882E4-3305-4E1D-9B30-43388B5D89A4}" type="presParOf" srcId="{30E8552C-807E-4439-894C-9DFFF892AF69}" destId="{94375141-FD9C-47EE-89E7-B3B227B4FDA8}" srcOrd="0" destOrd="0" presId="urn:microsoft.com/office/officeart/2018/2/layout/IconVerticalSolidList"/>
+    <dgm:cxn modelId="{652616AE-1624-4164-A6F3-8507BE81662D}" type="presParOf" srcId="{30E8552C-807E-4439-894C-9DFFF892AF69}" destId="{D38CFDF5-935C-4794-936A-787015FD5A74}" srcOrd="1" destOrd="0" presId="urn:microsoft.com/office/officeart/2018/2/layout/IconVerticalSolidList"/>
+    <dgm:cxn modelId="{C58D4297-7C15-4EAC-8832-39FD8CCB7523}" type="presParOf" srcId="{30E8552C-807E-4439-894C-9DFFF892AF69}" destId="{B682A316-1E9A-4BA2-84FF-B8937C703A2E}" srcOrd="2" destOrd="0" presId="urn:microsoft.com/office/officeart/2018/2/layout/IconVerticalSolidList"/>
+    <dgm:cxn modelId="{0823AB1C-A7D6-410C-9230-74A47204FD19}" type="presParOf" srcId="{30E8552C-807E-4439-894C-9DFFF892AF69}" destId="{831750D4-AA00-4C10-8AB0-5DABCFF07204}" srcOrd="3" destOrd="0" presId="urn:microsoft.com/office/officeart/2018/2/layout/IconVerticalSolidList"/>
+    <dgm:cxn modelId="{0C192797-FF1C-496C-AA91-EAD82FE3B3F7}" type="presParOf" srcId="{1BC2D588-E430-4B3D-9F6F-8509AE218E15}" destId="{F4CAC8F4-4DB9-4776-A8F5-6C1C3732EA94}" srcOrd="1" destOrd="0" presId="urn:microsoft.com/office/officeart/2018/2/layout/IconVerticalSolidList"/>
+    <dgm:cxn modelId="{5585DB82-FA80-43ED-A515-CB23FE446876}" type="presParOf" srcId="{1BC2D588-E430-4B3D-9F6F-8509AE218E15}" destId="{46C423EF-DEC6-4E94-8AC2-52C2849C7A50}" srcOrd="2" destOrd="0" presId="urn:microsoft.com/office/officeart/2018/2/layout/IconVerticalSolidList"/>
+    <dgm:cxn modelId="{E0D73574-4B95-4902-9283-3689A55F9331}" type="presParOf" srcId="{46C423EF-DEC6-4E94-8AC2-52C2849C7A50}" destId="{EC6DFE2B-B099-4B46-9B21-2E631AB300B9}" srcOrd="0" destOrd="0" presId="urn:microsoft.com/office/officeart/2018/2/layout/IconVerticalSolidList"/>
+    <dgm:cxn modelId="{E3283CD4-21B5-43AF-BAC9-45CE07187008}" type="presParOf" srcId="{46C423EF-DEC6-4E94-8AC2-52C2849C7A50}" destId="{49E7B3DA-7564-4DCD-8FC9-EFA12F4E3BC6}" srcOrd="1" destOrd="0" presId="urn:microsoft.com/office/officeart/2018/2/layout/IconVerticalSolidList"/>
+    <dgm:cxn modelId="{A9A144DB-953F-4629-87B5-992F28057678}" type="presParOf" srcId="{46C423EF-DEC6-4E94-8AC2-52C2849C7A50}" destId="{ADB07B59-46BB-4A50-A3A1-D0216CE1D5CE}" srcOrd="2" destOrd="0" presId="urn:microsoft.com/office/officeart/2018/2/layout/IconVerticalSolidList"/>
+    <dgm:cxn modelId="{5416CA27-EB7F-404E-9F35-338FBC005506}" type="presParOf" srcId="{46C423EF-DEC6-4E94-8AC2-52C2849C7A50}" destId="{0BDEAD8D-7BEF-49ED-9637-521216F75506}" srcOrd="3" destOrd="0" presId="urn:microsoft.com/office/officeart/2018/2/layout/IconVerticalSolidList"/>
+    <dgm:cxn modelId="{C1D66606-94A1-4386-90B3-F5EEF86E73BE}" type="presParOf" srcId="{1BC2D588-E430-4B3D-9F6F-8509AE218E15}" destId="{AB2F5363-5CFA-474E-9425-E3F9E20A0BC5}" srcOrd="3" destOrd="0" presId="urn:microsoft.com/office/officeart/2018/2/layout/IconVerticalSolidList"/>
+    <dgm:cxn modelId="{8B2D4344-B60C-494E-AD3F-B8131CFCBD1D}" type="presParOf" srcId="{1BC2D588-E430-4B3D-9F6F-8509AE218E15}" destId="{BAF69DC0-FC5D-404C-B02A-5B5A45DFB835}" srcOrd="4" destOrd="0" presId="urn:microsoft.com/office/officeart/2018/2/layout/IconVerticalSolidList"/>
+    <dgm:cxn modelId="{5E8A6EE2-6FCA-486F-81AF-68A1BAA08AF0}" type="presParOf" srcId="{BAF69DC0-FC5D-404C-B02A-5B5A45DFB835}" destId="{8E7A460B-78D8-40DA-ACC0-6FCDF6FD9036}" srcOrd="0" destOrd="0" presId="urn:microsoft.com/office/officeart/2018/2/layout/IconVerticalSolidList"/>
+    <dgm:cxn modelId="{1C1EDD24-D647-4F30-9A14-B5D9F2BBEF7F}" type="presParOf" srcId="{BAF69DC0-FC5D-404C-B02A-5B5A45DFB835}" destId="{7E4FE248-CFB2-4C36-9660-D18262759B8E}" srcOrd="1" destOrd="0" presId="urn:microsoft.com/office/officeart/2018/2/layout/IconVerticalSolidList"/>
+    <dgm:cxn modelId="{7B1D9F85-74C5-4D9B-B303-1AFD4F3CB0C6}" type="presParOf" srcId="{BAF69DC0-FC5D-404C-B02A-5B5A45DFB835}" destId="{38975F87-99DB-4133-AE26-AAD03F4CECEE}" srcOrd="2" destOrd="0" presId="urn:microsoft.com/office/officeart/2018/2/layout/IconVerticalSolidList"/>
+    <dgm:cxn modelId="{62D0ABA3-81A2-411E-BFB4-AC6274043897}" type="presParOf" srcId="{BAF69DC0-FC5D-404C-B02A-5B5A45DFB835}" destId="{6AE62410-7894-4DE2-9BA2-B6263B76BEFB}" srcOrd="3" destOrd="0" presId="urn:microsoft.com/office/officeart/2018/2/layout/IconVerticalSolidList"/>
+    <dgm:cxn modelId="{9B12C54A-C0EF-47B0-88E8-DD505CDF658C}" type="presParOf" srcId="{1BC2D588-E430-4B3D-9F6F-8509AE218E15}" destId="{B937CF75-1184-46FB-B52E-C170ACCEE588}" srcOrd="5" destOrd="0" presId="urn:microsoft.com/office/officeart/2018/2/layout/IconVerticalSolidList"/>
+    <dgm:cxn modelId="{B1D46AD9-51D5-402F-9C23-C9D959935390}" type="presParOf" srcId="{1BC2D588-E430-4B3D-9F6F-8509AE218E15}" destId="{C10C9FBF-D895-4AE7-889C-20FFE56943F8}" srcOrd="6" destOrd="0" presId="urn:microsoft.com/office/officeart/2018/2/layout/IconVerticalSolidList"/>
+    <dgm:cxn modelId="{23FE595D-F69E-41C4-866E-52F173D87E64}" type="presParOf" srcId="{C10C9FBF-D895-4AE7-889C-20FFE56943F8}" destId="{0BDC2E0F-EA77-4DA1-92E4-3350AE966979}" srcOrd="0" destOrd="0" presId="urn:microsoft.com/office/officeart/2018/2/layout/IconVerticalSolidList"/>
+    <dgm:cxn modelId="{73C9E90B-6829-417E-AB20-84A04982ED45}" type="presParOf" srcId="{C10C9FBF-D895-4AE7-889C-20FFE56943F8}" destId="{FD57B1ED-3F16-4CDC-8738-F7E34E2E7382}" srcOrd="1" destOrd="0" presId="urn:microsoft.com/office/officeart/2018/2/layout/IconVerticalSolidList"/>
+    <dgm:cxn modelId="{F7B04616-8579-4181-9FE7-FD3D13B368BA}" type="presParOf" srcId="{C10C9FBF-D895-4AE7-889C-20FFE56943F8}" destId="{8116C6D3-41E0-4B4F-9C6C-E9599A964D1E}" srcOrd="2" destOrd="0" presId="urn:microsoft.com/office/officeart/2018/2/layout/IconVerticalSolidList"/>
+    <dgm:cxn modelId="{48D7E84A-E92A-4B44-9EE8-101B4456B094}" type="presParOf" srcId="{C10C9FBF-D895-4AE7-889C-20FFE56943F8}" destId="{482659B5-27F9-44F9-B6BD-C28D2A144D04}" srcOrd="3" destOrd="0" presId="urn:microsoft.com/office/officeart/2018/2/layout/IconVerticalSolidList"/>
   </dgm:cxnLst>
   <dgm:bg/>
   <dgm:whole/>
@@ -7875,620 +7875,6 @@
       <dsp:cNvGrpSpPr/>
     </dsp:nvGrpSpPr>
     <dsp:grpSpPr/>
-    <dsp:sp modelId="{94375141-FD9C-47EE-89E7-B3B227B4FDA8}">
-      <dsp:nvSpPr>
-        <dsp:cNvPr id="0" name=""/>
-        <dsp:cNvSpPr/>
-      </dsp:nvSpPr>
-      <dsp:spPr>
-        <a:xfrm>
-          <a:off x="0" y="2442"/>
-          <a:ext cx="6513603" cy="1238008"/>
-        </a:xfrm>
-        <a:prstGeom prst="roundRect">
-          <a:avLst>
-            <a:gd name="adj" fmla="val 10000"/>
-          </a:avLst>
-        </a:prstGeom>
-        <a:solidFill>
-          <a:schemeClr val="bg1">
-            <a:lumMod val="95000"/>
-            <a:hueOff val="0"/>
-            <a:satOff val="0"/>
-            <a:lumOff val="0"/>
-            <a:alphaOff val="0"/>
-          </a:schemeClr>
-        </a:solidFill>
-        <a:ln>
-          <a:noFill/>
-        </a:ln>
-        <a:effectLst/>
-      </dsp:spPr>
-      <dsp:style>
-        <a:lnRef idx="0">
-          <a:scrgbClr r="0" g="0" b="0"/>
-        </a:lnRef>
-        <a:fillRef idx="1">
-          <a:scrgbClr r="0" g="0" b="0"/>
-        </a:fillRef>
-        <a:effectRef idx="2">
-          <a:scrgbClr r="0" g="0" b="0"/>
-        </a:effectRef>
-        <a:fontRef idx="minor"/>
-      </dsp:style>
-    </dsp:sp>
-    <dsp:sp modelId="{D38CFDF5-935C-4794-936A-787015FD5A74}">
-      <dsp:nvSpPr>
-        <dsp:cNvPr id="0" name=""/>
-        <dsp:cNvSpPr/>
-      </dsp:nvSpPr>
-      <dsp:spPr>
-        <a:xfrm>
-          <a:off x="374497" y="280994"/>
-          <a:ext cx="680904" cy="680904"/>
-        </a:xfrm>
-        <a:prstGeom prst="rect">
-          <a:avLst/>
-        </a:prstGeom>
-        <a:blipFill>
-          <a:blip xmlns:r="http://schemas.openxmlformats.org/officeDocument/2006/relationships" r:embed="rId1">
-            <a:extLst>
-              <a:ext uri="{28A0092B-C50C-407E-A947-70E740481C1C}">
-                <a14:useLocalDpi xmlns:a14="http://schemas.microsoft.com/office/drawing/2010/main" val="0"/>
-              </a:ext>
-              <a:ext uri="{96DAC541-7B7A-43D3-8B79-37D633B846F1}">
-                <asvg:svgBlip xmlns:asvg="http://schemas.microsoft.com/office/drawing/2016/SVG/main" r:embed="rId2"/>
-              </a:ext>
-            </a:extLst>
-          </a:blip>
-          <a:stretch>
-            <a:fillRect/>
-          </a:stretch>
-        </a:blipFill>
-        <a:ln>
-          <a:noFill/>
-        </a:ln>
-        <a:effectLst/>
-      </dsp:spPr>
-      <dsp:style>
-        <a:lnRef idx="0">
-          <a:scrgbClr r="0" g="0" b="0"/>
-        </a:lnRef>
-        <a:fillRef idx="3">
-          <a:scrgbClr r="0" g="0" b="0"/>
-        </a:fillRef>
-        <a:effectRef idx="2">
-          <a:scrgbClr r="0" g="0" b="0"/>
-        </a:effectRef>
-        <a:fontRef idx="minor">
-          <a:schemeClr val="lt1"/>
-        </a:fontRef>
-      </dsp:style>
-    </dsp:sp>
-    <dsp:sp modelId="{831750D4-AA00-4C10-8AB0-5DABCFF07204}">
-      <dsp:nvSpPr>
-        <dsp:cNvPr id="0" name=""/>
-        <dsp:cNvSpPr/>
-      </dsp:nvSpPr>
-      <dsp:spPr>
-        <a:xfrm>
-          <a:off x="1429899" y="2442"/>
-          <a:ext cx="5083704" cy="1238008"/>
-        </a:xfrm>
-        <a:prstGeom prst="rect">
-          <a:avLst/>
-        </a:prstGeom>
-        <a:noFill/>
-        <a:ln>
-          <a:noFill/>
-        </a:ln>
-        <a:effectLst/>
-      </dsp:spPr>
-      <dsp:style>
-        <a:lnRef idx="0">
-          <a:scrgbClr r="0" g="0" b="0"/>
-        </a:lnRef>
-        <a:fillRef idx="0">
-          <a:scrgbClr r="0" g="0" b="0"/>
-        </a:fillRef>
-        <a:effectRef idx="0">
-          <a:scrgbClr r="0" g="0" b="0"/>
-        </a:effectRef>
-        <a:fontRef idx="minor"/>
-      </dsp:style>
-      <dsp:txBody>
-        <a:bodyPr spcFirstLastPara="0" vert="horz" wrap="square" lIns="131023" tIns="131023" rIns="131023" bIns="131023" numCol="1" spcCol="1270" anchor="ctr" anchorCtr="0">
-          <a:noAutofit/>
-        </a:bodyPr>
-        <a:lstStyle/>
-        <a:p>
-          <a:pPr marL="0" lvl="0" indent="0" algn="l" defTabSz="977900">
-            <a:lnSpc>
-              <a:spcPct val="100000"/>
-            </a:lnSpc>
-            <a:spcBef>
-              <a:spcPct val="0"/>
-            </a:spcBef>
-            <a:spcAft>
-              <a:spcPct val="35000"/>
-            </a:spcAft>
-            <a:buNone/>
-          </a:pPr>
-          <a:r>
-            <a:rPr lang="en-US" sz="2200" kern="1200" dirty="0"/>
-            <a:t>Clean and explicit separation by logic domain</a:t>
-          </a:r>
-        </a:p>
-      </dsp:txBody>
-      <dsp:txXfrm>
-        <a:off x="1429899" y="2442"/>
-        <a:ext cx="5083704" cy="1238008"/>
-      </dsp:txXfrm>
-    </dsp:sp>
-    <dsp:sp modelId="{EC6DFE2B-B099-4B46-9B21-2E631AB300B9}">
-      <dsp:nvSpPr>
-        <dsp:cNvPr id="0" name=""/>
-        <dsp:cNvSpPr/>
-      </dsp:nvSpPr>
-      <dsp:spPr>
-        <a:xfrm>
-          <a:off x="0" y="1549953"/>
-          <a:ext cx="6513603" cy="1238008"/>
-        </a:xfrm>
-        <a:prstGeom prst="roundRect">
-          <a:avLst>
-            <a:gd name="adj" fmla="val 10000"/>
-          </a:avLst>
-        </a:prstGeom>
-        <a:solidFill>
-          <a:schemeClr val="bg1">
-            <a:lumMod val="95000"/>
-            <a:hueOff val="0"/>
-            <a:satOff val="0"/>
-            <a:lumOff val="0"/>
-            <a:alphaOff val="0"/>
-          </a:schemeClr>
-        </a:solidFill>
-        <a:ln>
-          <a:noFill/>
-        </a:ln>
-        <a:effectLst/>
-      </dsp:spPr>
-      <dsp:style>
-        <a:lnRef idx="0">
-          <a:scrgbClr r="0" g="0" b="0"/>
-        </a:lnRef>
-        <a:fillRef idx="1">
-          <a:scrgbClr r="0" g="0" b="0"/>
-        </a:fillRef>
-        <a:effectRef idx="2">
-          <a:scrgbClr r="0" g="0" b="0"/>
-        </a:effectRef>
-        <a:fontRef idx="minor"/>
-      </dsp:style>
-    </dsp:sp>
-    <dsp:sp modelId="{49E7B3DA-7564-4DCD-8FC9-EFA12F4E3BC6}">
-      <dsp:nvSpPr>
-        <dsp:cNvPr id="0" name=""/>
-        <dsp:cNvSpPr/>
-      </dsp:nvSpPr>
-      <dsp:spPr>
-        <a:xfrm>
-          <a:off x="374497" y="1828505"/>
-          <a:ext cx="680904" cy="680904"/>
-        </a:xfrm>
-        <a:prstGeom prst="rect">
-          <a:avLst/>
-        </a:prstGeom>
-        <a:blipFill rotWithShape="1">
-          <a:blip xmlns:r="http://schemas.openxmlformats.org/officeDocument/2006/relationships" r:embed="rId3">
-            <a:extLst>
-              <a:ext uri="{28A0092B-C50C-407E-A947-70E740481C1C}">
-                <a14:useLocalDpi xmlns:a14="http://schemas.microsoft.com/office/drawing/2010/main" val="0"/>
-              </a:ext>
-              <a:ext uri="{96DAC541-7B7A-43D3-8B79-37D633B846F1}">
-                <asvg:svgBlip xmlns:asvg="http://schemas.microsoft.com/office/drawing/2016/SVG/main" r:embed="rId4"/>
-              </a:ext>
-            </a:extLst>
-          </a:blip>
-          <a:srcRect/>
-          <a:stretch>
-            <a:fillRect/>
-          </a:stretch>
-        </a:blipFill>
-        <a:ln>
-          <a:noFill/>
-        </a:ln>
-        <a:effectLst/>
-      </dsp:spPr>
-      <dsp:style>
-        <a:lnRef idx="0">
-          <a:scrgbClr r="0" g="0" b="0"/>
-        </a:lnRef>
-        <a:fillRef idx="3">
-          <a:scrgbClr r="0" g="0" b="0"/>
-        </a:fillRef>
-        <a:effectRef idx="2">
-          <a:scrgbClr r="0" g="0" b="0"/>
-        </a:effectRef>
-        <a:fontRef idx="minor">
-          <a:schemeClr val="lt1"/>
-        </a:fontRef>
-      </dsp:style>
-    </dsp:sp>
-    <dsp:sp modelId="{0BDEAD8D-7BEF-49ED-9637-521216F75506}">
-      <dsp:nvSpPr>
-        <dsp:cNvPr id="0" name=""/>
-        <dsp:cNvSpPr/>
-      </dsp:nvSpPr>
-      <dsp:spPr>
-        <a:xfrm>
-          <a:off x="1429899" y="1549953"/>
-          <a:ext cx="5083704" cy="1238008"/>
-        </a:xfrm>
-        <a:prstGeom prst="rect">
-          <a:avLst/>
-        </a:prstGeom>
-        <a:noFill/>
-        <a:ln>
-          <a:noFill/>
-        </a:ln>
-        <a:effectLst/>
-      </dsp:spPr>
-      <dsp:style>
-        <a:lnRef idx="0">
-          <a:scrgbClr r="0" g="0" b="0"/>
-        </a:lnRef>
-        <a:fillRef idx="0">
-          <a:scrgbClr r="0" g="0" b="0"/>
-        </a:fillRef>
-        <a:effectRef idx="0">
-          <a:scrgbClr r="0" g="0" b="0"/>
-        </a:effectRef>
-        <a:fontRef idx="minor"/>
-      </dsp:style>
-      <dsp:txBody>
-        <a:bodyPr spcFirstLastPara="0" vert="horz" wrap="square" lIns="131023" tIns="131023" rIns="131023" bIns="131023" numCol="1" spcCol="1270" anchor="ctr" anchorCtr="0">
-          <a:noAutofit/>
-        </a:bodyPr>
-        <a:lstStyle/>
-        <a:p>
-          <a:pPr marL="0" lvl="0" indent="0" algn="l" defTabSz="977900">
-            <a:lnSpc>
-              <a:spcPct val="100000"/>
-            </a:lnSpc>
-            <a:spcBef>
-              <a:spcPct val="0"/>
-            </a:spcBef>
-            <a:spcAft>
-              <a:spcPct val="35000"/>
-            </a:spcAft>
-            <a:buNone/>
-          </a:pPr>
-          <a:r>
-            <a:rPr lang="pt-PT" sz="2200" b="0" i="0" kern="1200" dirty="0" err="1"/>
-            <a:t>Maintainability</a:t>
-          </a:r>
-          <a:endParaRPr lang="en-US" sz="2200" kern="1200" dirty="0"/>
-        </a:p>
-      </dsp:txBody>
-      <dsp:txXfrm>
-        <a:off x="1429899" y="1549953"/>
-        <a:ext cx="5083704" cy="1238008"/>
-      </dsp:txXfrm>
-    </dsp:sp>
-    <dsp:sp modelId="{8E7A460B-78D8-40DA-ACC0-6FCDF6FD9036}">
-      <dsp:nvSpPr>
-        <dsp:cNvPr id="0" name=""/>
-        <dsp:cNvSpPr/>
-      </dsp:nvSpPr>
-      <dsp:spPr>
-        <a:xfrm>
-          <a:off x="0" y="3097464"/>
-          <a:ext cx="6513603" cy="1238008"/>
-        </a:xfrm>
-        <a:prstGeom prst="roundRect">
-          <a:avLst>
-            <a:gd name="adj" fmla="val 10000"/>
-          </a:avLst>
-        </a:prstGeom>
-        <a:solidFill>
-          <a:schemeClr val="bg1">
-            <a:lumMod val="95000"/>
-            <a:hueOff val="0"/>
-            <a:satOff val="0"/>
-            <a:lumOff val="0"/>
-            <a:alphaOff val="0"/>
-          </a:schemeClr>
-        </a:solidFill>
-        <a:ln>
-          <a:noFill/>
-        </a:ln>
-        <a:effectLst/>
-      </dsp:spPr>
-      <dsp:style>
-        <a:lnRef idx="0">
-          <a:scrgbClr r="0" g="0" b="0"/>
-        </a:lnRef>
-        <a:fillRef idx="1">
-          <a:scrgbClr r="0" g="0" b="0"/>
-        </a:fillRef>
-        <a:effectRef idx="2">
-          <a:scrgbClr r="0" g="0" b="0"/>
-        </a:effectRef>
-        <a:fontRef idx="minor"/>
-      </dsp:style>
-    </dsp:sp>
-    <dsp:sp modelId="{7E4FE248-CFB2-4C36-9660-D18262759B8E}">
-      <dsp:nvSpPr>
-        <dsp:cNvPr id="0" name=""/>
-        <dsp:cNvSpPr/>
-      </dsp:nvSpPr>
-      <dsp:spPr>
-        <a:xfrm>
-          <a:off x="374497" y="3376015"/>
-          <a:ext cx="680904" cy="680904"/>
-        </a:xfrm>
-        <a:prstGeom prst="rect">
-          <a:avLst/>
-        </a:prstGeom>
-        <a:blipFill>
-          <a:blip xmlns:r="http://schemas.openxmlformats.org/officeDocument/2006/relationships" r:embed="rId5">
-            <a:extLst>
-              <a:ext uri="{28A0092B-C50C-407E-A947-70E740481C1C}">
-                <a14:useLocalDpi xmlns:a14="http://schemas.microsoft.com/office/drawing/2010/main" val="0"/>
-              </a:ext>
-              <a:ext uri="{96DAC541-7B7A-43D3-8B79-37D633B846F1}">
-                <asvg:svgBlip xmlns:asvg="http://schemas.microsoft.com/office/drawing/2016/SVG/main" r:embed="rId6"/>
-              </a:ext>
-            </a:extLst>
-          </a:blip>
-          <a:stretch>
-            <a:fillRect/>
-          </a:stretch>
-        </a:blipFill>
-        <a:ln>
-          <a:noFill/>
-        </a:ln>
-        <a:effectLst/>
-      </dsp:spPr>
-      <dsp:style>
-        <a:lnRef idx="0">
-          <a:scrgbClr r="0" g="0" b="0"/>
-        </a:lnRef>
-        <a:fillRef idx="3">
-          <a:scrgbClr r="0" g="0" b="0"/>
-        </a:fillRef>
-        <a:effectRef idx="2">
-          <a:scrgbClr r="0" g="0" b="0"/>
-        </a:effectRef>
-        <a:fontRef idx="minor">
-          <a:schemeClr val="lt1"/>
-        </a:fontRef>
-      </dsp:style>
-    </dsp:sp>
-    <dsp:sp modelId="{6AE62410-7894-4DE2-9BA2-B6263B76BEFB}">
-      <dsp:nvSpPr>
-        <dsp:cNvPr id="0" name=""/>
-        <dsp:cNvSpPr/>
-      </dsp:nvSpPr>
-      <dsp:spPr>
-        <a:xfrm>
-          <a:off x="1429899" y="3097464"/>
-          <a:ext cx="5083704" cy="1238008"/>
-        </a:xfrm>
-        <a:prstGeom prst="rect">
-          <a:avLst/>
-        </a:prstGeom>
-        <a:noFill/>
-        <a:ln>
-          <a:noFill/>
-        </a:ln>
-        <a:effectLst/>
-      </dsp:spPr>
-      <dsp:style>
-        <a:lnRef idx="0">
-          <a:scrgbClr r="0" g="0" b="0"/>
-        </a:lnRef>
-        <a:fillRef idx="0">
-          <a:scrgbClr r="0" g="0" b="0"/>
-        </a:fillRef>
-        <a:effectRef idx="0">
-          <a:scrgbClr r="0" g="0" b="0"/>
-        </a:effectRef>
-        <a:fontRef idx="minor"/>
-      </dsp:style>
-      <dsp:txBody>
-        <a:bodyPr spcFirstLastPara="0" vert="horz" wrap="square" lIns="131023" tIns="131023" rIns="131023" bIns="131023" numCol="1" spcCol="1270" anchor="ctr" anchorCtr="0">
-          <a:noAutofit/>
-        </a:bodyPr>
-        <a:lstStyle/>
-        <a:p>
-          <a:pPr marL="0" lvl="0" indent="0" algn="l" defTabSz="977900">
-            <a:lnSpc>
-              <a:spcPct val="100000"/>
-            </a:lnSpc>
-            <a:spcBef>
-              <a:spcPct val="0"/>
-            </a:spcBef>
-            <a:spcAft>
-              <a:spcPct val="35000"/>
-            </a:spcAft>
-            <a:buNone/>
-          </a:pPr>
-          <a:r>
-            <a:rPr lang="en-US" sz="2200" kern="1200" dirty="0"/>
-            <a:t>Readability</a:t>
-          </a:r>
-        </a:p>
-      </dsp:txBody>
-      <dsp:txXfrm>
-        <a:off x="1429899" y="3097464"/>
-        <a:ext cx="5083704" cy="1238008"/>
-      </dsp:txXfrm>
-    </dsp:sp>
-    <dsp:sp modelId="{0BDC2E0F-EA77-4DA1-92E4-3350AE966979}">
-      <dsp:nvSpPr>
-        <dsp:cNvPr id="0" name=""/>
-        <dsp:cNvSpPr/>
-      </dsp:nvSpPr>
-      <dsp:spPr>
-        <a:xfrm>
-          <a:off x="0" y="4644974"/>
-          <a:ext cx="6513603" cy="1238008"/>
-        </a:xfrm>
-        <a:prstGeom prst="roundRect">
-          <a:avLst>
-            <a:gd name="adj" fmla="val 10000"/>
-          </a:avLst>
-        </a:prstGeom>
-        <a:solidFill>
-          <a:schemeClr val="bg1">
-            <a:lumMod val="95000"/>
-            <a:hueOff val="0"/>
-            <a:satOff val="0"/>
-            <a:lumOff val="0"/>
-            <a:alphaOff val="0"/>
-          </a:schemeClr>
-        </a:solidFill>
-        <a:ln>
-          <a:noFill/>
-        </a:ln>
-        <a:effectLst/>
-      </dsp:spPr>
-      <dsp:style>
-        <a:lnRef idx="0">
-          <a:scrgbClr r="0" g="0" b="0"/>
-        </a:lnRef>
-        <a:fillRef idx="1">
-          <a:scrgbClr r="0" g="0" b="0"/>
-        </a:fillRef>
-        <a:effectRef idx="2">
-          <a:scrgbClr r="0" g="0" b="0"/>
-        </a:effectRef>
-        <a:fontRef idx="minor"/>
-      </dsp:style>
-    </dsp:sp>
-    <dsp:sp modelId="{FD57B1ED-3F16-4CDC-8738-F7E34E2E7382}">
-      <dsp:nvSpPr>
-        <dsp:cNvPr id="0" name=""/>
-        <dsp:cNvSpPr/>
-      </dsp:nvSpPr>
-      <dsp:spPr>
-        <a:xfrm>
-          <a:off x="374497" y="4923526"/>
-          <a:ext cx="680904" cy="680904"/>
-        </a:xfrm>
-        <a:prstGeom prst="rect">
-          <a:avLst/>
-        </a:prstGeom>
-        <a:blipFill>
-          <a:blip xmlns:r="http://schemas.openxmlformats.org/officeDocument/2006/relationships" r:embed="rId7">
-            <a:extLst>
-              <a:ext uri="{28A0092B-C50C-407E-A947-70E740481C1C}">
-                <a14:useLocalDpi xmlns:a14="http://schemas.microsoft.com/office/drawing/2010/main" val="0"/>
-              </a:ext>
-              <a:ext uri="{96DAC541-7B7A-43D3-8B79-37D633B846F1}">
-                <asvg:svgBlip xmlns:asvg="http://schemas.microsoft.com/office/drawing/2016/SVG/main" r:embed="rId8"/>
-              </a:ext>
-            </a:extLst>
-          </a:blip>
-          <a:stretch>
-            <a:fillRect/>
-          </a:stretch>
-        </a:blipFill>
-        <a:ln>
-          <a:noFill/>
-        </a:ln>
-        <a:effectLst/>
-      </dsp:spPr>
-      <dsp:style>
-        <a:lnRef idx="0">
-          <a:scrgbClr r="0" g="0" b="0"/>
-        </a:lnRef>
-        <a:fillRef idx="3">
-          <a:scrgbClr r="0" g="0" b="0"/>
-        </a:fillRef>
-        <a:effectRef idx="2">
-          <a:scrgbClr r="0" g="0" b="0"/>
-        </a:effectRef>
-        <a:fontRef idx="minor">
-          <a:schemeClr val="lt1"/>
-        </a:fontRef>
-      </dsp:style>
-    </dsp:sp>
-    <dsp:sp modelId="{482659B5-27F9-44F9-B6BD-C28D2A144D04}">
-      <dsp:nvSpPr>
-        <dsp:cNvPr id="0" name=""/>
-        <dsp:cNvSpPr/>
-      </dsp:nvSpPr>
-      <dsp:spPr>
-        <a:xfrm>
-          <a:off x="1429899" y="4644974"/>
-          <a:ext cx="5083704" cy="1238008"/>
-        </a:xfrm>
-        <a:prstGeom prst="rect">
-          <a:avLst/>
-        </a:prstGeom>
-        <a:noFill/>
-        <a:ln>
-          <a:noFill/>
-        </a:ln>
-        <a:effectLst/>
-      </dsp:spPr>
-      <dsp:style>
-        <a:lnRef idx="0">
-          <a:scrgbClr r="0" g="0" b="0"/>
-        </a:lnRef>
-        <a:fillRef idx="0">
-          <a:scrgbClr r="0" g="0" b="0"/>
-        </a:fillRef>
-        <a:effectRef idx="0">
-          <a:scrgbClr r="0" g="0" b="0"/>
-        </a:effectRef>
-        <a:fontRef idx="minor"/>
-      </dsp:style>
-      <dsp:txBody>
-        <a:bodyPr spcFirstLastPara="0" vert="horz" wrap="square" lIns="131023" tIns="131023" rIns="131023" bIns="131023" numCol="1" spcCol="1270" anchor="ctr" anchorCtr="0">
-          <a:noAutofit/>
-        </a:bodyPr>
-        <a:lstStyle/>
-        <a:p>
-          <a:pPr marL="0" lvl="0" indent="0" algn="l" defTabSz="977900">
-            <a:lnSpc>
-              <a:spcPct val="100000"/>
-            </a:lnSpc>
-            <a:spcBef>
-              <a:spcPct val="0"/>
-            </a:spcBef>
-            <a:spcAft>
-              <a:spcPct val="35000"/>
-            </a:spcAft>
-            <a:buNone/>
-          </a:pPr>
-          <a:r>
-            <a:rPr lang="en-US" sz="2200" kern="1200" dirty="0"/>
-            <a:t>Documentation</a:t>
-          </a:r>
-        </a:p>
-      </dsp:txBody>
-      <dsp:txXfrm>
-        <a:off x="1429899" y="4644974"/>
-        <a:ext cx="5083704" cy="1238008"/>
-      </dsp:txXfrm>
-    </dsp:sp>
-  </dsp:spTree>
-</dsp:drawing>
-</file>
-
-<file path=ppt/diagrams/drawing3.xml><?xml version="1.0" encoding="utf-8"?>
-<dsp:drawing xmlns:dgm="http://schemas.openxmlformats.org/drawingml/2006/diagram" xmlns:dsp="http://schemas.microsoft.com/office/drawing/2008/diagram" xmlns:a="http://schemas.openxmlformats.org/drawingml/2006/main">
-  <dsp:spTree>
-    <dsp:nvGrpSpPr>
-      <dsp:cNvPr id="0" name=""/>
-      <dsp:cNvGrpSpPr/>
-    </dsp:nvGrpSpPr>
-    <dsp:grpSpPr/>
     <dsp:sp modelId="{D5D79F40-3240-4B4D-BB97-25610AEEA43E}">
       <dsp:nvSpPr>
         <dsp:cNvPr id="0" name=""/>
@@ -9605,7 +8991,7 @@
 </dsp:drawing>
 </file>
 
-<file path=ppt/diagrams/drawing4.xml><?xml version="1.0" encoding="utf-8"?>
+<file path=ppt/diagrams/drawing3.xml><?xml version="1.0" encoding="utf-8"?>
 <dsp:drawing xmlns:dgm="http://schemas.openxmlformats.org/drawingml/2006/diagram" xmlns:dsp="http://schemas.microsoft.com/office/drawing/2008/diagram" xmlns:a="http://schemas.openxmlformats.org/drawingml/2006/main">
   <dsp:spTree>
     <dsp:nvGrpSpPr>
@@ -10666,6 +10052,620 @@
       <dsp:txXfrm>
         <a:off x="799588" y="5192638"/>
         <a:ext cx="5714015" cy="692284"/>
+      </dsp:txXfrm>
+    </dsp:sp>
+  </dsp:spTree>
+</dsp:drawing>
+</file>
+
+<file path=ppt/diagrams/drawing4.xml><?xml version="1.0" encoding="utf-8"?>
+<dsp:drawing xmlns:dgm="http://schemas.openxmlformats.org/drawingml/2006/diagram" xmlns:dsp="http://schemas.microsoft.com/office/drawing/2008/diagram" xmlns:a="http://schemas.openxmlformats.org/drawingml/2006/main">
+  <dsp:spTree>
+    <dsp:nvGrpSpPr>
+      <dsp:cNvPr id="0" name=""/>
+      <dsp:cNvGrpSpPr/>
+    </dsp:nvGrpSpPr>
+    <dsp:grpSpPr/>
+    <dsp:sp modelId="{94375141-FD9C-47EE-89E7-B3B227B4FDA8}">
+      <dsp:nvSpPr>
+        <dsp:cNvPr id="0" name=""/>
+        <dsp:cNvSpPr/>
+      </dsp:nvSpPr>
+      <dsp:spPr>
+        <a:xfrm>
+          <a:off x="0" y="2442"/>
+          <a:ext cx="6513603" cy="1238008"/>
+        </a:xfrm>
+        <a:prstGeom prst="roundRect">
+          <a:avLst>
+            <a:gd name="adj" fmla="val 10000"/>
+          </a:avLst>
+        </a:prstGeom>
+        <a:solidFill>
+          <a:schemeClr val="bg1">
+            <a:lumMod val="95000"/>
+            <a:hueOff val="0"/>
+            <a:satOff val="0"/>
+            <a:lumOff val="0"/>
+            <a:alphaOff val="0"/>
+          </a:schemeClr>
+        </a:solidFill>
+        <a:ln>
+          <a:noFill/>
+        </a:ln>
+        <a:effectLst/>
+      </dsp:spPr>
+      <dsp:style>
+        <a:lnRef idx="0">
+          <a:scrgbClr r="0" g="0" b="0"/>
+        </a:lnRef>
+        <a:fillRef idx="1">
+          <a:scrgbClr r="0" g="0" b="0"/>
+        </a:fillRef>
+        <a:effectRef idx="2">
+          <a:scrgbClr r="0" g="0" b="0"/>
+        </a:effectRef>
+        <a:fontRef idx="minor"/>
+      </dsp:style>
+    </dsp:sp>
+    <dsp:sp modelId="{D38CFDF5-935C-4794-936A-787015FD5A74}">
+      <dsp:nvSpPr>
+        <dsp:cNvPr id="0" name=""/>
+        <dsp:cNvSpPr/>
+      </dsp:nvSpPr>
+      <dsp:spPr>
+        <a:xfrm>
+          <a:off x="374497" y="280994"/>
+          <a:ext cx="680904" cy="680904"/>
+        </a:xfrm>
+        <a:prstGeom prst="rect">
+          <a:avLst/>
+        </a:prstGeom>
+        <a:blipFill>
+          <a:blip xmlns:r="http://schemas.openxmlformats.org/officeDocument/2006/relationships" r:embed="rId1">
+            <a:extLst>
+              <a:ext uri="{28A0092B-C50C-407E-A947-70E740481C1C}">
+                <a14:useLocalDpi xmlns:a14="http://schemas.microsoft.com/office/drawing/2010/main" val="0"/>
+              </a:ext>
+              <a:ext uri="{96DAC541-7B7A-43D3-8B79-37D633B846F1}">
+                <asvg:svgBlip xmlns:asvg="http://schemas.microsoft.com/office/drawing/2016/SVG/main" r:embed="rId2"/>
+              </a:ext>
+            </a:extLst>
+          </a:blip>
+          <a:stretch>
+            <a:fillRect/>
+          </a:stretch>
+        </a:blipFill>
+        <a:ln>
+          <a:noFill/>
+        </a:ln>
+        <a:effectLst/>
+      </dsp:spPr>
+      <dsp:style>
+        <a:lnRef idx="0">
+          <a:scrgbClr r="0" g="0" b="0"/>
+        </a:lnRef>
+        <a:fillRef idx="3">
+          <a:scrgbClr r="0" g="0" b="0"/>
+        </a:fillRef>
+        <a:effectRef idx="2">
+          <a:scrgbClr r="0" g="0" b="0"/>
+        </a:effectRef>
+        <a:fontRef idx="minor">
+          <a:schemeClr val="lt1"/>
+        </a:fontRef>
+      </dsp:style>
+    </dsp:sp>
+    <dsp:sp modelId="{831750D4-AA00-4C10-8AB0-5DABCFF07204}">
+      <dsp:nvSpPr>
+        <dsp:cNvPr id="0" name=""/>
+        <dsp:cNvSpPr/>
+      </dsp:nvSpPr>
+      <dsp:spPr>
+        <a:xfrm>
+          <a:off x="1429899" y="2442"/>
+          <a:ext cx="5083704" cy="1238008"/>
+        </a:xfrm>
+        <a:prstGeom prst="rect">
+          <a:avLst/>
+        </a:prstGeom>
+        <a:noFill/>
+        <a:ln>
+          <a:noFill/>
+        </a:ln>
+        <a:effectLst/>
+      </dsp:spPr>
+      <dsp:style>
+        <a:lnRef idx="0">
+          <a:scrgbClr r="0" g="0" b="0"/>
+        </a:lnRef>
+        <a:fillRef idx="0">
+          <a:scrgbClr r="0" g="0" b="0"/>
+        </a:fillRef>
+        <a:effectRef idx="0">
+          <a:scrgbClr r="0" g="0" b="0"/>
+        </a:effectRef>
+        <a:fontRef idx="minor"/>
+      </dsp:style>
+      <dsp:txBody>
+        <a:bodyPr spcFirstLastPara="0" vert="horz" wrap="square" lIns="131023" tIns="131023" rIns="131023" bIns="131023" numCol="1" spcCol="1270" anchor="ctr" anchorCtr="0">
+          <a:noAutofit/>
+        </a:bodyPr>
+        <a:lstStyle/>
+        <a:p>
+          <a:pPr marL="0" lvl="0" indent="0" algn="l" defTabSz="977900">
+            <a:lnSpc>
+              <a:spcPct val="100000"/>
+            </a:lnSpc>
+            <a:spcBef>
+              <a:spcPct val="0"/>
+            </a:spcBef>
+            <a:spcAft>
+              <a:spcPct val="35000"/>
+            </a:spcAft>
+            <a:buNone/>
+          </a:pPr>
+          <a:r>
+            <a:rPr lang="en-US" sz="2200" kern="1200" dirty="0"/>
+            <a:t>Clean and explicit separation by logic domain</a:t>
+          </a:r>
+        </a:p>
+      </dsp:txBody>
+      <dsp:txXfrm>
+        <a:off x="1429899" y="2442"/>
+        <a:ext cx="5083704" cy="1238008"/>
+      </dsp:txXfrm>
+    </dsp:sp>
+    <dsp:sp modelId="{EC6DFE2B-B099-4B46-9B21-2E631AB300B9}">
+      <dsp:nvSpPr>
+        <dsp:cNvPr id="0" name=""/>
+        <dsp:cNvSpPr/>
+      </dsp:nvSpPr>
+      <dsp:spPr>
+        <a:xfrm>
+          <a:off x="0" y="1549953"/>
+          <a:ext cx="6513603" cy="1238008"/>
+        </a:xfrm>
+        <a:prstGeom prst="roundRect">
+          <a:avLst>
+            <a:gd name="adj" fmla="val 10000"/>
+          </a:avLst>
+        </a:prstGeom>
+        <a:solidFill>
+          <a:schemeClr val="bg1">
+            <a:lumMod val="95000"/>
+            <a:hueOff val="0"/>
+            <a:satOff val="0"/>
+            <a:lumOff val="0"/>
+            <a:alphaOff val="0"/>
+          </a:schemeClr>
+        </a:solidFill>
+        <a:ln>
+          <a:noFill/>
+        </a:ln>
+        <a:effectLst/>
+      </dsp:spPr>
+      <dsp:style>
+        <a:lnRef idx="0">
+          <a:scrgbClr r="0" g="0" b="0"/>
+        </a:lnRef>
+        <a:fillRef idx="1">
+          <a:scrgbClr r="0" g="0" b="0"/>
+        </a:fillRef>
+        <a:effectRef idx="2">
+          <a:scrgbClr r="0" g="0" b="0"/>
+        </a:effectRef>
+        <a:fontRef idx="minor"/>
+      </dsp:style>
+    </dsp:sp>
+    <dsp:sp modelId="{49E7B3DA-7564-4DCD-8FC9-EFA12F4E3BC6}">
+      <dsp:nvSpPr>
+        <dsp:cNvPr id="0" name=""/>
+        <dsp:cNvSpPr/>
+      </dsp:nvSpPr>
+      <dsp:spPr>
+        <a:xfrm>
+          <a:off x="374497" y="1828505"/>
+          <a:ext cx="680904" cy="680904"/>
+        </a:xfrm>
+        <a:prstGeom prst="rect">
+          <a:avLst/>
+        </a:prstGeom>
+        <a:blipFill rotWithShape="1">
+          <a:blip xmlns:r="http://schemas.openxmlformats.org/officeDocument/2006/relationships" r:embed="rId3">
+            <a:extLst>
+              <a:ext uri="{28A0092B-C50C-407E-A947-70E740481C1C}">
+                <a14:useLocalDpi xmlns:a14="http://schemas.microsoft.com/office/drawing/2010/main" val="0"/>
+              </a:ext>
+              <a:ext uri="{96DAC541-7B7A-43D3-8B79-37D633B846F1}">
+                <asvg:svgBlip xmlns:asvg="http://schemas.microsoft.com/office/drawing/2016/SVG/main" r:embed="rId4"/>
+              </a:ext>
+            </a:extLst>
+          </a:blip>
+          <a:srcRect/>
+          <a:stretch>
+            <a:fillRect/>
+          </a:stretch>
+        </a:blipFill>
+        <a:ln>
+          <a:noFill/>
+        </a:ln>
+        <a:effectLst/>
+      </dsp:spPr>
+      <dsp:style>
+        <a:lnRef idx="0">
+          <a:scrgbClr r="0" g="0" b="0"/>
+        </a:lnRef>
+        <a:fillRef idx="3">
+          <a:scrgbClr r="0" g="0" b="0"/>
+        </a:fillRef>
+        <a:effectRef idx="2">
+          <a:scrgbClr r="0" g="0" b="0"/>
+        </a:effectRef>
+        <a:fontRef idx="minor">
+          <a:schemeClr val="lt1"/>
+        </a:fontRef>
+      </dsp:style>
+    </dsp:sp>
+    <dsp:sp modelId="{0BDEAD8D-7BEF-49ED-9637-521216F75506}">
+      <dsp:nvSpPr>
+        <dsp:cNvPr id="0" name=""/>
+        <dsp:cNvSpPr/>
+      </dsp:nvSpPr>
+      <dsp:spPr>
+        <a:xfrm>
+          <a:off x="1429899" y="1549953"/>
+          <a:ext cx="5083704" cy="1238008"/>
+        </a:xfrm>
+        <a:prstGeom prst="rect">
+          <a:avLst/>
+        </a:prstGeom>
+        <a:noFill/>
+        <a:ln>
+          <a:noFill/>
+        </a:ln>
+        <a:effectLst/>
+      </dsp:spPr>
+      <dsp:style>
+        <a:lnRef idx="0">
+          <a:scrgbClr r="0" g="0" b="0"/>
+        </a:lnRef>
+        <a:fillRef idx="0">
+          <a:scrgbClr r="0" g="0" b="0"/>
+        </a:fillRef>
+        <a:effectRef idx="0">
+          <a:scrgbClr r="0" g="0" b="0"/>
+        </a:effectRef>
+        <a:fontRef idx="minor"/>
+      </dsp:style>
+      <dsp:txBody>
+        <a:bodyPr spcFirstLastPara="0" vert="horz" wrap="square" lIns="131023" tIns="131023" rIns="131023" bIns="131023" numCol="1" spcCol="1270" anchor="ctr" anchorCtr="0">
+          <a:noAutofit/>
+        </a:bodyPr>
+        <a:lstStyle/>
+        <a:p>
+          <a:pPr marL="0" lvl="0" indent="0" algn="l" defTabSz="977900">
+            <a:lnSpc>
+              <a:spcPct val="100000"/>
+            </a:lnSpc>
+            <a:spcBef>
+              <a:spcPct val="0"/>
+            </a:spcBef>
+            <a:spcAft>
+              <a:spcPct val="35000"/>
+            </a:spcAft>
+            <a:buNone/>
+          </a:pPr>
+          <a:r>
+            <a:rPr lang="pt-PT" sz="2200" b="0" i="0" kern="1200" dirty="0" err="1"/>
+            <a:t>Maintainability</a:t>
+          </a:r>
+          <a:endParaRPr lang="en-US" sz="2200" kern="1200" dirty="0"/>
+        </a:p>
+      </dsp:txBody>
+      <dsp:txXfrm>
+        <a:off x="1429899" y="1549953"/>
+        <a:ext cx="5083704" cy="1238008"/>
+      </dsp:txXfrm>
+    </dsp:sp>
+    <dsp:sp modelId="{8E7A460B-78D8-40DA-ACC0-6FCDF6FD9036}">
+      <dsp:nvSpPr>
+        <dsp:cNvPr id="0" name=""/>
+        <dsp:cNvSpPr/>
+      </dsp:nvSpPr>
+      <dsp:spPr>
+        <a:xfrm>
+          <a:off x="0" y="3097464"/>
+          <a:ext cx="6513603" cy="1238008"/>
+        </a:xfrm>
+        <a:prstGeom prst="roundRect">
+          <a:avLst>
+            <a:gd name="adj" fmla="val 10000"/>
+          </a:avLst>
+        </a:prstGeom>
+        <a:solidFill>
+          <a:schemeClr val="bg1">
+            <a:lumMod val="95000"/>
+            <a:hueOff val="0"/>
+            <a:satOff val="0"/>
+            <a:lumOff val="0"/>
+            <a:alphaOff val="0"/>
+          </a:schemeClr>
+        </a:solidFill>
+        <a:ln>
+          <a:noFill/>
+        </a:ln>
+        <a:effectLst/>
+      </dsp:spPr>
+      <dsp:style>
+        <a:lnRef idx="0">
+          <a:scrgbClr r="0" g="0" b="0"/>
+        </a:lnRef>
+        <a:fillRef idx="1">
+          <a:scrgbClr r="0" g="0" b="0"/>
+        </a:fillRef>
+        <a:effectRef idx="2">
+          <a:scrgbClr r="0" g="0" b="0"/>
+        </a:effectRef>
+        <a:fontRef idx="minor"/>
+      </dsp:style>
+    </dsp:sp>
+    <dsp:sp modelId="{7E4FE248-CFB2-4C36-9660-D18262759B8E}">
+      <dsp:nvSpPr>
+        <dsp:cNvPr id="0" name=""/>
+        <dsp:cNvSpPr/>
+      </dsp:nvSpPr>
+      <dsp:spPr>
+        <a:xfrm>
+          <a:off x="374497" y="3376015"/>
+          <a:ext cx="680904" cy="680904"/>
+        </a:xfrm>
+        <a:prstGeom prst="rect">
+          <a:avLst/>
+        </a:prstGeom>
+        <a:blipFill>
+          <a:blip xmlns:r="http://schemas.openxmlformats.org/officeDocument/2006/relationships" r:embed="rId5">
+            <a:extLst>
+              <a:ext uri="{28A0092B-C50C-407E-A947-70E740481C1C}">
+                <a14:useLocalDpi xmlns:a14="http://schemas.microsoft.com/office/drawing/2010/main" val="0"/>
+              </a:ext>
+              <a:ext uri="{96DAC541-7B7A-43D3-8B79-37D633B846F1}">
+                <asvg:svgBlip xmlns:asvg="http://schemas.microsoft.com/office/drawing/2016/SVG/main" r:embed="rId6"/>
+              </a:ext>
+            </a:extLst>
+          </a:blip>
+          <a:stretch>
+            <a:fillRect/>
+          </a:stretch>
+        </a:blipFill>
+        <a:ln>
+          <a:noFill/>
+        </a:ln>
+        <a:effectLst/>
+      </dsp:spPr>
+      <dsp:style>
+        <a:lnRef idx="0">
+          <a:scrgbClr r="0" g="0" b="0"/>
+        </a:lnRef>
+        <a:fillRef idx="3">
+          <a:scrgbClr r="0" g="0" b="0"/>
+        </a:fillRef>
+        <a:effectRef idx="2">
+          <a:scrgbClr r="0" g="0" b="0"/>
+        </a:effectRef>
+        <a:fontRef idx="minor">
+          <a:schemeClr val="lt1"/>
+        </a:fontRef>
+      </dsp:style>
+    </dsp:sp>
+    <dsp:sp modelId="{6AE62410-7894-4DE2-9BA2-B6263B76BEFB}">
+      <dsp:nvSpPr>
+        <dsp:cNvPr id="0" name=""/>
+        <dsp:cNvSpPr/>
+      </dsp:nvSpPr>
+      <dsp:spPr>
+        <a:xfrm>
+          <a:off x="1429899" y="3097464"/>
+          <a:ext cx="5083704" cy="1238008"/>
+        </a:xfrm>
+        <a:prstGeom prst="rect">
+          <a:avLst/>
+        </a:prstGeom>
+        <a:noFill/>
+        <a:ln>
+          <a:noFill/>
+        </a:ln>
+        <a:effectLst/>
+      </dsp:spPr>
+      <dsp:style>
+        <a:lnRef idx="0">
+          <a:scrgbClr r="0" g="0" b="0"/>
+        </a:lnRef>
+        <a:fillRef idx="0">
+          <a:scrgbClr r="0" g="0" b="0"/>
+        </a:fillRef>
+        <a:effectRef idx="0">
+          <a:scrgbClr r="0" g="0" b="0"/>
+        </a:effectRef>
+        <a:fontRef idx="minor"/>
+      </dsp:style>
+      <dsp:txBody>
+        <a:bodyPr spcFirstLastPara="0" vert="horz" wrap="square" lIns="131023" tIns="131023" rIns="131023" bIns="131023" numCol="1" spcCol="1270" anchor="ctr" anchorCtr="0">
+          <a:noAutofit/>
+        </a:bodyPr>
+        <a:lstStyle/>
+        <a:p>
+          <a:pPr marL="0" lvl="0" indent="0" algn="l" defTabSz="977900">
+            <a:lnSpc>
+              <a:spcPct val="100000"/>
+            </a:lnSpc>
+            <a:spcBef>
+              <a:spcPct val="0"/>
+            </a:spcBef>
+            <a:spcAft>
+              <a:spcPct val="35000"/>
+            </a:spcAft>
+            <a:buNone/>
+          </a:pPr>
+          <a:r>
+            <a:rPr lang="en-US" sz="2200" kern="1200" dirty="0"/>
+            <a:t>Readability</a:t>
+          </a:r>
+        </a:p>
+      </dsp:txBody>
+      <dsp:txXfrm>
+        <a:off x="1429899" y="3097464"/>
+        <a:ext cx="5083704" cy="1238008"/>
+      </dsp:txXfrm>
+    </dsp:sp>
+    <dsp:sp modelId="{0BDC2E0F-EA77-4DA1-92E4-3350AE966979}">
+      <dsp:nvSpPr>
+        <dsp:cNvPr id="0" name=""/>
+        <dsp:cNvSpPr/>
+      </dsp:nvSpPr>
+      <dsp:spPr>
+        <a:xfrm>
+          <a:off x="0" y="4644974"/>
+          <a:ext cx="6513603" cy="1238008"/>
+        </a:xfrm>
+        <a:prstGeom prst="roundRect">
+          <a:avLst>
+            <a:gd name="adj" fmla="val 10000"/>
+          </a:avLst>
+        </a:prstGeom>
+        <a:solidFill>
+          <a:schemeClr val="bg1">
+            <a:lumMod val="95000"/>
+            <a:hueOff val="0"/>
+            <a:satOff val="0"/>
+            <a:lumOff val="0"/>
+            <a:alphaOff val="0"/>
+          </a:schemeClr>
+        </a:solidFill>
+        <a:ln>
+          <a:noFill/>
+        </a:ln>
+        <a:effectLst/>
+      </dsp:spPr>
+      <dsp:style>
+        <a:lnRef idx="0">
+          <a:scrgbClr r="0" g="0" b="0"/>
+        </a:lnRef>
+        <a:fillRef idx="1">
+          <a:scrgbClr r="0" g="0" b="0"/>
+        </a:fillRef>
+        <a:effectRef idx="2">
+          <a:scrgbClr r="0" g="0" b="0"/>
+        </a:effectRef>
+        <a:fontRef idx="minor"/>
+      </dsp:style>
+    </dsp:sp>
+    <dsp:sp modelId="{FD57B1ED-3F16-4CDC-8738-F7E34E2E7382}">
+      <dsp:nvSpPr>
+        <dsp:cNvPr id="0" name=""/>
+        <dsp:cNvSpPr/>
+      </dsp:nvSpPr>
+      <dsp:spPr>
+        <a:xfrm>
+          <a:off x="374497" y="4923526"/>
+          <a:ext cx="680904" cy="680904"/>
+        </a:xfrm>
+        <a:prstGeom prst="rect">
+          <a:avLst/>
+        </a:prstGeom>
+        <a:blipFill>
+          <a:blip xmlns:r="http://schemas.openxmlformats.org/officeDocument/2006/relationships" r:embed="rId7">
+            <a:extLst>
+              <a:ext uri="{28A0092B-C50C-407E-A947-70E740481C1C}">
+                <a14:useLocalDpi xmlns:a14="http://schemas.microsoft.com/office/drawing/2010/main" val="0"/>
+              </a:ext>
+              <a:ext uri="{96DAC541-7B7A-43D3-8B79-37D633B846F1}">
+                <asvg:svgBlip xmlns:asvg="http://schemas.microsoft.com/office/drawing/2016/SVG/main" r:embed="rId8"/>
+              </a:ext>
+            </a:extLst>
+          </a:blip>
+          <a:stretch>
+            <a:fillRect/>
+          </a:stretch>
+        </a:blipFill>
+        <a:ln>
+          <a:noFill/>
+        </a:ln>
+        <a:effectLst/>
+      </dsp:spPr>
+      <dsp:style>
+        <a:lnRef idx="0">
+          <a:scrgbClr r="0" g="0" b="0"/>
+        </a:lnRef>
+        <a:fillRef idx="3">
+          <a:scrgbClr r="0" g="0" b="0"/>
+        </a:fillRef>
+        <a:effectRef idx="2">
+          <a:scrgbClr r="0" g="0" b="0"/>
+        </a:effectRef>
+        <a:fontRef idx="minor">
+          <a:schemeClr val="lt1"/>
+        </a:fontRef>
+      </dsp:style>
+    </dsp:sp>
+    <dsp:sp modelId="{482659B5-27F9-44F9-B6BD-C28D2A144D04}">
+      <dsp:nvSpPr>
+        <dsp:cNvPr id="0" name=""/>
+        <dsp:cNvSpPr/>
+      </dsp:nvSpPr>
+      <dsp:spPr>
+        <a:xfrm>
+          <a:off x="1429899" y="4644974"/>
+          <a:ext cx="5083704" cy="1238008"/>
+        </a:xfrm>
+        <a:prstGeom prst="rect">
+          <a:avLst/>
+        </a:prstGeom>
+        <a:noFill/>
+        <a:ln>
+          <a:noFill/>
+        </a:ln>
+        <a:effectLst/>
+      </dsp:spPr>
+      <dsp:style>
+        <a:lnRef idx="0">
+          <a:scrgbClr r="0" g="0" b="0"/>
+        </a:lnRef>
+        <a:fillRef idx="0">
+          <a:scrgbClr r="0" g="0" b="0"/>
+        </a:fillRef>
+        <a:effectRef idx="0">
+          <a:scrgbClr r="0" g="0" b="0"/>
+        </a:effectRef>
+        <a:fontRef idx="minor"/>
+      </dsp:style>
+      <dsp:txBody>
+        <a:bodyPr spcFirstLastPara="0" vert="horz" wrap="square" lIns="131023" tIns="131023" rIns="131023" bIns="131023" numCol="1" spcCol="1270" anchor="ctr" anchorCtr="0">
+          <a:noAutofit/>
+        </a:bodyPr>
+        <a:lstStyle/>
+        <a:p>
+          <a:pPr marL="0" lvl="0" indent="0" algn="l" defTabSz="977900">
+            <a:lnSpc>
+              <a:spcPct val="100000"/>
+            </a:lnSpc>
+            <a:spcBef>
+              <a:spcPct val="0"/>
+            </a:spcBef>
+            <a:spcAft>
+              <a:spcPct val="35000"/>
+            </a:spcAft>
+            <a:buNone/>
+          </a:pPr>
+          <a:r>
+            <a:rPr lang="en-US" sz="2200" kern="1200" dirty="0"/>
+            <a:t>Documentation</a:t>
+          </a:r>
+        </a:p>
+      </dsp:txBody>
+      <dsp:txXfrm>
+        <a:off x="1429899" y="4644974"/>
+        <a:ext cx="5083704" cy="1238008"/>
       </dsp:txXfrm>
     </dsp:sp>
   </dsp:spTree>
@@ -19310,10 +19310,10 @@
       </p:grpSpPr>
       <p:pic>
         <p:nvPicPr>
-          <p:cNvPr id="4" name="Picture 3">
+          <p:cNvPr id="5" name="Picture 4">
             <a:extLst>
               <a:ext uri="{FF2B5EF4-FFF2-40B4-BE49-F238E27FC236}">
-                <a16:creationId xmlns:a16="http://schemas.microsoft.com/office/drawing/2014/main" id="{CAB0B4C3-D283-4895-ADAA-8382B8A04A51}"/>
+                <a16:creationId xmlns:a16="http://schemas.microsoft.com/office/drawing/2014/main" id="{BB614480-6899-4177-A064-51F394889B0F}"/>
               </a:ext>
             </a:extLst>
           </p:cNvPr>
@@ -19330,8 +19330,8 @@
         </p:blipFill>
         <p:spPr>
           <a:xfrm>
-            <a:off x="7311684" y="468483"/>
-            <a:ext cx="4223091" cy="5921033"/>
+            <a:off x="6515100" y="295275"/>
+            <a:ext cx="5562600" cy="6267450"/>
           </a:xfrm>
           <a:prstGeom prst="rect">
             <a:avLst/>
@@ -19340,10 +19340,502 @@
       </p:pic>
       <p:sp>
         <p:nvSpPr>
-          <p:cNvPr id="5" name="Rectangle 4">
+          <p:cNvPr id="6" name="Rectangle 1">
             <a:extLst>
               <a:ext uri="{FF2B5EF4-FFF2-40B4-BE49-F238E27FC236}">
-                <a16:creationId xmlns:a16="http://schemas.microsoft.com/office/drawing/2014/main" id="{46309C1B-F337-49C0-9FF5-4DBD46BEE6DD}"/>
+                <a16:creationId xmlns:a16="http://schemas.microsoft.com/office/drawing/2014/main" id="{F4CD3A54-259C-4AAB-97BE-E34FAB448986}"/>
+              </a:ext>
+            </a:extLst>
+          </p:cNvPr>
+          <p:cNvSpPr>
+            <a:spLocks noChangeArrowheads="1"/>
+          </p:cNvSpPr>
+          <p:nvPr/>
+        </p:nvSpPr>
+        <p:spPr bwMode="auto">
+          <a:xfrm>
+            <a:off x="1000125" y="2831812"/>
+            <a:ext cx="4286250" cy="597188"/>
+          </a:xfrm>
+          <a:prstGeom prst="rect">
+            <a:avLst/>
+          </a:prstGeom>
+          <a:solidFill>
+            <a:srgbClr val="FFFFFF"/>
+          </a:solidFill>
+          <a:ln>
+            <a:noFill/>
+          </a:ln>
+          <a:effectLst/>
+          <a:extLst>
+            <a:ext uri="{91240B29-F687-4F45-9708-019B960494DF}">
+              <a14:hiddenLine xmlns:a14="http://schemas.microsoft.com/office/drawing/2010/main" w="9525">
+                <a:solidFill>
+                  <a:schemeClr val="tx1"/>
+                </a:solidFill>
+                <a:miter lim="800000"/>
+                <a:headEnd/>
+                <a:tailEnd/>
+              </a14:hiddenLine>
+            </a:ext>
+            <a:ext uri="{AF507438-7753-43E0-B8FC-AC1667EBCBE1}">
+              <a14:hiddenEffects xmlns:a14="http://schemas.microsoft.com/office/drawing/2010/main">
+                <a:effectLst>
+                  <a:outerShdw dist="35921" dir="2700000" algn="ctr" rotWithShape="0">
+                    <a:schemeClr val="bg2"/>
+                  </a:outerShdw>
+                </a:effectLst>
+              </a14:hiddenEffects>
+            </a:ext>
+          </a:extLst>
+        </p:spPr>
+        <p:txBody>
+          <a:bodyPr vert="horz" wrap="square" lIns="0" tIns="0" rIns="0" bIns="0" numCol="1" anchor="ctr" anchorCtr="0" compatLnSpc="1">
+            <a:prstTxWarp prst="textNoShape">
+              <a:avLst/>
+            </a:prstTxWarp>
+            <a:spAutoFit/>
+          </a:bodyPr>
+          <a:lstStyle>
+            <a:lvl1pPr eaLnBrk="0" fontAlgn="base" hangingPunct="0">
+              <a:spcBef>
+                <a:spcPct val="0"/>
+              </a:spcBef>
+              <a:spcAft>
+                <a:spcPct val="0"/>
+              </a:spcAft>
+              <a:defRPr>
+                <a:solidFill>
+                  <a:schemeClr val="tx1"/>
+                </a:solidFill>
+                <a:latin typeface="Arial" panose="020B0604020202020204" pitchFamily="34" charset="0"/>
+              </a:defRPr>
+            </a:lvl1pPr>
+            <a:lvl2pPr eaLnBrk="0" fontAlgn="base" hangingPunct="0">
+              <a:spcBef>
+                <a:spcPct val="0"/>
+              </a:spcBef>
+              <a:spcAft>
+                <a:spcPct val="0"/>
+              </a:spcAft>
+              <a:defRPr>
+                <a:solidFill>
+                  <a:schemeClr val="tx1"/>
+                </a:solidFill>
+                <a:latin typeface="Arial" panose="020B0604020202020204" pitchFamily="34" charset="0"/>
+              </a:defRPr>
+            </a:lvl2pPr>
+            <a:lvl3pPr eaLnBrk="0" fontAlgn="base" hangingPunct="0">
+              <a:spcBef>
+                <a:spcPct val="0"/>
+              </a:spcBef>
+              <a:spcAft>
+                <a:spcPct val="0"/>
+              </a:spcAft>
+              <a:defRPr>
+                <a:solidFill>
+                  <a:schemeClr val="tx1"/>
+                </a:solidFill>
+                <a:latin typeface="Arial" panose="020B0604020202020204" pitchFamily="34" charset="0"/>
+              </a:defRPr>
+            </a:lvl3pPr>
+            <a:lvl4pPr eaLnBrk="0" fontAlgn="base" hangingPunct="0">
+              <a:spcBef>
+                <a:spcPct val="0"/>
+              </a:spcBef>
+              <a:spcAft>
+                <a:spcPct val="0"/>
+              </a:spcAft>
+              <a:defRPr>
+                <a:solidFill>
+                  <a:schemeClr val="tx1"/>
+                </a:solidFill>
+                <a:latin typeface="Arial" panose="020B0604020202020204" pitchFamily="34" charset="0"/>
+              </a:defRPr>
+            </a:lvl4pPr>
+            <a:lvl5pPr eaLnBrk="0" fontAlgn="base" hangingPunct="0">
+              <a:spcBef>
+                <a:spcPct val="0"/>
+              </a:spcBef>
+              <a:spcAft>
+                <a:spcPct val="0"/>
+              </a:spcAft>
+              <a:defRPr>
+                <a:solidFill>
+                  <a:schemeClr val="tx1"/>
+                </a:solidFill>
+                <a:latin typeface="Arial" panose="020B0604020202020204" pitchFamily="34" charset="0"/>
+              </a:defRPr>
+            </a:lvl5pPr>
+            <a:lvl6pPr eaLnBrk="0" fontAlgn="base" hangingPunct="0">
+              <a:spcBef>
+                <a:spcPct val="0"/>
+              </a:spcBef>
+              <a:spcAft>
+                <a:spcPct val="0"/>
+              </a:spcAft>
+              <a:defRPr>
+                <a:solidFill>
+                  <a:schemeClr val="tx1"/>
+                </a:solidFill>
+                <a:latin typeface="Arial" panose="020B0604020202020204" pitchFamily="34" charset="0"/>
+              </a:defRPr>
+            </a:lvl6pPr>
+            <a:lvl7pPr eaLnBrk="0" fontAlgn="base" hangingPunct="0">
+              <a:spcBef>
+                <a:spcPct val="0"/>
+              </a:spcBef>
+              <a:spcAft>
+                <a:spcPct val="0"/>
+              </a:spcAft>
+              <a:defRPr>
+                <a:solidFill>
+                  <a:schemeClr val="tx1"/>
+                </a:solidFill>
+                <a:latin typeface="Arial" panose="020B0604020202020204" pitchFamily="34" charset="0"/>
+              </a:defRPr>
+            </a:lvl7pPr>
+            <a:lvl8pPr eaLnBrk="0" fontAlgn="base" hangingPunct="0">
+              <a:spcBef>
+                <a:spcPct val="0"/>
+              </a:spcBef>
+              <a:spcAft>
+                <a:spcPct val="0"/>
+              </a:spcAft>
+              <a:defRPr>
+                <a:solidFill>
+                  <a:schemeClr val="tx1"/>
+                </a:solidFill>
+                <a:latin typeface="Arial" panose="020B0604020202020204" pitchFamily="34" charset="0"/>
+              </a:defRPr>
+            </a:lvl8pPr>
+            <a:lvl9pPr eaLnBrk="0" fontAlgn="base" hangingPunct="0">
+              <a:spcBef>
+                <a:spcPct val="0"/>
+              </a:spcBef>
+              <a:spcAft>
+                <a:spcPct val="0"/>
+              </a:spcAft>
+              <a:defRPr>
+                <a:solidFill>
+                  <a:schemeClr val="tx1"/>
+                </a:solidFill>
+                <a:latin typeface="Arial" panose="020B0604020202020204" pitchFamily="34" charset="0"/>
+              </a:defRPr>
+            </a:lvl9pPr>
+          </a:lstStyle>
+          <a:p>
+            <a:pPr marL="0" marR="0" lvl="0" indent="0" algn="ctr" defTabSz="914400" rtl="0" eaLnBrk="0" fontAlgn="base" latinLnBrk="0" hangingPunct="0">
+              <a:lnSpc>
+                <a:spcPct val="100000"/>
+              </a:lnSpc>
+              <a:spcBef>
+                <a:spcPct val="0"/>
+              </a:spcBef>
+              <a:spcAft>
+                <a:spcPct val="0"/>
+              </a:spcAft>
+              <a:buClrTx/>
+              <a:buSzTx/>
+              <a:buFontTx/>
+              <a:buNone/>
+              <a:tabLst/>
+            </a:pPr>
+            <a:r>
+              <a:rPr kumimoji="0" lang="pt-PT" altLang="pt-PT" sz="1300" b="0" i="1" u="none" strike="noStrike" cap="none" normalizeH="0" baseline="0" dirty="0">
+                <a:ln>
+                  <a:noFill/>
+                </a:ln>
+                <a:solidFill>
+                  <a:srgbClr val="555555"/>
+                </a:solidFill>
+                <a:effectLst/>
+                <a:latin typeface="Georgia" panose="02040502050405020303" pitchFamily="18" charset="0"/>
+              </a:rPr>
+              <a:t>People </a:t>
+            </a:r>
+            <a:r>
+              <a:rPr kumimoji="0" lang="pt-PT" altLang="pt-PT" sz="1300" b="0" i="1" u="none" strike="noStrike" cap="none" normalizeH="0" baseline="0" dirty="0" err="1">
+                <a:ln>
+                  <a:noFill/>
+                </a:ln>
+                <a:solidFill>
+                  <a:srgbClr val="555555"/>
+                </a:solidFill>
+                <a:effectLst/>
+                <a:latin typeface="Georgia" panose="02040502050405020303" pitchFamily="18" charset="0"/>
+              </a:rPr>
+              <a:t>who</a:t>
+            </a:r>
+            <a:r>
+              <a:rPr kumimoji="0" lang="pt-PT" altLang="pt-PT" sz="1300" b="0" i="1" u="none" strike="noStrike" cap="none" normalizeH="0" baseline="0" dirty="0">
+                <a:ln>
+                  <a:noFill/>
+                </a:ln>
+                <a:solidFill>
+                  <a:srgbClr val="555555"/>
+                </a:solidFill>
+                <a:effectLst/>
+                <a:latin typeface="Georgia" panose="02040502050405020303" pitchFamily="18" charset="0"/>
+              </a:rPr>
+              <a:t> are </a:t>
+            </a:r>
+            <a:r>
+              <a:rPr kumimoji="0" lang="pt-PT" altLang="pt-PT" sz="1300" b="0" i="1" u="none" strike="noStrike" cap="none" normalizeH="0" baseline="0" dirty="0" err="1">
+                <a:ln>
+                  <a:noFill/>
+                </a:ln>
+                <a:solidFill>
+                  <a:srgbClr val="555555"/>
+                </a:solidFill>
+                <a:effectLst/>
+                <a:latin typeface="Georgia" panose="02040502050405020303" pitchFamily="18" charset="0"/>
+              </a:rPr>
+              <a:t>really</a:t>
+            </a:r>
+            <a:r>
+              <a:rPr kumimoji="0" lang="pt-PT" altLang="pt-PT" sz="1300" b="0" i="1" u="none" strike="noStrike" cap="none" normalizeH="0" baseline="0" dirty="0">
+                <a:ln>
+                  <a:noFill/>
+                </a:ln>
+                <a:solidFill>
+                  <a:srgbClr val="555555"/>
+                </a:solidFill>
+                <a:effectLst/>
+                <a:latin typeface="Georgia" panose="02040502050405020303" pitchFamily="18" charset="0"/>
+              </a:rPr>
+              <a:t> </a:t>
+            </a:r>
+            <a:r>
+              <a:rPr kumimoji="0" lang="pt-PT" altLang="pt-PT" sz="1300" b="0" i="1" u="none" strike="noStrike" cap="none" normalizeH="0" baseline="0" dirty="0" err="1">
+                <a:ln>
+                  <a:noFill/>
+                </a:ln>
+                <a:solidFill>
+                  <a:srgbClr val="555555"/>
+                </a:solidFill>
+                <a:effectLst/>
+                <a:latin typeface="Georgia" panose="02040502050405020303" pitchFamily="18" charset="0"/>
+              </a:rPr>
+              <a:t>serious</a:t>
+            </a:r>
+            <a:r>
+              <a:rPr kumimoji="0" lang="pt-PT" altLang="pt-PT" sz="1300" b="0" i="1" u="none" strike="noStrike" cap="none" normalizeH="0" baseline="0" dirty="0">
+                <a:ln>
+                  <a:noFill/>
+                </a:ln>
+                <a:solidFill>
+                  <a:srgbClr val="555555"/>
+                </a:solidFill>
+                <a:effectLst/>
+                <a:latin typeface="Georgia" panose="02040502050405020303" pitchFamily="18" charset="0"/>
+              </a:rPr>
+              <a:t> </a:t>
+            </a:r>
+            <a:r>
+              <a:rPr kumimoji="0" lang="pt-PT" altLang="pt-PT" sz="1300" b="0" i="1" u="none" strike="noStrike" cap="none" normalizeH="0" baseline="0" dirty="0" err="1">
+                <a:ln>
+                  <a:noFill/>
+                </a:ln>
+                <a:solidFill>
+                  <a:srgbClr val="555555"/>
+                </a:solidFill>
+                <a:effectLst/>
+                <a:latin typeface="Georgia" panose="02040502050405020303" pitchFamily="18" charset="0"/>
+              </a:rPr>
+              <a:t>about</a:t>
+            </a:r>
+            <a:r>
+              <a:rPr kumimoji="0" lang="pt-PT" altLang="pt-PT" sz="1300" b="0" i="1" u="none" strike="noStrike" cap="none" normalizeH="0" baseline="0" dirty="0">
+                <a:ln>
+                  <a:noFill/>
+                </a:ln>
+                <a:solidFill>
+                  <a:srgbClr val="555555"/>
+                </a:solidFill>
+                <a:effectLst/>
+                <a:latin typeface="Georgia" panose="02040502050405020303" pitchFamily="18" charset="0"/>
+              </a:rPr>
+              <a:t> software </a:t>
+            </a:r>
+            <a:r>
+              <a:rPr kumimoji="0" lang="pt-PT" altLang="pt-PT" sz="1300" b="0" i="1" u="none" strike="noStrike" cap="none" normalizeH="0" baseline="0" dirty="0" err="1">
+                <a:ln>
+                  <a:noFill/>
+                </a:ln>
+                <a:solidFill>
+                  <a:srgbClr val="555555"/>
+                </a:solidFill>
+                <a:effectLst/>
+                <a:latin typeface="Georgia" panose="02040502050405020303" pitchFamily="18" charset="0"/>
+              </a:rPr>
+              <a:t>should</a:t>
+            </a:r>
+            <a:r>
+              <a:rPr kumimoji="0" lang="pt-PT" altLang="pt-PT" sz="1300" b="0" i="1" u="none" strike="noStrike" cap="none" normalizeH="0" baseline="0" dirty="0">
+                <a:ln>
+                  <a:noFill/>
+                </a:ln>
+                <a:solidFill>
+                  <a:srgbClr val="555555"/>
+                </a:solidFill>
+                <a:effectLst/>
+                <a:latin typeface="Georgia" panose="02040502050405020303" pitchFamily="18" charset="0"/>
+              </a:rPr>
+              <a:t> </a:t>
+            </a:r>
+            <a:r>
+              <a:rPr kumimoji="0" lang="pt-PT" altLang="pt-PT" sz="1300" b="0" i="1" u="none" strike="noStrike" cap="none" normalizeH="0" baseline="0" dirty="0" err="1">
+                <a:ln>
+                  <a:noFill/>
+                </a:ln>
+                <a:solidFill>
+                  <a:srgbClr val="555555"/>
+                </a:solidFill>
+                <a:effectLst/>
+                <a:latin typeface="Georgia" panose="02040502050405020303" pitchFamily="18" charset="0"/>
+              </a:rPr>
+              <a:t>make</a:t>
+            </a:r>
+            <a:r>
+              <a:rPr kumimoji="0" lang="pt-PT" altLang="pt-PT" sz="1300" b="0" i="1" u="none" strike="noStrike" cap="none" normalizeH="0" baseline="0" dirty="0">
+                <a:ln>
+                  <a:noFill/>
+                </a:ln>
+                <a:solidFill>
+                  <a:srgbClr val="555555"/>
+                </a:solidFill>
+                <a:effectLst/>
+                <a:latin typeface="Georgia" panose="02040502050405020303" pitchFamily="18" charset="0"/>
+              </a:rPr>
+              <a:t> </a:t>
+            </a:r>
+            <a:r>
+              <a:rPr kumimoji="0" lang="pt-PT" altLang="pt-PT" sz="1300" b="0" i="1" u="none" strike="noStrike" cap="none" normalizeH="0" baseline="0" dirty="0" err="1">
+                <a:ln>
+                  <a:noFill/>
+                </a:ln>
+                <a:solidFill>
+                  <a:srgbClr val="555555"/>
+                </a:solidFill>
+                <a:effectLst/>
+                <a:latin typeface="Georgia" panose="02040502050405020303" pitchFamily="18" charset="0"/>
+              </a:rPr>
+              <a:t>their</a:t>
+            </a:r>
+            <a:r>
+              <a:rPr kumimoji="0" lang="pt-PT" altLang="pt-PT" sz="1300" b="0" i="1" u="none" strike="noStrike" cap="none" normalizeH="0" baseline="0" dirty="0">
+                <a:ln>
+                  <a:noFill/>
+                </a:ln>
+                <a:solidFill>
+                  <a:srgbClr val="555555"/>
+                </a:solidFill>
+                <a:effectLst/>
+                <a:latin typeface="Georgia" panose="02040502050405020303" pitchFamily="18" charset="0"/>
+              </a:rPr>
+              <a:t> </a:t>
+            </a:r>
+            <a:r>
+              <a:rPr kumimoji="0" lang="pt-PT" altLang="pt-PT" sz="1300" b="0" i="1" u="none" strike="noStrike" cap="none" normalizeH="0" baseline="0" dirty="0" err="1">
+                <a:ln>
+                  <a:noFill/>
+                </a:ln>
+                <a:solidFill>
+                  <a:srgbClr val="555555"/>
+                </a:solidFill>
+                <a:effectLst/>
+                <a:latin typeface="Georgia" panose="02040502050405020303" pitchFamily="18" charset="0"/>
+              </a:rPr>
+              <a:t>own</a:t>
+            </a:r>
+            <a:r>
+              <a:rPr kumimoji="0" lang="pt-PT" altLang="pt-PT" sz="1300" b="0" i="1" u="none" strike="noStrike" cap="none" normalizeH="0" baseline="0" dirty="0">
+                <a:ln>
+                  <a:noFill/>
+                </a:ln>
+                <a:solidFill>
+                  <a:srgbClr val="555555"/>
+                </a:solidFill>
+                <a:effectLst/>
+                <a:latin typeface="Georgia" panose="02040502050405020303" pitchFamily="18" charset="0"/>
+              </a:rPr>
+              <a:t> hardware.</a:t>
+            </a:r>
+            <a:endParaRPr kumimoji="0" lang="pt-PT" altLang="pt-PT" sz="1200" b="0" i="0" u="none" strike="noStrike" cap="none" normalizeH="0" baseline="0" dirty="0">
+              <a:ln>
+                <a:noFill/>
+              </a:ln>
+              <a:solidFill>
+                <a:srgbClr val="BC1F14"/>
+              </a:solidFill>
+              <a:effectLst/>
+              <a:latin typeface="Arial" panose="020B0604020202020204" pitchFamily="34" charset="0"/>
+              <a:cs typeface="Arial" panose="020B0604020202020204" pitchFamily="34" charset="0"/>
+            </a:endParaRPr>
+          </a:p>
+          <a:p>
+            <a:pPr marL="0" marR="0" lvl="0" indent="0" algn="ctr" defTabSz="914400" rtl="0" eaLnBrk="0" fontAlgn="base" latinLnBrk="0" hangingPunct="0">
+              <a:lnSpc>
+                <a:spcPct val="100000"/>
+              </a:lnSpc>
+              <a:spcBef>
+                <a:spcPct val="0"/>
+              </a:spcBef>
+              <a:spcAft>
+                <a:spcPct val="0"/>
+              </a:spcAft>
+              <a:buClrTx/>
+              <a:buSzTx/>
+              <a:buFontTx/>
+              <a:buNone/>
+              <a:tabLst/>
+            </a:pPr>
+            <a:r>
+              <a:rPr kumimoji="0" lang="pt-PT" altLang="pt-PT" sz="1200" b="0" i="0" u="none" strike="noStrike" cap="none" normalizeH="0" baseline="0" dirty="0">
+                <a:ln>
+                  <a:noFill/>
+                </a:ln>
+                <a:solidFill>
+                  <a:srgbClr val="BC1F14"/>
+                </a:solidFill>
+                <a:effectLst/>
+                <a:latin typeface="Arial" panose="020B0604020202020204" pitchFamily="34" charset="0"/>
+                <a:cs typeface="Arial" panose="020B0604020202020204" pitchFamily="34" charset="0"/>
+              </a:rPr>
+              <a:t>  </a:t>
+            </a:r>
+            <a:r>
+              <a:rPr kumimoji="0" lang="pt-PT" altLang="pt-PT" sz="800" b="0" i="0" u="none" strike="noStrike" cap="none" normalizeH="0" baseline="0" dirty="0">
+                <a:ln>
+                  <a:noFill/>
+                </a:ln>
+                <a:solidFill>
+                  <a:schemeClr val="tx1"/>
+                </a:solidFill>
+                <a:effectLst/>
+              </a:rPr>
+              <a:t> </a:t>
+            </a:r>
+            <a:endParaRPr kumimoji="0" lang="pt-PT" altLang="pt-PT" sz="1800" b="0" i="0" u="none" strike="noStrike" cap="none" normalizeH="0" baseline="0" dirty="0">
+              <a:ln>
+                <a:noFill/>
+              </a:ln>
+              <a:solidFill>
+                <a:schemeClr val="tx1"/>
+              </a:solidFill>
+              <a:effectLst/>
+              <a:latin typeface="Arial" panose="020B0604020202020204" pitchFamily="34" charset="0"/>
+            </a:endParaRPr>
+          </a:p>
+        </p:txBody>
+      </p:sp>
+      <p:sp>
+        <p:nvSpPr>
+          <p:cNvPr id="7" name="Rectangle 6">
+            <a:extLst>
+              <a:ext uri="{FF2B5EF4-FFF2-40B4-BE49-F238E27FC236}">
+                <a16:creationId xmlns:a16="http://schemas.microsoft.com/office/drawing/2014/main" id="{29698FB4-8297-432D-BBE3-8FD791C8BC13}"/>
               </a:ext>
             </a:extLst>
           </p:cNvPr>
@@ -19352,28 +19844,19 @@
         </p:nvSpPr>
         <p:spPr>
           <a:xfrm>
-            <a:off x="458634" y="1686609"/>
-            <a:ext cx="6330471" cy="646331"/>
+            <a:off x="1290018" y="1844159"/>
+            <a:ext cx="3706464" cy="292388"/>
           </a:xfrm>
           <a:prstGeom prst="rect">
             <a:avLst/>
           </a:prstGeom>
         </p:spPr>
         <p:txBody>
-          <a:bodyPr wrap="square">
+          <a:bodyPr wrap="none">
             <a:spAutoFit/>
           </a:bodyPr>
           <a:lstStyle/>
           <a:p>
-            <a:r>
-              <a:rPr lang="en-US" dirty="0">
-                <a:solidFill>
-                  <a:srgbClr val="14171A"/>
-                </a:solidFill>
-                <a:latin typeface="Segoe UI" panose="020B0502040204020203" pitchFamily="34" charset="0"/>
-              </a:rPr>
-              <a:t>“</a:t>
-            </a:r>
             <a:r>
               <a:rPr lang="en-US" sz="1300" i="1" dirty="0">
                 <a:solidFill>
@@ -19381,86 +19864,21 @@
                 </a:solidFill>
                 <a:latin typeface="Georgia" panose="02040502050405020303" pitchFamily="18" charset="0"/>
               </a:rPr>
-              <a:t>If you can get today’s work done today, but you do it in such a way that you can’t possibly get tomorrow’s work done tomorrow, then you lose.</a:t>
+              <a:t>The best way to predict the future is to invent it</a:t>
             </a:r>
-            <a:r>
-              <a:rPr lang="en-US" dirty="0">
-                <a:solidFill>
-                  <a:srgbClr val="14171A"/>
-                </a:solidFill>
-                <a:latin typeface="Segoe UI" panose="020B0502040204020203" pitchFamily="34" charset="0"/>
-              </a:rPr>
-              <a:t>”</a:t>
-            </a:r>
-            <a:endParaRPr lang="pt-PT" dirty="0"/>
-          </a:p>
-        </p:txBody>
-      </p:sp>
-      <p:sp>
-        <p:nvSpPr>
-          <p:cNvPr id="6" name="Rectangle 5">
-            <a:extLst>
-              <a:ext uri="{FF2B5EF4-FFF2-40B4-BE49-F238E27FC236}">
-                <a16:creationId xmlns:a16="http://schemas.microsoft.com/office/drawing/2014/main" id="{3FC58155-FDE6-4C05-8A19-A7C1A2E79B0D}"/>
-              </a:ext>
-            </a:extLst>
-          </p:cNvPr>
-          <p:cNvSpPr/>
-          <p:nvPr/>
-        </p:nvSpPr>
-        <p:spPr>
-          <a:xfrm>
-            <a:off x="575869" y="3266986"/>
-            <a:ext cx="6096000" cy="923330"/>
-          </a:xfrm>
-          <a:prstGeom prst="rect">
-            <a:avLst/>
-          </a:prstGeom>
-        </p:spPr>
-        <p:txBody>
-          <a:bodyPr>
-            <a:spAutoFit/>
-          </a:bodyPr>
-          <a:lstStyle/>
-          <a:p>
-            <a:r>
-              <a:rPr lang="en-US" dirty="0">
-                <a:solidFill>
-                  <a:srgbClr val="181818"/>
-                </a:solidFill>
-                <a:latin typeface="Merriweather"/>
-              </a:rPr>
-              <a:t>“</a:t>
-            </a:r>
-            <a:r>
-              <a:rPr lang="en-US" sz="1300" i="1" dirty="0">
-                <a:solidFill>
-                  <a:srgbClr val="555555"/>
-                </a:solidFill>
-                <a:latin typeface="Georgia" panose="02040502050405020303" pitchFamily="18" charset="0"/>
-              </a:rPr>
-              <a:t>Poorly designed code usually takes more code to do the same things, often because the code quite literally does the same thing in several places</a:t>
-            </a:r>
-            <a:r>
-              <a:rPr lang="en-US" dirty="0">
-                <a:solidFill>
-                  <a:srgbClr val="181818"/>
-                </a:solidFill>
-                <a:latin typeface="Merriweather"/>
-              </a:rPr>
-              <a:t>.” </a:t>
-            </a:r>
-            <a:br>
-              <a:rPr lang="en-US" dirty="0"/>
-            </a:br>
-            <a:endParaRPr lang="pt-PT" dirty="0"/>
+            <a:endParaRPr lang="pt-PT" sz="1300" i="1" dirty="0">
+              <a:solidFill>
+                <a:srgbClr val="555555"/>
+              </a:solidFill>
+              <a:latin typeface="Georgia" panose="02040502050405020303" pitchFamily="18" charset="0"/>
+            </a:endParaRPr>
           </a:p>
         </p:txBody>
       </p:sp>
     </p:spTree>
     <p:extLst>
       <p:ext uri="{BB962C8B-B14F-4D97-AF65-F5344CB8AC3E}">
-        <p14:creationId xmlns:p14="http://schemas.microsoft.com/office/powerpoint/2010/main" val="2829717902"/>
+        <p14:creationId xmlns:p14="http://schemas.microsoft.com/office/powerpoint/2010/main" val="1823707840"/>
       </p:ext>
     </p:extLst>
   </p:cSld>
@@ -19981,7 +20399,7 @@
           <p:cNvPr id="2" name="Title 1">
             <a:extLst>
               <a:ext uri="{FF2B5EF4-FFF2-40B4-BE49-F238E27FC236}">
-                <a16:creationId xmlns:a16="http://schemas.microsoft.com/office/drawing/2014/main" id="{9A3DC6D6-33D7-4510-A16D-3BCE52C54008}"/>
+                <a16:creationId xmlns:a16="http://schemas.microsoft.com/office/drawing/2014/main" id="{063582E3-AB01-4845-97B2-7A81B9EAE690}"/>
               </a:ext>
             </a:extLst>
           </p:cNvPr>
@@ -19995,7 +20413,7 @@
         <p:spPr>
           <a:xfrm>
             <a:off x="863028" y="1012004"/>
-            <a:ext cx="3613721" cy="4795408"/>
+            <a:ext cx="3594671" cy="4795408"/>
           </a:xfrm>
         </p:spPr>
         <p:txBody>
@@ -20004,15 +20422,22 @@
           </a:bodyPr>
           <a:lstStyle/>
           <a:p>
-            <a:r>
-              <a:rPr lang="en-US" sz="3200" dirty="0">
+            <a:br>
+              <a:rPr lang="en-US" dirty="0">
                 <a:solidFill>
                   <a:srgbClr val="FFFFFF"/>
                 </a:solidFill>
               </a:rPr>
-              <a:t>software architecture</a:t>
+            </a:br>
+            <a:r>
+              <a:rPr lang="en-US" dirty="0">
+                <a:solidFill>
+                  <a:srgbClr val="FFFFFF"/>
+                </a:solidFill>
+              </a:rPr>
+              <a:t>Code base</a:t>
             </a:r>
-            <a:endParaRPr lang="pt-PT" sz="3200" dirty="0">
+            <a:endParaRPr lang="pt-PT" dirty="0">
               <a:solidFill>
                 <a:srgbClr val="FFFFFF"/>
               </a:solidFill>
@@ -20025,7 +20450,7 @@
           <p:cNvPr id="5" name="Content Placeholder 2">
             <a:extLst>
               <a:ext uri="{FF2B5EF4-FFF2-40B4-BE49-F238E27FC236}">
-                <a16:creationId xmlns:a16="http://schemas.microsoft.com/office/drawing/2014/main" id="{97686B0B-22F0-4907-9C4D-17825D02DB50}"/>
+                <a16:creationId xmlns:a16="http://schemas.microsoft.com/office/drawing/2014/main" id="{666B1FCB-EFAB-45A2-BC2F-816280581451}"/>
               </a:ext>
             </a:extLst>
           </p:cNvPr>
@@ -20036,7 +20461,7 @@
             <p:ph idx="1"/>
             <p:extLst>
               <p:ext uri="{D42A27DB-BD31-4B8C-83A1-F6EECF244321}">
-                <p14:modId xmlns:p14="http://schemas.microsoft.com/office/powerpoint/2010/main" val="1371431277"/>
+                <p14:modId xmlns:p14="http://schemas.microsoft.com/office/powerpoint/2010/main" val="899675906"/>
               </p:ext>
             </p:extLst>
           </p:nvPr>
@@ -20054,7 +20479,7 @@
     </p:spTree>
     <p:extLst>
       <p:ext uri="{BB962C8B-B14F-4D97-AF65-F5344CB8AC3E}">
-        <p14:creationId xmlns:p14="http://schemas.microsoft.com/office/powerpoint/2010/main" val="1204732157"/>
+        <p14:creationId xmlns:p14="http://schemas.microsoft.com/office/powerpoint/2010/main" val="598750512"/>
       </p:ext>
     </p:extLst>
   </p:cSld>
@@ -21253,1204 +21678,6 @@
           <a:chExt cx="0" cy="0"/>
         </a:xfrm>
       </p:grpSpPr>
-      <p:pic>
-        <p:nvPicPr>
-          <p:cNvPr id="5" name="Picture 4">
-            <a:extLst>
-              <a:ext uri="{FF2B5EF4-FFF2-40B4-BE49-F238E27FC236}">
-                <a16:creationId xmlns:a16="http://schemas.microsoft.com/office/drawing/2014/main" id="{BB614480-6899-4177-A064-51F394889B0F}"/>
-              </a:ext>
-            </a:extLst>
-          </p:cNvPr>
-          <p:cNvPicPr>
-            <a:picLocks noChangeAspect="1"/>
-          </p:cNvPicPr>
-          <p:nvPr/>
-        </p:nvPicPr>
-        <p:blipFill>
-          <a:blip r:embed="rId2"/>
-          <a:stretch>
-            <a:fillRect/>
-          </a:stretch>
-        </p:blipFill>
-        <p:spPr>
-          <a:xfrm>
-            <a:off x="6515100" y="295275"/>
-            <a:ext cx="5562600" cy="6267450"/>
-          </a:xfrm>
-          <a:prstGeom prst="rect">
-            <a:avLst/>
-          </a:prstGeom>
-        </p:spPr>
-      </p:pic>
-      <p:sp>
-        <p:nvSpPr>
-          <p:cNvPr id="6" name="Rectangle 1">
-            <a:extLst>
-              <a:ext uri="{FF2B5EF4-FFF2-40B4-BE49-F238E27FC236}">
-                <a16:creationId xmlns:a16="http://schemas.microsoft.com/office/drawing/2014/main" id="{F4CD3A54-259C-4AAB-97BE-E34FAB448986}"/>
-              </a:ext>
-            </a:extLst>
-          </p:cNvPr>
-          <p:cNvSpPr>
-            <a:spLocks noChangeArrowheads="1"/>
-          </p:cNvSpPr>
-          <p:nvPr/>
-        </p:nvSpPr>
-        <p:spPr bwMode="auto">
-          <a:xfrm>
-            <a:off x="1000125" y="2831812"/>
-            <a:ext cx="4286250" cy="597188"/>
-          </a:xfrm>
-          <a:prstGeom prst="rect">
-            <a:avLst/>
-          </a:prstGeom>
-          <a:solidFill>
-            <a:srgbClr val="FFFFFF"/>
-          </a:solidFill>
-          <a:ln>
-            <a:noFill/>
-          </a:ln>
-          <a:effectLst/>
-          <a:extLst>
-            <a:ext uri="{91240B29-F687-4F45-9708-019B960494DF}">
-              <a14:hiddenLine xmlns:a14="http://schemas.microsoft.com/office/drawing/2010/main" w="9525">
-                <a:solidFill>
-                  <a:schemeClr val="tx1"/>
-                </a:solidFill>
-                <a:miter lim="800000"/>
-                <a:headEnd/>
-                <a:tailEnd/>
-              </a14:hiddenLine>
-            </a:ext>
-            <a:ext uri="{AF507438-7753-43E0-B8FC-AC1667EBCBE1}">
-              <a14:hiddenEffects xmlns:a14="http://schemas.microsoft.com/office/drawing/2010/main">
-                <a:effectLst>
-                  <a:outerShdw dist="35921" dir="2700000" algn="ctr" rotWithShape="0">
-                    <a:schemeClr val="bg2"/>
-                  </a:outerShdw>
-                </a:effectLst>
-              </a14:hiddenEffects>
-            </a:ext>
-          </a:extLst>
-        </p:spPr>
-        <p:txBody>
-          <a:bodyPr vert="horz" wrap="square" lIns="0" tIns="0" rIns="0" bIns="0" numCol="1" anchor="ctr" anchorCtr="0" compatLnSpc="1">
-            <a:prstTxWarp prst="textNoShape">
-              <a:avLst/>
-            </a:prstTxWarp>
-            <a:spAutoFit/>
-          </a:bodyPr>
-          <a:lstStyle>
-            <a:lvl1pPr eaLnBrk="0" fontAlgn="base" hangingPunct="0">
-              <a:spcBef>
-                <a:spcPct val="0"/>
-              </a:spcBef>
-              <a:spcAft>
-                <a:spcPct val="0"/>
-              </a:spcAft>
-              <a:defRPr>
-                <a:solidFill>
-                  <a:schemeClr val="tx1"/>
-                </a:solidFill>
-                <a:latin typeface="Arial" panose="020B0604020202020204" pitchFamily="34" charset="0"/>
-              </a:defRPr>
-            </a:lvl1pPr>
-            <a:lvl2pPr eaLnBrk="0" fontAlgn="base" hangingPunct="0">
-              <a:spcBef>
-                <a:spcPct val="0"/>
-              </a:spcBef>
-              <a:spcAft>
-                <a:spcPct val="0"/>
-              </a:spcAft>
-              <a:defRPr>
-                <a:solidFill>
-                  <a:schemeClr val="tx1"/>
-                </a:solidFill>
-                <a:latin typeface="Arial" panose="020B0604020202020204" pitchFamily="34" charset="0"/>
-              </a:defRPr>
-            </a:lvl2pPr>
-            <a:lvl3pPr eaLnBrk="0" fontAlgn="base" hangingPunct="0">
-              <a:spcBef>
-                <a:spcPct val="0"/>
-              </a:spcBef>
-              <a:spcAft>
-                <a:spcPct val="0"/>
-              </a:spcAft>
-              <a:defRPr>
-                <a:solidFill>
-                  <a:schemeClr val="tx1"/>
-                </a:solidFill>
-                <a:latin typeface="Arial" panose="020B0604020202020204" pitchFamily="34" charset="0"/>
-              </a:defRPr>
-            </a:lvl3pPr>
-            <a:lvl4pPr eaLnBrk="0" fontAlgn="base" hangingPunct="0">
-              <a:spcBef>
-                <a:spcPct val="0"/>
-              </a:spcBef>
-              <a:spcAft>
-                <a:spcPct val="0"/>
-              </a:spcAft>
-              <a:defRPr>
-                <a:solidFill>
-                  <a:schemeClr val="tx1"/>
-                </a:solidFill>
-                <a:latin typeface="Arial" panose="020B0604020202020204" pitchFamily="34" charset="0"/>
-              </a:defRPr>
-            </a:lvl4pPr>
-            <a:lvl5pPr eaLnBrk="0" fontAlgn="base" hangingPunct="0">
-              <a:spcBef>
-                <a:spcPct val="0"/>
-              </a:spcBef>
-              <a:spcAft>
-                <a:spcPct val="0"/>
-              </a:spcAft>
-              <a:defRPr>
-                <a:solidFill>
-                  <a:schemeClr val="tx1"/>
-                </a:solidFill>
-                <a:latin typeface="Arial" panose="020B0604020202020204" pitchFamily="34" charset="0"/>
-              </a:defRPr>
-            </a:lvl5pPr>
-            <a:lvl6pPr eaLnBrk="0" fontAlgn="base" hangingPunct="0">
-              <a:spcBef>
-                <a:spcPct val="0"/>
-              </a:spcBef>
-              <a:spcAft>
-                <a:spcPct val="0"/>
-              </a:spcAft>
-              <a:defRPr>
-                <a:solidFill>
-                  <a:schemeClr val="tx1"/>
-                </a:solidFill>
-                <a:latin typeface="Arial" panose="020B0604020202020204" pitchFamily="34" charset="0"/>
-              </a:defRPr>
-            </a:lvl6pPr>
-            <a:lvl7pPr eaLnBrk="0" fontAlgn="base" hangingPunct="0">
-              <a:spcBef>
-                <a:spcPct val="0"/>
-              </a:spcBef>
-              <a:spcAft>
-                <a:spcPct val="0"/>
-              </a:spcAft>
-              <a:defRPr>
-                <a:solidFill>
-                  <a:schemeClr val="tx1"/>
-                </a:solidFill>
-                <a:latin typeface="Arial" panose="020B0604020202020204" pitchFamily="34" charset="0"/>
-              </a:defRPr>
-            </a:lvl7pPr>
-            <a:lvl8pPr eaLnBrk="0" fontAlgn="base" hangingPunct="0">
-              <a:spcBef>
-                <a:spcPct val="0"/>
-              </a:spcBef>
-              <a:spcAft>
-                <a:spcPct val="0"/>
-              </a:spcAft>
-              <a:defRPr>
-                <a:solidFill>
-                  <a:schemeClr val="tx1"/>
-                </a:solidFill>
-                <a:latin typeface="Arial" panose="020B0604020202020204" pitchFamily="34" charset="0"/>
-              </a:defRPr>
-            </a:lvl8pPr>
-            <a:lvl9pPr eaLnBrk="0" fontAlgn="base" hangingPunct="0">
-              <a:spcBef>
-                <a:spcPct val="0"/>
-              </a:spcBef>
-              <a:spcAft>
-                <a:spcPct val="0"/>
-              </a:spcAft>
-              <a:defRPr>
-                <a:solidFill>
-                  <a:schemeClr val="tx1"/>
-                </a:solidFill>
-                <a:latin typeface="Arial" panose="020B0604020202020204" pitchFamily="34" charset="0"/>
-              </a:defRPr>
-            </a:lvl9pPr>
-          </a:lstStyle>
-          <a:p>
-            <a:pPr marL="0" marR="0" lvl="0" indent="0" algn="ctr" defTabSz="914400" rtl="0" eaLnBrk="0" fontAlgn="base" latinLnBrk="0" hangingPunct="0">
-              <a:lnSpc>
-                <a:spcPct val="100000"/>
-              </a:lnSpc>
-              <a:spcBef>
-                <a:spcPct val="0"/>
-              </a:spcBef>
-              <a:spcAft>
-                <a:spcPct val="0"/>
-              </a:spcAft>
-              <a:buClrTx/>
-              <a:buSzTx/>
-              <a:buFontTx/>
-              <a:buNone/>
-              <a:tabLst/>
-            </a:pPr>
-            <a:r>
-              <a:rPr kumimoji="0" lang="pt-PT" altLang="pt-PT" sz="1300" b="0" i="1" u="none" strike="noStrike" cap="none" normalizeH="0" baseline="0" dirty="0">
-                <a:ln>
-                  <a:noFill/>
-                </a:ln>
-                <a:solidFill>
-                  <a:srgbClr val="555555"/>
-                </a:solidFill>
-                <a:effectLst/>
-                <a:latin typeface="Georgia" panose="02040502050405020303" pitchFamily="18" charset="0"/>
-              </a:rPr>
-              <a:t>People </a:t>
-            </a:r>
-            <a:r>
-              <a:rPr kumimoji="0" lang="pt-PT" altLang="pt-PT" sz="1300" b="0" i="1" u="none" strike="noStrike" cap="none" normalizeH="0" baseline="0" dirty="0" err="1">
-                <a:ln>
-                  <a:noFill/>
-                </a:ln>
-                <a:solidFill>
-                  <a:srgbClr val="555555"/>
-                </a:solidFill>
-                <a:effectLst/>
-                <a:latin typeface="Georgia" panose="02040502050405020303" pitchFamily="18" charset="0"/>
-              </a:rPr>
-              <a:t>who</a:t>
-            </a:r>
-            <a:r>
-              <a:rPr kumimoji="0" lang="pt-PT" altLang="pt-PT" sz="1300" b="0" i="1" u="none" strike="noStrike" cap="none" normalizeH="0" baseline="0" dirty="0">
-                <a:ln>
-                  <a:noFill/>
-                </a:ln>
-                <a:solidFill>
-                  <a:srgbClr val="555555"/>
-                </a:solidFill>
-                <a:effectLst/>
-                <a:latin typeface="Georgia" panose="02040502050405020303" pitchFamily="18" charset="0"/>
-              </a:rPr>
-              <a:t> are </a:t>
-            </a:r>
-            <a:r>
-              <a:rPr kumimoji="0" lang="pt-PT" altLang="pt-PT" sz="1300" b="0" i="1" u="none" strike="noStrike" cap="none" normalizeH="0" baseline="0" dirty="0" err="1">
-                <a:ln>
-                  <a:noFill/>
-                </a:ln>
-                <a:solidFill>
-                  <a:srgbClr val="555555"/>
-                </a:solidFill>
-                <a:effectLst/>
-                <a:latin typeface="Georgia" panose="02040502050405020303" pitchFamily="18" charset="0"/>
-              </a:rPr>
-              <a:t>really</a:t>
-            </a:r>
-            <a:r>
-              <a:rPr kumimoji="0" lang="pt-PT" altLang="pt-PT" sz="1300" b="0" i="1" u="none" strike="noStrike" cap="none" normalizeH="0" baseline="0" dirty="0">
-                <a:ln>
-                  <a:noFill/>
-                </a:ln>
-                <a:solidFill>
-                  <a:srgbClr val="555555"/>
-                </a:solidFill>
-                <a:effectLst/>
-                <a:latin typeface="Georgia" panose="02040502050405020303" pitchFamily="18" charset="0"/>
-              </a:rPr>
-              <a:t> </a:t>
-            </a:r>
-            <a:r>
-              <a:rPr kumimoji="0" lang="pt-PT" altLang="pt-PT" sz="1300" b="0" i="1" u="none" strike="noStrike" cap="none" normalizeH="0" baseline="0" dirty="0" err="1">
-                <a:ln>
-                  <a:noFill/>
-                </a:ln>
-                <a:solidFill>
-                  <a:srgbClr val="555555"/>
-                </a:solidFill>
-                <a:effectLst/>
-                <a:latin typeface="Georgia" panose="02040502050405020303" pitchFamily="18" charset="0"/>
-              </a:rPr>
-              <a:t>serious</a:t>
-            </a:r>
-            <a:r>
-              <a:rPr kumimoji="0" lang="pt-PT" altLang="pt-PT" sz="1300" b="0" i="1" u="none" strike="noStrike" cap="none" normalizeH="0" baseline="0" dirty="0">
-                <a:ln>
-                  <a:noFill/>
-                </a:ln>
-                <a:solidFill>
-                  <a:srgbClr val="555555"/>
-                </a:solidFill>
-                <a:effectLst/>
-                <a:latin typeface="Georgia" panose="02040502050405020303" pitchFamily="18" charset="0"/>
-              </a:rPr>
-              <a:t> </a:t>
-            </a:r>
-            <a:r>
-              <a:rPr kumimoji="0" lang="pt-PT" altLang="pt-PT" sz="1300" b="0" i="1" u="none" strike="noStrike" cap="none" normalizeH="0" baseline="0" dirty="0" err="1">
-                <a:ln>
-                  <a:noFill/>
-                </a:ln>
-                <a:solidFill>
-                  <a:srgbClr val="555555"/>
-                </a:solidFill>
-                <a:effectLst/>
-                <a:latin typeface="Georgia" panose="02040502050405020303" pitchFamily="18" charset="0"/>
-              </a:rPr>
-              <a:t>about</a:t>
-            </a:r>
-            <a:r>
-              <a:rPr kumimoji="0" lang="pt-PT" altLang="pt-PT" sz="1300" b="0" i="1" u="none" strike="noStrike" cap="none" normalizeH="0" baseline="0" dirty="0">
-                <a:ln>
-                  <a:noFill/>
-                </a:ln>
-                <a:solidFill>
-                  <a:srgbClr val="555555"/>
-                </a:solidFill>
-                <a:effectLst/>
-                <a:latin typeface="Georgia" panose="02040502050405020303" pitchFamily="18" charset="0"/>
-              </a:rPr>
-              <a:t> software </a:t>
-            </a:r>
-            <a:r>
-              <a:rPr kumimoji="0" lang="pt-PT" altLang="pt-PT" sz="1300" b="0" i="1" u="none" strike="noStrike" cap="none" normalizeH="0" baseline="0" dirty="0" err="1">
-                <a:ln>
-                  <a:noFill/>
-                </a:ln>
-                <a:solidFill>
-                  <a:srgbClr val="555555"/>
-                </a:solidFill>
-                <a:effectLst/>
-                <a:latin typeface="Georgia" panose="02040502050405020303" pitchFamily="18" charset="0"/>
-              </a:rPr>
-              <a:t>should</a:t>
-            </a:r>
-            <a:r>
-              <a:rPr kumimoji="0" lang="pt-PT" altLang="pt-PT" sz="1300" b="0" i="1" u="none" strike="noStrike" cap="none" normalizeH="0" baseline="0" dirty="0">
-                <a:ln>
-                  <a:noFill/>
-                </a:ln>
-                <a:solidFill>
-                  <a:srgbClr val="555555"/>
-                </a:solidFill>
-                <a:effectLst/>
-                <a:latin typeface="Georgia" panose="02040502050405020303" pitchFamily="18" charset="0"/>
-              </a:rPr>
-              <a:t> </a:t>
-            </a:r>
-            <a:r>
-              <a:rPr kumimoji="0" lang="pt-PT" altLang="pt-PT" sz="1300" b="0" i="1" u="none" strike="noStrike" cap="none" normalizeH="0" baseline="0" dirty="0" err="1">
-                <a:ln>
-                  <a:noFill/>
-                </a:ln>
-                <a:solidFill>
-                  <a:srgbClr val="555555"/>
-                </a:solidFill>
-                <a:effectLst/>
-                <a:latin typeface="Georgia" panose="02040502050405020303" pitchFamily="18" charset="0"/>
-              </a:rPr>
-              <a:t>make</a:t>
-            </a:r>
-            <a:r>
-              <a:rPr kumimoji="0" lang="pt-PT" altLang="pt-PT" sz="1300" b="0" i="1" u="none" strike="noStrike" cap="none" normalizeH="0" baseline="0" dirty="0">
-                <a:ln>
-                  <a:noFill/>
-                </a:ln>
-                <a:solidFill>
-                  <a:srgbClr val="555555"/>
-                </a:solidFill>
-                <a:effectLst/>
-                <a:latin typeface="Georgia" panose="02040502050405020303" pitchFamily="18" charset="0"/>
-              </a:rPr>
-              <a:t> </a:t>
-            </a:r>
-            <a:r>
-              <a:rPr kumimoji="0" lang="pt-PT" altLang="pt-PT" sz="1300" b="0" i="1" u="none" strike="noStrike" cap="none" normalizeH="0" baseline="0" dirty="0" err="1">
-                <a:ln>
-                  <a:noFill/>
-                </a:ln>
-                <a:solidFill>
-                  <a:srgbClr val="555555"/>
-                </a:solidFill>
-                <a:effectLst/>
-                <a:latin typeface="Georgia" panose="02040502050405020303" pitchFamily="18" charset="0"/>
-              </a:rPr>
-              <a:t>their</a:t>
-            </a:r>
-            <a:r>
-              <a:rPr kumimoji="0" lang="pt-PT" altLang="pt-PT" sz="1300" b="0" i="1" u="none" strike="noStrike" cap="none" normalizeH="0" baseline="0" dirty="0">
-                <a:ln>
-                  <a:noFill/>
-                </a:ln>
-                <a:solidFill>
-                  <a:srgbClr val="555555"/>
-                </a:solidFill>
-                <a:effectLst/>
-                <a:latin typeface="Georgia" panose="02040502050405020303" pitchFamily="18" charset="0"/>
-              </a:rPr>
-              <a:t> </a:t>
-            </a:r>
-            <a:r>
-              <a:rPr kumimoji="0" lang="pt-PT" altLang="pt-PT" sz="1300" b="0" i="1" u="none" strike="noStrike" cap="none" normalizeH="0" baseline="0" dirty="0" err="1">
-                <a:ln>
-                  <a:noFill/>
-                </a:ln>
-                <a:solidFill>
-                  <a:srgbClr val="555555"/>
-                </a:solidFill>
-                <a:effectLst/>
-                <a:latin typeface="Georgia" panose="02040502050405020303" pitchFamily="18" charset="0"/>
-              </a:rPr>
-              <a:t>own</a:t>
-            </a:r>
-            <a:r>
-              <a:rPr kumimoji="0" lang="pt-PT" altLang="pt-PT" sz="1300" b="0" i="1" u="none" strike="noStrike" cap="none" normalizeH="0" baseline="0" dirty="0">
-                <a:ln>
-                  <a:noFill/>
-                </a:ln>
-                <a:solidFill>
-                  <a:srgbClr val="555555"/>
-                </a:solidFill>
-                <a:effectLst/>
-                <a:latin typeface="Georgia" panose="02040502050405020303" pitchFamily="18" charset="0"/>
-              </a:rPr>
-              <a:t> hardware.</a:t>
-            </a:r>
-            <a:endParaRPr kumimoji="0" lang="pt-PT" altLang="pt-PT" sz="1200" b="0" i="0" u="none" strike="noStrike" cap="none" normalizeH="0" baseline="0" dirty="0">
-              <a:ln>
-                <a:noFill/>
-              </a:ln>
-              <a:solidFill>
-                <a:srgbClr val="BC1F14"/>
-              </a:solidFill>
-              <a:effectLst/>
-              <a:latin typeface="Arial" panose="020B0604020202020204" pitchFamily="34" charset="0"/>
-              <a:cs typeface="Arial" panose="020B0604020202020204" pitchFamily="34" charset="0"/>
-            </a:endParaRPr>
-          </a:p>
-          <a:p>
-            <a:pPr marL="0" marR="0" lvl="0" indent="0" algn="ctr" defTabSz="914400" rtl="0" eaLnBrk="0" fontAlgn="base" latinLnBrk="0" hangingPunct="0">
-              <a:lnSpc>
-                <a:spcPct val="100000"/>
-              </a:lnSpc>
-              <a:spcBef>
-                <a:spcPct val="0"/>
-              </a:spcBef>
-              <a:spcAft>
-                <a:spcPct val="0"/>
-              </a:spcAft>
-              <a:buClrTx/>
-              <a:buSzTx/>
-              <a:buFontTx/>
-              <a:buNone/>
-              <a:tabLst/>
-            </a:pPr>
-            <a:r>
-              <a:rPr kumimoji="0" lang="pt-PT" altLang="pt-PT" sz="1200" b="0" i="0" u="none" strike="noStrike" cap="none" normalizeH="0" baseline="0" dirty="0">
-                <a:ln>
-                  <a:noFill/>
-                </a:ln>
-                <a:solidFill>
-                  <a:srgbClr val="BC1F14"/>
-                </a:solidFill>
-                <a:effectLst/>
-                <a:latin typeface="Arial" panose="020B0604020202020204" pitchFamily="34" charset="0"/>
-                <a:cs typeface="Arial" panose="020B0604020202020204" pitchFamily="34" charset="0"/>
-              </a:rPr>
-              <a:t>  </a:t>
-            </a:r>
-            <a:r>
-              <a:rPr kumimoji="0" lang="pt-PT" altLang="pt-PT" sz="800" b="0" i="0" u="none" strike="noStrike" cap="none" normalizeH="0" baseline="0" dirty="0">
-                <a:ln>
-                  <a:noFill/>
-                </a:ln>
-                <a:solidFill>
-                  <a:schemeClr val="tx1"/>
-                </a:solidFill>
-                <a:effectLst/>
-              </a:rPr>
-              <a:t> </a:t>
-            </a:r>
-            <a:endParaRPr kumimoji="0" lang="pt-PT" altLang="pt-PT" sz="1800" b="0" i="0" u="none" strike="noStrike" cap="none" normalizeH="0" baseline="0" dirty="0">
-              <a:ln>
-                <a:noFill/>
-              </a:ln>
-              <a:solidFill>
-                <a:schemeClr val="tx1"/>
-              </a:solidFill>
-              <a:effectLst/>
-              <a:latin typeface="Arial" panose="020B0604020202020204" pitchFamily="34" charset="0"/>
-            </a:endParaRPr>
-          </a:p>
-        </p:txBody>
-      </p:sp>
-      <p:sp>
-        <p:nvSpPr>
-          <p:cNvPr id="7" name="Rectangle 6">
-            <a:extLst>
-              <a:ext uri="{FF2B5EF4-FFF2-40B4-BE49-F238E27FC236}">
-                <a16:creationId xmlns:a16="http://schemas.microsoft.com/office/drawing/2014/main" id="{29698FB4-8297-432D-BBE3-8FD791C8BC13}"/>
-              </a:ext>
-            </a:extLst>
-          </p:cNvPr>
-          <p:cNvSpPr/>
-          <p:nvPr/>
-        </p:nvSpPr>
-        <p:spPr>
-          <a:xfrm>
-            <a:off x="1290018" y="1844159"/>
-            <a:ext cx="3706464" cy="292388"/>
-          </a:xfrm>
-          <a:prstGeom prst="rect">
-            <a:avLst/>
-          </a:prstGeom>
-        </p:spPr>
-        <p:txBody>
-          <a:bodyPr wrap="none">
-            <a:spAutoFit/>
-          </a:bodyPr>
-          <a:lstStyle/>
-          <a:p>
-            <a:r>
-              <a:rPr lang="en-US" sz="1300" i="1" dirty="0">
-                <a:solidFill>
-                  <a:srgbClr val="555555"/>
-                </a:solidFill>
-                <a:latin typeface="Georgia" panose="02040502050405020303" pitchFamily="18" charset="0"/>
-              </a:rPr>
-              <a:t>The best way to predict the future is to invent it</a:t>
-            </a:r>
-            <a:endParaRPr lang="pt-PT" sz="1300" i="1" dirty="0">
-              <a:solidFill>
-                <a:srgbClr val="555555"/>
-              </a:solidFill>
-              <a:latin typeface="Georgia" panose="02040502050405020303" pitchFamily="18" charset="0"/>
-            </a:endParaRPr>
-          </a:p>
-        </p:txBody>
-      </p:sp>
-    </p:spTree>
-    <p:extLst>
-      <p:ext uri="{BB962C8B-B14F-4D97-AF65-F5344CB8AC3E}">
-        <p14:creationId xmlns:p14="http://schemas.microsoft.com/office/powerpoint/2010/main" val="1823707840"/>
-      </p:ext>
-    </p:extLst>
-  </p:cSld>
-  <p:clrMapOvr>
-    <a:masterClrMapping/>
-  </p:clrMapOvr>
-</p:sld>
-</file>
-
-<file path=ppt/slides/slide7.xml><?xml version="1.0" encoding="utf-8"?>
-<p:sld xmlns:a="http://schemas.openxmlformats.org/drawingml/2006/main" xmlns:r="http://schemas.openxmlformats.org/officeDocument/2006/relationships" xmlns:p="http://schemas.openxmlformats.org/presentationml/2006/main">
-  <p:cSld>
-    <p:bg>
-      <p:bgPr>
-        <a:solidFill>
-          <a:schemeClr val="bg1"/>
-        </a:solidFill>
-        <a:effectLst/>
-      </p:bgPr>
-    </p:bg>
-    <p:spTree>
-      <p:nvGrpSpPr>
-        <p:cNvPr id="1" name=""/>
-        <p:cNvGrpSpPr/>
-        <p:nvPr/>
-      </p:nvGrpSpPr>
-      <p:grpSpPr>
-        <a:xfrm>
-          <a:off x="0" y="0"/>
-          <a:ext cx="0" cy="0"/>
-          <a:chOff x="0" y="0"/>
-          <a:chExt cx="0" cy="0"/>
-        </a:xfrm>
-      </p:grpSpPr>
-      <p:sp>
-        <p:nvSpPr>
-          <p:cNvPr id="10" name="Freeform: Shape 9">
-            <a:extLst>
-              <a:ext uri="{FF2B5EF4-FFF2-40B4-BE49-F238E27FC236}">
-                <a16:creationId xmlns:a16="http://schemas.microsoft.com/office/drawing/2014/main" id="{46C2E80F-49A6-4372-B103-219D417A55ED}"/>
-              </a:ext>
-              <a:ext uri="{C183D7F6-B498-43B3-948B-1728B52AA6E4}">
-                <adec:decorative xmlns:adec="http://schemas.microsoft.com/office/drawing/2017/decorative" val="1"/>
-              </a:ext>
-            </a:extLst>
-          </p:cNvPr>
-          <p:cNvSpPr>
-            <a:spLocks noGrp="1" noRot="1" noChangeAspect="1" noMove="1" noResize="1" noEditPoints="1" noAdjustHandles="1" noChangeArrowheads="1" noChangeShapeType="1" noTextEdit="1"/>
-          </p:cNvSpPr>
-          <p:nvPr>
-            <p:extLst>
-              <p:ext uri="{386F3935-93C4-4BCD-93E2-E3B085C9AB24}">
-                <p16:designElem xmlns:p16="http://schemas.microsoft.com/office/powerpoint/2015/main" val="1"/>
-              </p:ext>
-            </p:extLst>
-          </p:nvPr>
-        </p:nvSpPr>
-        <p:spPr>
-          <a:xfrm>
-            <a:off x="484096" y="470925"/>
-            <a:ext cx="4381009" cy="5892104"/>
-          </a:xfrm>
-          <a:custGeom>
-            <a:avLst/>
-            <a:gdLst>
-              <a:gd name="connsiteX0" fmla="*/ 0 w 4381009"/>
-              <a:gd name="connsiteY0" fmla="*/ 0 h 5892104"/>
-              <a:gd name="connsiteX1" fmla="*/ 4157628 w 4381009"/>
-              <a:gd name="connsiteY1" fmla="*/ 0 h 5892104"/>
-              <a:gd name="connsiteX2" fmla="*/ 4169302 w 4381009"/>
-              <a:gd name="connsiteY2" fmla="*/ 68659 h 5892104"/>
-              <a:gd name="connsiteX3" fmla="*/ 4191571 w 4381009"/>
-              <a:gd name="connsiteY3" fmla="*/ 205472 h 5892104"/>
-              <a:gd name="connsiteX4" fmla="*/ 4213368 w 4381009"/>
-              <a:gd name="connsiteY4" fmla="*/ 342890 h 5892104"/>
-              <a:gd name="connsiteX5" fmla="*/ 4232030 w 4381009"/>
-              <a:gd name="connsiteY5" fmla="*/ 480913 h 5892104"/>
-              <a:gd name="connsiteX6" fmla="*/ 4250848 w 4381009"/>
-              <a:gd name="connsiteY6" fmla="*/ 618332 h 5892104"/>
-              <a:gd name="connsiteX7" fmla="*/ 4268412 w 4381009"/>
-              <a:gd name="connsiteY7" fmla="*/ 756355 h 5892104"/>
-              <a:gd name="connsiteX8" fmla="*/ 4283467 w 4381009"/>
-              <a:gd name="connsiteY8" fmla="*/ 892563 h 5892104"/>
-              <a:gd name="connsiteX9" fmla="*/ 4297737 w 4381009"/>
-              <a:gd name="connsiteY9" fmla="*/ 1030587 h 5892104"/>
-              <a:gd name="connsiteX10" fmla="*/ 4310754 w 4381009"/>
-              <a:gd name="connsiteY10" fmla="*/ 1168005 h 5892104"/>
-              <a:gd name="connsiteX11" fmla="*/ 4322045 w 4381009"/>
-              <a:gd name="connsiteY11" fmla="*/ 1303002 h 5892104"/>
-              <a:gd name="connsiteX12" fmla="*/ 4333336 w 4381009"/>
-              <a:gd name="connsiteY12" fmla="*/ 1439815 h 5892104"/>
-              <a:gd name="connsiteX13" fmla="*/ 4342745 w 4381009"/>
-              <a:gd name="connsiteY13" fmla="*/ 1574812 h 5892104"/>
-              <a:gd name="connsiteX14" fmla="*/ 4350115 w 4381009"/>
-              <a:gd name="connsiteY14" fmla="*/ 1709808 h 5892104"/>
-              <a:gd name="connsiteX15" fmla="*/ 4357799 w 4381009"/>
-              <a:gd name="connsiteY15" fmla="*/ 1844200 h 5892104"/>
-              <a:gd name="connsiteX16" fmla="*/ 4364229 w 4381009"/>
-              <a:gd name="connsiteY16" fmla="*/ 1977381 h 5892104"/>
-              <a:gd name="connsiteX17" fmla="*/ 4368777 w 4381009"/>
-              <a:gd name="connsiteY17" fmla="*/ 2109351 h 5892104"/>
-              <a:gd name="connsiteX18" fmla="*/ 4372697 w 4381009"/>
-              <a:gd name="connsiteY18" fmla="*/ 2241321 h 5892104"/>
-              <a:gd name="connsiteX19" fmla="*/ 4376461 w 4381009"/>
-              <a:gd name="connsiteY19" fmla="*/ 2372080 h 5892104"/>
-              <a:gd name="connsiteX20" fmla="*/ 4378186 w 4381009"/>
-              <a:gd name="connsiteY20" fmla="*/ 2501023 h 5892104"/>
-              <a:gd name="connsiteX21" fmla="*/ 4380068 w 4381009"/>
-              <a:gd name="connsiteY21" fmla="*/ 2629966 h 5892104"/>
-              <a:gd name="connsiteX22" fmla="*/ 4381009 w 4381009"/>
-              <a:gd name="connsiteY22" fmla="*/ 2757093 h 5892104"/>
-              <a:gd name="connsiteX23" fmla="*/ 4380068 w 4381009"/>
-              <a:gd name="connsiteY23" fmla="*/ 2883010 h 5892104"/>
-              <a:gd name="connsiteX24" fmla="*/ 4380068 w 4381009"/>
-              <a:gd name="connsiteY24" fmla="*/ 3007715 h 5892104"/>
-              <a:gd name="connsiteX25" fmla="*/ 4378186 w 4381009"/>
-              <a:gd name="connsiteY25" fmla="*/ 3131210 h 5892104"/>
-              <a:gd name="connsiteX26" fmla="*/ 4375363 w 4381009"/>
-              <a:gd name="connsiteY26" fmla="*/ 3252283 h 5892104"/>
-              <a:gd name="connsiteX27" fmla="*/ 4372697 w 4381009"/>
-              <a:gd name="connsiteY27" fmla="*/ 3372146 h 5892104"/>
-              <a:gd name="connsiteX28" fmla="*/ 4369718 w 4381009"/>
-              <a:gd name="connsiteY28" fmla="*/ 3489587 h 5892104"/>
-              <a:gd name="connsiteX29" fmla="*/ 4365170 w 4381009"/>
-              <a:gd name="connsiteY29" fmla="*/ 3606423 h 5892104"/>
-              <a:gd name="connsiteX30" fmla="*/ 4360309 w 4381009"/>
-              <a:gd name="connsiteY30" fmla="*/ 3721443 h 5892104"/>
-              <a:gd name="connsiteX31" fmla="*/ 4355918 w 4381009"/>
-              <a:gd name="connsiteY31" fmla="*/ 3834041 h 5892104"/>
-              <a:gd name="connsiteX32" fmla="*/ 4343529 w 4381009"/>
-              <a:gd name="connsiteY32" fmla="*/ 4053789 h 5892104"/>
-              <a:gd name="connsiteX33" fmla="*/ 4330356 w 4381009"/>
-              <a:gd name="connsiteY33" fmla="*/ 4264457 h 5892104"/>
-              <a:gd name="connsiteX34" fmla="*/ 4316556 w 4381009"/>
-              <a:gd name="connsiteY34" fmla="*/ 4466650 h 5892104"/>
-              <a:gd name="connsiteX35" fmla="*/ 4301344 w 4381009"/>
-              <a:gd name="connsiteY35" fmla="*/ 4657946 h 5892104"/>
-              <a:gd name="connsiteX36" fmla="*/ 4285506 w 4381009"/>
-              <a:gd name="connsiteY36" fmla="*/ 4840767 h 5892104"/>
-              <a:gd name="connsiteX37" fmla="*/ 4268412 w 4381009"/>
-              <a:gd name="connsiteY37" fmla="*/ 5010269 h 5892104"/>
-              <a:gd name="connsiteX38" fmla="*/ 4251633 w 4381009"/>
-              <a:gd name="connsiteY38" fmla="*/ 5169481 h 5892104"/>
-              <a:gd name="connsiteX39" fmla="*/ 4234853 w 4381009"/>
-              <a:gd name="connsiteY39" fmla="*/ 5315980 h 5892104"/>
-              <a:gd name="connsiteX40" fmla="*/ 4219014 w 4381009"/>
-              <a:gd name="connsiteY40" fmla="*/ 5450371 h 5892104"/>
-              <a:gd name="connsiteX41" fmla="*/ 4203959 w 4381009"/>
-              <a:gd name="connsiteY41" fmla="*/ 5569628 h 5892104"/>
-              <a:gd name="connsiteX42" fmla="*/ 4189689 w 4381009"/>
-              <a:gd name="connsiteY42" fmla="*/ 5677384 h 5892104"/>
-              <a:gd name="connsiteX43" fmla="*/ 4177770 w 4381009"/>
-              <a:gd name="connsiteY43" fmla="*/ 5768189 h 5892104"/>
-              <a:gd name="connsiteX44" fmla="*/ 4166479 w 4381009"/>
-              <a:gd name="connsiteY44" fmla="*/ 5844465 h 5892104"/>
-              <a:gd name="connsiteX45" fmla="*/ 4159132 w 4381009"/>
-              <a:gd name="connsiteY45" fmla="*/ 5892104 h 5892104"/>
-              <a:gd name="connsiteX46" fmla="*/ 0 w 4381009"/>
-              <a:gd name="connsiteY46" fmla="*/ 5892104 h 5892104"/>
-            </a:gdLst>
-            <a:ahLst/>
-            <a:cxnLst>
-              <a:cxn ang="0">
-                <a:pos x="connsiteX0" y="connsiteY0"/>
-              </a:cxn>
-              <a:cxn ang="0">
-                <a:pos x="connsiteX1" y="connsiteY1"/>
-              </a:cxn>
-              <a:cxn ang="0">
-                <a:pos x="connsiteX2" y="connsiteY2"/>
-              </a:cxn>
-              <a:cxn ang="0">
-                <a:pos x="connsiteX3" y="connsiteY3"/>
-              </a:cxn>
-              <a:cxn ang="0">
-                <a:pos x="connsiteX4" y="connsiteY4"/>
-              </a:cxn>
-              <a:cxn ang="0">
-                <a:pos x="connsiteX5" y="connsiteY5"/>
-              </a:cxn>
-              <a:cxn ang="0">
-                <a:pos x="connsiteX6" y="connsiteY6"/>
-              </a:cxn>
-              <a:cxn ang="0">
-                <a:pos x="connsiteX7" y="connsiteY7"/>
-              </a:cxn>
-              <a:cxn ang="0">
-                <a:pos x="connsiteX8" y="connsiteY8"/>
-              </a:cxn>
-              <a:cxn ang="0">
-                <a:pos x="connsiteX9" y="connsiteY9"/>
-              </a:cxn>
-              <a:cxn ang="0">
-                <a:pos x="connsiteX10" y="connsiteY10"/>
-              </a:cxn>
-              <a:cxn ang="0">
-                <a:pos x="connsiteX11" y="connsiteY11"/>
-              </a:cxn>
-              <a:cxn ang="0">
-                <a:pos x="connsiteX12" y="connsiteY12"/>
-              </a:cxn>
-              <a:cxn ang="0">
-                <a:pos x="connsiteX13" y="connsiteY13"/>
-              </a:cxn>
-              <a:cxn ang="0">
-                <a:pos x="connsiteX14" y="connsiteY14"/>
-              </a:cxn>
-              <a:cxn ang="0">
-                <a:pos x="connsiteX15" y="connsiteY15"/>
-              </a:cxn>
-              <a:cxn ang="0">
-                <a:pos x="connsiteX16" y="connsiteY16"/>
-              </a:cxn>
-              <a:cxn ang="0">
-                <a:pos x="connsiteX17" y="connsiteY17"/>
-              </a:cxn>
-              <a:cxn ang="0">
-                <a:pos x="connsiteX18" y="connsiteY18"/>
-              </a:cxn>
-              <a:cxn ang="0">
-                <a:pos x="connsiteX19" y="connsiteY19"/>
-              </a:cxn>
-              <a:cxn ang="0">
-                <a:pos x="connsiteX20" y="connsiteY20"/>
-              </a:cxn>
-              <a:cxn ang="0">
-                <a:pos x="connsiteX21" y="connsiteY21"/>
-              </a:cxn>
-              <a:cxn ang="0">
-                <a:pos x="connsiteX22" y="connsiteY22"/>
-              </a:cxn>
-              <a:cxn ang="0">
-                <a:pos x="connsiteX23" y="connsiteY23"/>
-              </a:cxn>
-              <a:cxn ang="0">
-                <a:pos x="connsiteX24" y="connsiteY24"/>
-              </a:cxn>
-              <a:cxn ang="0">
-                <a:pos x="connsiteX25" y="connsiteY25"/>
-              </a:cxn>
-              <a:cxn ang="0">
-                <a:pos x="connsiteX26" y="connsiteY26"/>
-              </a:cxn>
-              <a:cxn ang="0">
-                <a:pos x="connsiteX27" y="connsiteY27"/>
-              </a:cxn>
-              <a:cxn ang="0">
-                <a:pos x="connsiteX28" y="connsiteY28"/>
-              </a:cxn>
-              <a:cxn ang="0">
-                <a:pos x="connsiteX29" y="connsiteY29"/>
-              </a:cxn>
-              <a:cxn ang="0">
-                <a:pos x="connsiteX30" y="connsiteY30"/>
-              </a:cxn>
-              <a:cxn ang="0">
-                <a:pos x="connsiteX31" y="connsiteY31"/>
-              </a:cxn>
-              <a:cxn ang="0">
-                <a:pos x="connsiteX32" y="connsiteY32"/>
-              </a:cxn>
-              <a:cxn ang="0">
-                <a:pos x="connsiteX33" y="connsiteY33"/>
-              </a:cxn>
-              <a:cxn ang="0">
-                <a:pos x="connsiteX34" y="connsiteY34"/>
-              </a:cxn>
-              <a:cxn ang="0">
-                <a:pos x="connsiteX35" y="connsiteY35"/>
-              </a:cxn>
-              <a:cxn ang="0">
-                <a:pos x="connsiteX36" y="connsiteY36"/>
-              </a:cxn>
-              <a:cxn ang="0">
-                <a:pos x="connsiteX37" y="connsiteY37"/>
-              </a:cxn>
-              <a:cxn ang="0">
-                <a:pos x="connsiteX38" y="connsiteY38"/>
-              </a:cxn>
-              <a:cxn ang="0">
-                <a:pos x="connsiteX39" y="connsiteY39"/>
-              </a:cxn>
-              <a:cxn ang="0">
-                <a:pos x="connsiteX40" y="connsiteY40"/>
-              </a:cxn>
-              <a:cxn ang="0">
-                <a:pos x="connsiteX41" y="connsiteY41"/>
-              </a:cxn>
-              <a:cxn ang="0">
-                <a:pos x="connsiteX42" y="connsiteY42"/>
-              </a:cxn>
-              <a:cxn ang="0">
-                <a:pos x="connsiteX43" y="connsiteY43"/>
-              </a:cxn>
-              <a:cxn ang="0">
-                <a:pos x="connsiteX44" y="connsiteY44"/>
-              </a:cxn>
-              <a:cxn ang="0">
-                <a:pos x="connsiteX45" y="connsiteY45"/>
-              </a:cxn>
-              <a:cxn ang="0">
-                <a:pos x="connsiteX46" y="connsiteY46"/>
-              </a:cxn>
-            </a:cxnLst>
-            <a:rect l="l" t="t" r="r" b="b"/>
-            <a:pathLst>
-              <a:path w="4381009" h="5892104">
-                <a:moveTo>
-                  <a:pt x="0" y="0"/>
-                </a:moveTo>
-                <a:lnTo>
-                  <a:pt x="4157628" y="0"/>
-                </a:lnTo>
-                <a:lnTo>
-                  <a:pt x="4169302" y="68659"/>
-                </a:lnTo>
-                <a:lnTo>
-                  <a:pt x="4191571" y="205472"/>
-                </a:lnTo>
-                <a:lnTo>
-                  <a:pt x="4213368" y="342890"/>
-                </a:lnTo>
-                <a:lnTo>
-                  <a:pt x="4232030" y="480913"/>
-                </a:lnTo>
-                <a:lnTo>
-                  <a:pt x="4250848" y="618332"/>
-                </a:lnTo>
-                <a:lnTo>
-                  <a:pt x="4268412" y="756355"/>
-                </a:lnTo>
-                <a:lnTo>
-                  <a:pt x="4283467" y="892563"/>
-                </a:lnTo>
-                <a:lnTo>
-                  <a:pt x="4297737" y="1030587"/>
-                </a:lnTo>
-                <a:lnTo>
-                  <a:pt x="4310754" y="1168005"/>
-                </a:lnTo>
-                <a:lnTo>
-                  <a:pt x="4322045" y="1303002"/>
-                </a:lnTo>
-                <a:lnTo>
-                  <a:pt x="4333336" y="1439815"/>
-                </a:lnTo>
-                <a:lnTo>
-                  <a:pt x="4342745" y="1574812"/>
-                </a:lnTo>
-                <a:lnTo>
-                  <a:pt x="4350115" y="1709808"/>
-                </a:lnTo>
-                <a:lnTo>
-                  <a:pt x="4357799" y="1844200"/>
-                </a:lnTo>
-                <a:lnTo>
-                  <a:pt x="4364229" y="1977381"/>
-                </a:lnTo>
-                <a:lnTo>
-                  <a:pt x="4368777" y="2109351"/>
-                </a:lnTo>
-                <a:lnTo>
-                  <a:pt x="4372697" y="2241321"/>
-                </a:lnTo>
-                <a:lnTo>
-                  <a:pt x="4376461" y="2372080"/>
-                </a:lnTo>
-                <a:lnTo>
-                  <a:pt x="4378186" y="2501023"/>
-                </a:lnTo>
-                <a:lnTo>
-                  <a:pt x="4380068" y="2629966"/>
-                </a:lnTo>
-                <a:lnTo>
-                  <a:pt x="4381009" y="2757093"/>
-                </a:lnTo>
-                <a:lnTo>
-                  <a:pt x="4380068" y="2883010"/>
-                </a:lnTo>
-                <a:lnTo>
-                  <a:pt x="4380068" y="3007715"/>
-                </a:lnTo>
-                <a:lnTo>
-                  <a:pt x="4378186" y="3131210"/>
-                </a:lnTo>
-                <a:lnTo>
-                  <a:pt x="4375363" y="3252283"/>
-                </a:lnTo>
-                <a:lnTo>
-                  <a:pt x="4372697" y="3372146"/>
-                </a:lnTo>
-                <a:lnTo>
-                  <a:pt x="4369718" y="3489587"/>
-                </a:lnTo>
-                <a:lnTo>
-                  <a:pt x="4365170" y="3606423"/>
-                </a:lnTo>
-                <a:lnTo>
-                  <a:pt x="4360309" y="3721443"/>
-                </a:lnTo>
-                <a:lnTo>
-                  <a:pt x="4355918" y="3834041"/>
-                </a:lnTo>
-                <a:lnTo>
-                  <a:pt x="4343529" y="4053789"/>
-                </a:lnTo>
-                <a:lnTo>
-                  <a:pt x="4330356" y="4264457"/>
-                </a:lnTo>
-                <a:lnTo>
-                  <a:pt x="4316556" y="4466650"/>
-                </a:lnTo>
-                <a:lnTo>
-                  <a:pt x="4301344" y="4657946"/>
-                </a:lnTo>
-                <a:lnTo>
-                  <a:pt x="4285506" y="4840767"/>
-                </a:lnTo>
-                <a:lnTo>
-                  <a:pt x="4268412" y="5010269"/>
-                </a:lnTo>
-                <a:lnTo>
-                  <a:pt x="4251633" y="5169481"/>
-                </a:lnTo>
-                <a:lnTo>
-                  <a:pt x="4234853" y="5315980"/>
-                </a:lnTo>
-                <a:lnTo>
-                  <a:pt x="4219014" y="5450371"/>
-                </a:lnTo>
-                <a:lnTo>
-                  <a:pt x="4203959" y="5569628"/>
-                </a:lnTo>
-                <a:lnTo>
-                  <a:pt x="4189689" y="5677384"/>
-                </a:lnTo>
-                <a:lnTo>
-                  <a:pt x="4177770" y="5768189"/>
-                </a:lnTo>
-                <a:lnTo>
-                  <a:pt x="4166479" y="5844465"/>
-                </a:lnTo>
-                <a:lnTo>
-                  <a:pt x="4159132" y="5892104"/>
-                </a:lnTo>
-                <a:lnTo>
-                  <a:pt x="0" y="5892104"/>
-                </a:lnTo>
-                <a:close/>
-              </a:path>
-            </a:pathLst>
-          </a:custGeom>
-          <a:solidFill>
-            <a:srgbClr val="404040"/>
-          </a:solidFill>
-          <a:ln>
-            <a:noFill/>
-          </a:ln>
-        </p:spPr>
-        <p:style>
-          <a:lnRef idx="2">
-            <a:schemeClr val="accent1">
-              <a:shade val="50000"/>
-            </a:schemeClr>
-          </a:lnRef>
-          <a:fillRef idx="1">
-            <a:schemeClr val="accent1"/>
-          </a:fillRef>
-          <a:effectRef idx="0">
-            <a:schemeClr val="accent1"/>
-          </a:effectRef>
-          <a:fontRef idx="minor">
-            <a:schemeClr val="lt1"/>
-          </a:fontRef>
-        </p:style>
-        <p:txBody>
-          <a:bodyPr wrap="square" rtlCol="0" anchor="ctr">
-            <a:noAutofit/>
-          </a:bodyPr>
-          <a:lstStyle/>
-          <a:p>
-            <a:pPr marL="0" marR="0" lvl="0" indent="0" algn="ctr" defTabSz="457200" rtl="0" eaLnBrk="1" fontAlgn="auto" latinLnBrk="0" hangingPunct="1">
-              <a:lnSpc>
-                <a:spcPct val="100000"/>
-              </a:lnSpc>
-              <a:spcBef>
-                <a:spcPts val="0"/>
-              </a:spcBef>
-              <a:spcAft>
-                <a:spcPts val="0"/>
-              </a:spcAft>
-              <a:buClrTx/>
-              <a:buSzTx/>
-              <a:buFontTx/>
-              <a:buNone/>
-              <a:tabLst/>
-              <a:defRPr/>
-            </a:pPr>
-            <a:endParaRPr kumimoji="0" lang="en-US" sz="1800" b="0" i="0" u="none" strike="noStrike" kern="1200" cap="none" spc="0" normalizeH="0" baseline="0" noProof="0">
-              <a:ln>
-                <a:noFill/>
-              </a:ln>
-              <a:solidFill>
-                <a:prstClr val="white"/>
-              </a:solidFill>
-              <a:effectLst/>
-              <a:uLnTx/>
-              <a:uFillTx/>
-              <a:latin typeface="Calibri" panose="020F0502020204030204"/>
-              <a:ea typeface="+mn-ea"/>
-              <a:cs typeface="+mn-cs"/>
-            </a:endParaRPr>
-          </a:p>
-        </p:txBody>
-      </p:sp>
-      <p:sp>
-        <p:nvSpPr>
-          <p:cNvPr id="2" name="Title 1">
-            <a:extLst>
-              <a:ext uri="{FF2B5EF4-FFF2-40B4-BE49-F238E27FC236}">
-                <a16:creationId xmlns:a16="http://schemas.microsoft.com/office/drawing/2014/main" id="{063582E3-AB01-4845-97B2-7A81B9EAE690}"/>
-              </a:ext>
-            </a:extLst>
-          </p:cNvPr>
-          <p:cNvSpPr>
-            <a:spLocks noGrp="1"/>
-          </p:cNvSpPr>
-          <p:nvPr>
-            <p:ph type="title"/>
-          </p:nvPr>
-        </p:nvSpPr>
-        <p:spPr>
-          <a:xfrm>
-            <a:off x="863028" y="1012004"/>
-            <a:ext cx="3594671" cy="4795408"/>
-          </a:xfrm>
-        </p:spPr>
-        <p:txBody>
-          <a:bodyPr>
-            <a:normAutofit/>
-          </a:bodyPr>
-          <a:lstStyle/>
-          <a:p>
-            <a:br>
-              <a:rPr lang="en-US" dirty="0">
-                <a:solidFill>
-                  <a:srgbClr val="FFFFFF"/>
-                </a:solidFill>
-              </a:rPr>
-            </a:br>
-            <a:r>
-              <a:rPr lang="en-US" dirty="0">
-                <a:solidFill>
-                  <a:srgbClr val="FFFFFF"/>
-                </a:solidFill>
-              </a:rPr>
-              <a:t>Code base</a:t>
-            </a:r>
-            <a:endParaRPr lang="pt-PT" dirty="0">
-              <a:solidFill>
-                <a:srgbClr val="FFFFFF"/>
-              </a:solidFill>
-            </a:endParaRPr>
-          </a:p>
-        </p:txBody>
-      </p:sp>
-      <p:graphicFrame>
-        <p:nvGraphicFramePr>
-          <p:cNvPr id="5" name="Content Placeholder 2">
-            <a:extLst>
-              <a:ext uri="{FF2B5EF4-FFF2-40B4-BE49-F238E27FC236}">
-                <a16:creationId xmlns:a16="http://schemas.microsoft.com/office/drawing/2014/main" id="{666B1FCB-EFAB-45A2-BC2F-816280581451}"/>
-              </a:ext>
-            </a:extLst>
-          </p:cNvPr>
-          <p:cNvGraphicFramePr>
-            <a:graphicFrameLocks noGrp="1"/>
-          </p:cNvGraphicFramePr>
-          <p:nvPr>
-            <p:ph idx="1"/>
-            <p:extLst>
-              <p:ext uri="{D42A27DB-BD31-4B8C-83A1-F6EECF244321}">
-                <p14:modId xmlns:p14="http://schemas.microsoft.com/office/powerpoint/2010/main" val="899675906"/>
-              </p:ext>
-            </p:extLst>
-          </p:nvPr>
-        </p:nvGraphicFramePr>
-        <p:xfrm>
-          <a:off x="5194300" y="470924"/>
-          <a:ext cx="6513604" cy="5885426"/>
-        </p:xfrm>
-        <a:graphic>
-          <a:graphicData uri="http://schemas.openxmlformats.org/drawingml/2006/diagram">
-            <dgm:relIds xmlns:dgm="http://schemas.openxmlformats.org/drawingml/2006/diagram" xmlns:r="http://schemas.openxmlformats.org/officeDocument/2006/relationships" r:dm="rId2" r:lo="rId3" r:qs="rId4" r:cs="rId5"/>
-          </a:graphicData>
-        </a:graphic>
-      </p:graphicFrame>
-    </p:spTree>
-    <p:extLst>
-      <p:ext uri="{BB962C8B-B14F-4D97-AF65-F5344CB8AC3E}">
-        <p14:creationId xmlns:p14="http://schemas.microsoft.com/office/powerpoint/2010/main" val="598750512"/>
-      </p:ext>
-    </p:extLst>
-  </p:cSld>
-  <p:clrMapOvr>
-    <a:masterClrMapping/>
-  </p:clrMapOvr>
-</p:sld>
-</file>
-
-<file path=ppt/slides/slide8.xml><?xml version="1.0" encoding="utf-8"?>
-<p:sld xmlns:a="http://schemas.openxmlformats.org/drawingml/2006/main" xmlns:r="http://schemas.openxmlformats.org/officeDocument/2006/relationships" xmlns:p="http://schemas.openxmlformats.org/presentationml/2006/main">
-  <p:cSld>
-    <p:spTree>
-      <p:nvGrpSpPr>
-        <p:cNvPr id="1" name=""/>
-        <p:cNvGrpSpPr/>
-        <p:nvPr/>
-      </p:nvGrpSpPr>
-      <p:grpSpPr>
-        <a:xfrm>
-          <a:off x="0" y="0"/>
-          <a:ext cx="0" cy="0"/>
-          <a:chOff x="0" y="0"/>
-          <a:chExt cx="0" cy="0"/>
-        </a:xfrm>
-      </p:grpSpPr>
       <p:sp>
         <p:nvSpPr>
           <p:cNvPr id="6" name="Rectangle 5">
@@ -22643,7 +21870,7 @@
 </p:sld>
 </file>
 
-<file path=ppt/slides/slide9.xml><?xml version="1.0" encoding="utf-8"?>
+<file path=ppt/slides/slide7.xml><?xml version="1.0" encoding="utf-8"?>
 <p:sld xmlns:a="http://schemas.openxmlformats.org/drawingml/2006/main" xmlns:r="http://schemas.openxmlformats.org/officeDocument/2006/relationships" xmlns:p="http://schemas.openxmlformats.org/presentationml/2006/main">
   <p:cSld>
     <p:bg>
@@ -23244,6 +22471,779 @@
 </p:sld>
 </file>
 
+<file path=ppt/slides/slide8.xml><?xml version="1.0" encoding="utf-8"?>
+<p:sld xmlns:a="http://schemas.openxmlformats.org/drawingml/2006/main" xmlns:r="http://schemas.openxmlformats.org/officeDocument/2006/relationships" xmlns:p="http://schemas.openxmlformats.org/presentationml/2006/main">
+  <p:cSld>
+    <p:spTree>
+      <p:nvGrpSpPr>
+        <p:cNvPr id="1" name=""/>
+        <p:cNvGrpSpPr/>
+        <p:nvPr/>
+      </p:nvGrpSpPr>
+      <p:grpSpPr>
+        <a:xfrm>
+          <a:off x="0" y="0"/>
+          <a:ext cx="0" cy="0"/>
+          <a:chOff x="0" y="0"/>
+          <a:chExt cx="0" cy="0"/>
+        </a:xfrm>
+      </p:grpSpPr>
+      <p:pic>
+        <p:nvPicPr>
+          <p:cNvPr id="4" name="Picture 3">
+            <a:extLst>
+              <a:ext uri="{FF2B5EF4-FFF2-40B4-BE49-F238E27FC236}">
+                <a16:creationId xmlns:a16="http://schemas.microsoft.com/office/drawing/2014/main" id="{CAB0B4C3-D283-4895-ADAA-8382B8A04A51}"/>
+              </a:ext>
+            </a:extLst>
+          </p:cNvPr>
+          <p:cNvPicPr>
+            <a:picLocks noChangeAspect="1"/>
+          </p:cNvPicPr>
+          <p:nvPr/>
+        </p:nvPicPr>
+        <p:blipFill>
+          <a:blip r:embed="rId2"/>
+          <a:stretch>
+            <a:fillRect/>
+          </a:stretch>
+        </p:blipFill>
+        <p:spPr>
+          <a:xfrm>
+            <a:off x="7311684" y="468483"/>
+            <a:ext cx="4223091" cy="5921033"/>
+          </a:xfrm>
+          <a:prstGeom prst="rect">
+            <a:avLst/>
+          </a:prstGeom>
+        </p:spPr>
+      </p:pic>
+      <p:sp>
+        <p:nvSpPr>
+          <p:cNvPr id="5" name="Rectangle 4">
+            <a:extLst>
+              <a:ext uri="{FF2B5EF4-FFF2-40B4-BE49-F238E27FC236}">
+                <a16:creationId xmlns:a16="http://schemas.microsoft.com/office/drawing/2014/main" id="{46309C1B-F337-49C0-9FF5-4DBD46BEE6DD}"/>
+              </a:ext>
+            </a:extLst>
+          </p:cNvPr>
+          <p:cNvSpPr/>
+          <p:nvPr/>
+        </p:nvSpPr>
+        <p:spPr>
+          <a:xfrm>
+            <a:off x="458634" y="1686609"/>
+            <a:ext cx="6330471" cy="646331"/>
+          </a:xfrm>
+          <a:prstGeom prst="rect">
+            <a:avLst/>
+          </a:prstGeom>
+        </p:spPr>
+        <p:txBody>
+          <a:bodyPr wrap="square">
+            <a:spAutoFit/>
+          </a:bodyPr>
+          <a:lstStyle/>
+          <a:p>
+            <a:r>
+              <a:rPr lang="en-US" dirty="0">
+                <a:solidFill>
+                  <a:srgbClr val="14171A"/>
+                </a:solidFill>
+                <a:latin typeface="Segoe UI" panose="020B0502040204020203" pitchFamily="34" charset="0"/>
+              </a:rPr>
+              <a:t>“</a:t>
+            </a:r>
+            <a:r>
+              <a:rPr lang="en-US" sz="1300" i="1" dirty="0">
+                <a:solidFill>
+                  <a:srgbClr val="555555"/>
+                </a:solidFill>
+                <a:latin typeface="Georgia" panose="02040502050405020303" pitchFamily="18" charset="0"/>
+              </a:rPr>
+              <a:t>If you can get today’s work done today, but you do it in such a way that you can’t possibly get tomorrow’s work done tomorrow, then you lose.</a:t>
+            </a:r>
+            <a:r>
+              <a:rPr lang="en-US" dirty="0">
+                <a:solidFill>
+                  <a:srgbClr val="14171A"/>
+                </a:solidFill>
+                <a:latin typeface="Segoe UI" panose="020B0502040204020203" pitchFamily="34" charset="0"/>
+              </a:rPr>
+              <a:t>”</a:t>
+            </a:r>
+            <a:endParaRPr lang="pt-PT" dirty="0"/>
+          </a:p>
+        </p:txBody>
+      </p:sp>
+      <p:sp>
+        <p:nvSpPr>
+          <p:cNvPr id="6" name="Rectangle 5">
+            <a:extLst>
+              <a:ext uri="{FF2B5EF4-FFF2-40B4-BE49-F238E27FC236}">
+                <a16:creationId xmlns:a16="http://schemas.microsoft.com/office/drawing/2014/main" id="{3FC58155-FDE6-4C05-8A19-A7C1A2E79B0D}"/>
+              </a:ext>
+            </a:extLst>
+          </p:cNvPr>
+          <p:cNvSpPr/>
+          <p:nvPr/>
+        </p:nvSpPr>
+        <p:spPr>
+          <a:xfrm>
+            <a:off x="575869" y="3266986"/>
+            <a:ext cx="6096000" cy="923330"/>
+          </a:xfrm>
+          <a:prstGeom prst="rect">
+            <a:avLst/>
+          </a:prstGeom>
+        </p:spPr>
+        <p:txBody>
+          <a:bodyPr>
+            <a:spAutoFit/>
+          </a:bodyPr>
+          <a:lstStyle/>
+          <a:p>
+            <a:r>
+              <a:rPr lang="en-US" dirty="0">
+                <a:solidFill>
+                  <a:srgbClr val="181818"/>
+                </a:solidFill>
+                <a:latin typeface="Merriweather"/>
+              </a:rPr>
+              <a:t>“</a:t>
+            </a:r>
+            <a:r>
+              <a:rPr lang="en-US" sz="1300" i="1" dirty="0">
+                <a:solidFill>
+                  <a:srgbClr val="555555"/>
+                </a:solidFill>
+                <a:latin typeface="Georgia" panose="02040502050405020303" pitchFamily="18" charset="0"/>
+              </a:rPr>
+              <a:t>Poorly designed code usually takes more code to do the same things, often because the code quite literally does the same thing in several places</a:t>
+            </a:r>
+            <a:r>
+              <a:rPr lang="en-US" dirty="0">
+                <a:solidFill>
+                  <a:srgbClr val="181818"/>
+                </a:solidFill>
+                <a:latin typeface="Merriweather"/>
+              </a:rPr>
+              <a:t>.” </a:t>
+            </a:r>
+            <a:br>
+              <a:rPr lang="en-US" dirty="0"/>
+            </a:br>
+            <a:endParaRPr lang="pt-PT" dirty="0"/>
+          </a:p>
+        </p:txBody>
+      </p:sp>
+    </p:spTree>
+    <p:extLst>
+      <p:ext uri="{BB962C8B-B14F-4D97-AF65-F5344CB8AC3E}">
+        <p14:creationId xmlns:p14="http://schemas.microsoft.com/office/powerpoint/2010/main" val="2829717902"/>
+      </p:ext>
+    </p:extLst>
+  </p:cSld>
+  <p:clrMapOvr>
+    <a:masterClrMapping/>
+  </p:clrMapOvr>
+</p:sld>
+</file>
+
+<file path=ppt/slides/slide9.xml><?xml version="1.0" encoding="utf-8"?>
+<p:sld xmlns:a="http://schemas.openxmlformats.org/drawingml/2006/main" xmlns:r="http://schemas.openxmlformats.org/officeDocument/2006/relationships" xmlns:p="http://schemas.openxmlformats.org/presentationml/2006/main">
+  <p:cSld>
+    <p:bg>
+      <p:bgPr>
+        <a:solidFill>
+          <a:schemeClr val="bg1"/>
+        </a:solidFill>
+        <a:effectLst/>
+      </p:bgPr>
+    </p:bg>
+    <p:spTree>
+      <p:nvGrpSpPr>
+        <p:cNvPr id="1" name=""/>
+        <p:cNvGrpSpPr/>
+        <p:nvPr/>
+      </p:nvGrpSpPr>
+      <p:grpSpPr>
+        <a:xfrm>
+          <a:off x="0" y="0"/>
+          <a:ext cx="0" cy="0"/>
+          <a:chOff x="0" y="0"/>
+          <a:chExt cx="0" cy="0"/>
+        </a:xfrm>
+      </p:grpSpPr>
+      <p:sp>
+        <p:nvSpPr>
+          <p:cNvPr id="10" name="Freeform: Shape 9">
+            <a:extLst>
+              <a:ext uri="{FF2B5EF4-FFF2-40B4-BE49-F238E27FC236}">
+                <a16:creationId xmlns:a16="http://schemas.microsoft.com/office/drawing/2014/main" id="{46C2E80F-49A6-4372-B103-219D417A55ED}"/>
+              </a:ext>
+              <a:ext uri="{C183D7F6-B498-43B3-948B-1728B52AA6E4}">
+                <adec:decorative xmlns:adec="http://schemas.microsoft.com/office/drawing/2017/decorative" val="1"/>
+              </a:ext>
+            </a:extLst>
+          </p:cNvPr>
+          <p:cNvSpPr>
+            <a:spLocks noGrp="1" noRot="1" noChangeAspect="1" noMove="1" noResize="1" noEditPoints="1" noAdjustHandles="1" noChangeArrowheads="1" noChangeShapeType="1" noTextEdit="1"/>
+          </p:cNvSpPr>
+          <p:nvPr>
+            <p:extLst>
+              <p:ext uri="{386F3935-93C4-4BCD-93E2-E3B085C9AB24}">
+                <p16:designElem xmlns:p16="http://schemas.microsoft.com/office/powerpoint/2015/main" val="1"/>
+              </p:ext>
+            </p:extLst>
+          </p:nvPr>
+        </p:nvSpPr>
+        <p:spPr>
+          <a:xfrm>
+            <a:off x="484096" y="470925"/>
+            <a:ext cx="4381009" cy="5892104"/>
+          </a:xfrm>
+          <a:custGeom>
+            <a:avLst/>
+            <a:gdLst>
+              <a:gd name="connsiteX0" fmla="*/ 0 w 4381009"/>
+              <a:gd name="connsiteY0" fmla="*/ 0 h 5892104"/>
+              <a:gd name="connsiteX1" fmla="*/ 4157628 w 4381009"/>
+              <a:gd name="connsiteY1" fmla="*/ 0 h 5892104"/>
+              <a:gd name="connsiteX2" fmla="*/ 4169302 w 4381009"/>
+              <a:gd name="connsiteY2" fmla="*/ 68659 h 5892104"/>
+              <a:gd name="connsiteX3" fmla="*/ 4191571 w 4381009"/>
+              <a:gd name="connsiteY3" fmla="*/ 205472 h 5892104"/>
+              <a:gd name="connsiteX4" fmla="*/ 4213368 w 4381009"/>
+              <a:gd name="connsiteY4" fmla="*/ 342890 h 5892104"/>
+              <a:gd name="connsiteX5" fmla="*/ 4232030 w 4381009"/>
+              <a:gd name="connsiteY5" fmla="*/ 480913 h 5892104"/>
+              <a:gd name="connsiteX6" fmla="*/ 4250848 w 4381009"/>
+              <a:gd name="connsiteY6" fmla="*/ 618332 h 5892104"/>
+              <a:gd name="connsiteX7" fmla="*/ 4268412 w 4381009"/>
+              <a:gd name="connsiteY7" fmla="*/ 756355 h 5892104"/>
+              <a:gd name="connsiteX8" fmla="*/ 4283467 w 4381009"/>
+              <a:gd name="connsiteY8" fmla="*/ 892563 h 5892104"/>
+              <a:gd name="connsiteX9" fmla="*/ 4297737 w 4381009"/>
+              <a:gd name="connsiteY9" fmla="*/ 1030587 h 5892104"/>
+              <a:gd name="connsiteX10" fmla="*/ 4310754 w 4381009"/>
+              <a:gd name="connsiteY10" fmla="*/ 1168005 h 5892104"/>
+              <a:gd name="connsiteX11" fmla="*/ 4322045 w 4381009"/>
+              <a:gd name="connsiteY11" fmla="*/ 1303002 h 5892104"/>
+              <a:gd name="connsiteX12" fmla="*/ 4333336 w 4381009"/>
+              <a:gd name="connsiteY12" fmla="*/ 1439815 h 5892104"/>
+              <a:gd name="connsiteX13" fmla="*/ 4342745 w 4381009"/>
+              <a:gd name="connsiteY13" fmla="*/ 1574812 h 5892104"/>
+              <a:gd name="connsiteX14" fmla="*/ 4350115 w 4381009"/>
+              <a:gd name="connsiteY14" fmla="*/ 1709808 h 5892104"/>
+              <a:gd name="connsiteX15" fmla="*/ 4357799 w 4381009"/>
+              <a:gd name="connsiteY15" fmla="*/ 1844200 h 5892104"/>
+              <a:gd name="connsiteX16" fmla="*/ 4364229 w 4381009"/>
+              <a:gd name="connsiteY16" fmla="*/ 1977381 h 5892104"/>
+              <a:gd name="connsiteX17" fmla="*/ 4368777 w 4381009"/>
+              <a:gd name="connsiteY17" fmla="*/ 2109351 h 5892104"/>
+              <a:gd name="connsiteX18" fmla="*/ 4372697 w 4381009"/>
+              <a:gd name="connsiteY18" fmla="*/ 2241321 h 5892104"/>
+              <a:gd name="connsiteX19" fmla="*/ 4376461 w 4381009"/>
+              <a:gd name="connsiteY19" fmla="*/ 2372080 h 5892104"/>
+              <a:gd name="connsiteX20" fmla="*/ 4378186 w 4381009"/>
+              <a:gd name="connsiteY20" fmla="*/ 2501023 h 5892104"/>
+              <a:gd name="connsiteX21" fmla="*/ 4380068 w 4381009"/>
+              <a:gd name="connsiteY21" fmla="*/ 2629966 h 5892104"/>
+              <a:gd name="connsiteX22" fmla="*/ 4381009 w 4381009"/>
+              <a:gd name="connsiteY22" fmla="*/ 2757093 h 5892104"/>
+              <a:gd name="connsiteX23" fmla="*/ 4380068 w 4381009"/>
+              <a:gd name="connsiteY23" fmla="*/ 2883010 h 5892104"/>
+              <a:gd name="connsiteX24" fmla="*/ 4380068 w 4381009"/>
+              <a:gd name="connsiteY24" fmla="*/ 3007715 h 5892104"/>
+              <a:gd name="connsiteX25" fmla="*/ 4378186 w 4381009"/>
+              <a:gd name="connsiteY25" fmla="*/ 3131210 h 5892104"/>
+              <a:gd name="connsiteX26" fmla="*/ 4375363 w 4381009"/>
+              <a:gd name="connsiteY26" fmla="*/ 3252283 h 5892104"/>
+              <a:gd name="connsiteX27" fmla="*/ 4372697 w 4381009"/>
+              <a:gd name="connsiteY27" fmla="*/ 3372146 h 5892104"/>
+              <a:gd name="connsiteX28" fmla="*/ 4369718 w 4381009"/>
+              <a:gd name="connsiteY28" fmla="*/ 3489587 h 5892104"/>
+              <a:gd name="connsiteX29" fmla="*/ 4365170 w 4381009"/>
+              <a:gd name="connsiteY29" fmla="*/ 3606423 h 5892104"/>
+              <a:gd name="connsiteX30" fmla="*/ 4360309 w 4381009"/>
+              <a:gd name="connsiteY30" fmla="*/ 3721443 h 5892104"/>
+              <a:gd name="connsiteX31" fmla="*/ 4355918 w 4381009"/>
+              <a:gd name="connsiteY31" fmla="*/ 3834041 h 5892104"/>
+              <a:gd name="connsiteX32" fmla="*/ 4343529 w 4381009"/>
+              <a:gd name="connsiteY32" fmla="*/ 4053789 h 5892104"/>
+              <a:gd name="connsiteX33" fmla="*/ 4330356 w 4381009"/>
+              <a:gd name="connsiteY33" fmla="*/ 4264457 h 5892104"/>
+              <a:gd name="connsiteX34" fmla="*/ 4316556 w 4381009"/>
+              <a:gd name="connsiteY34" fmla="*/ 4466650 h 5892104"/>
+              <a:gd name="connsiteX35" fmla="*/ 4301344 w 4381009"/>
+              <a:gd name="connsiteY35" fmla="*/ 4657946 h 5892104"/>
+              <a:gd name="connsiteX36" fmla="*/ 4285506 w 4381009"/>
+              <a:gd name="connsiteY36" fmla="*/ 4840767 h 5892104"/>
+              <a:gd name="connsiteX37" fmla="*/ 4268412 w 4381009"/>
+              <a:gd name="connsiteY37" fmla="*/ 5010269 h 5892104"/>
+              <a:gd name="connsiteX38" fmla="*/ 4251633 w 4381009"/>
+              <a:gd name="connsiteY38" fmla="*/ 5169481 h 5892104"/>
+              <a:gd name="connsiteX39" fmla="*/ 4234853 w 4381009"/>
+              <a:gd name="connsiteY39" fmla="*/ 5315980 h 5892104"/>
+              <a:gd name="connsiteX40" fmla="*/ 4219014 w 4381009"/>
+              <a:gd name="connsiteY40" fmla="*/ 5450371 h 5892104"/>
+              <a:gd name="connsiteX41" fmla="*/ 4203959 w 4381009"/>
+              <a:gd name="connsiteY41" fmla="*/ 5569628 h 5892104"/>
+              <a:gd name="connsiteX42" fmla="*/ 4189689 w 4381009"/>
+              <a:gd name="connsiteY42" fmla="*/ 5677384 h 5892104"/>
+              <a:gd name="connsiteX43" fmla="*/ 4177770 w 4381009"/>
+              <a:gd name="connsiteY43" fmla="*/ 5768189 h 5892104"/>
+              <a:gd name="connsiteX44" fmla="*/ 4166479 w 4381009"/>
+              <a:gd name="connsiteY44" fmla="*/ 5844465 h 5892104"/>
+              <a:gd name="connsiteX45" fmla="*/ 4159132 w 4381009"/>
+              <a:gd name="connsiteY45" fmla="*/ 5892104 h 5892104"/>
+              <a:gd name="connsiteX46" fmla="*/ 0 w 4381009"/>
+              <a:gd name="connsiteY46" fmla="*/ 5892104 h 5892104"/>
+            </a:gdLst>
+            <a:ahLst/>
+            <a:cxnLst>
+              <a:cxn ang="0">
+                <a:pos x="connsiteX0" y="connsiteY0"/>
+              </a:cxn>
+              <a:cxn ang="0">
+                <a:pos x="connsiteX1" y="connsiteY1"/>
+              </a:cxn>
+              <a:cxn ang="0">
+                <a:pos x="connsiteX2" y="connsiteY2"/>
+              </a:cxn>
+              <a:cxn ang="0">
+                <a:pos x="connsiteX3" y="connsiteY3"/>
+              </a:cxn>
+              <a:cxn ang="0">
+                <a:pos x="connsiteX4" y="connsiteY4"/>
+              </a:cxn>
+              <a:cxn ang="0">
+                <a:pos x="connsiteX5" y="connsiteY5"/>
+              </a:cxn>
+              <a:cxn ang="0">
+                <a:pos x="connsiteX6" y="connsiteY6"/>
+              </a:cxn>
+              <a:cxn ang="0">
+                <a:pos x="connsiteX7" y="connsiteY7"/>
+              </a:cxn>
+              <a:cxn ang="0">
+                <a:pos x="connsiteX8" y="connsiteY8"/>
+              </a:cxn>
+              <a:cxn ang="0">
+                <a:pos x="connsiteX9" y="connsiteY9"/>
+              </a:cxn>
+              <a:cxn ang="0">
+                <a:pos x="connsiteX10" y="connsiteY10"/>
+              </a:cxn>
+              <a:cxn ang="0">
+                <a:pos x="connsiteX11" y="connsiteY11"/>
+              </a:cxn>
+              <a:cxn ang="0">
+                <a:pos x="connsiteX12" y="connsiteY12"/>
+              </a:cxn>
+              <a:cxn ang="0">
+                <a:pos x="connsiteX13" y="connsiteY13"/>
+              </a:cxn>
+              <a:cxn ang="0">
+                <a:pos x="connsiteX14" y="connsiteY14"/>
+              </a:cxn>
+              <a:cxn ang="0">
+                <a:pos x="connsiteX15" y="connsiteY15"/>
+              </a:cxn>
+              <a:cxn ang="0">
+                <a:pos x="connsiteX16" y="connsiteY16"/>
+              </a:cxn>
+              <a:cxn ang="0">
+                <a:pos x="connsiteX17" y="connsiteY17"/>
+              </a:cxn>
+              <a:cxn ang="0">
+                <a:pos x="connsiteX18" y="connsiteY18"/>
+              </a:cxn>
+              <a:cxn ang="0">
+                <a:pos x="connsiteX19" y="connsiteY19"/>
+              </a:cxn>
+              <a:cxn ang="0">
+                <a:pos x="connsiteX20" y="connsiteY20"/>
+              </a:cxn>
+              <a:cxn ang="0">
+                <a:pos x="connsiteX21" y="connsiteY21"/>
+              </a:cxn>
+              <a:cxn ang="0">
+                <a:pos x="connsiteX22" y="connsiteY22"/>
+              </a:cxn>
+              <a:cxn ang="0">
+                <a:pos x="connsiteX23" y="connsiteY23"/>
+              </a:cxn>
+              <a:cxn ang="0">
+                <a:pos x="connsiteX24" y="connsiteY24"/>
+              </a:cxn>
+              <a:cxn ang="0">
+                <a:pos x="connsiteX25" y="connsiteY25"/>
+              </a:cxn>
+              <a:cxn ang="0">
+                <a:pos x="connsiteX26" y="connsiteY26"/>
+              </a:cxn>
+              <a:cxn ang="0">
+                <a:pos x="connsiteX27" y="connsiteY27"/>
+              </a:cxn>
+              <a:cxn ang="0">
+                <a:pos x="connsiteX28" y="connsiteY28"/>
+              </a:cxn>
+              <a:cxn ang="0">
+                <a:pos x="connsiteX29" y="connsiteY29"/>
+              </a:cxn>
+              <a:cxn ang="0">
+                <a:pos x="connsiteX30" y="connsiteY30"/>
+              </a:cxn>
+              <a:cxn ang="0">
+                <a:pos x="connsiteX31" y="connsiteY31"/>
+              </a:cxn>
+              <a:cxn ang="0">
+                <a:pos x="connsiteX32" y="connsiteY32"/>
+              </a:cxn>
+              <a:cxn ang="0">
+                <a:pos x="connsiteX33" y="connsiteY33"/>
+              </a:cxn>
+              <a:cxn ang="0">
+                <a:pos x="connsiteX34" y="connsiteY34"/>
+              </a:cxn>
+              <a:cxn ang="0">
+                <a:pos x="connsiteX35" y="connsiteY35"/>
+              </a:cxn>
+              <a:cxn ang="0">
+                <a:pos x="connsiteX36" y="connsiteY36"/>
+              </a:cxn>
+              <a:cxn ang="0">
+                <a:pos x="connsiteX37" y="connsiteY37"/>
+              </a:cxn>
+              <a:cxn ang="0">
+                <a:pos x="connsiteX38" y="connsiteY38"/>
+              </a:cxn>
+              <a:cxn ang="0">
+                <a:pos x="connsiteX39" y="connsiteY39"/>
+              </a:cxn>
+              <a:cxn ang="0">
+                <a:pos x="connsiteX40" y="connsiteY40"/>
+              </a:cxn>
+              <a:cxn ang="0">
+                <a:pos x="connsiteX41" y="connsiteY41"/>
+              </a:cxn>
+              <a:cxn ang="0">
+                <a:pos x="connsiteX42" y="connsiteY42"/>
+              </a:cxn>
+              <a:cxn ang="0">
+                <a:pos x="connsiteX43" y="connsiteY43"/>
+              </a:cxn>
+              <a:cxn ang="0">
+                <a:pos x="connsiteX44" y="connsiteY44"/>
+              </a:cxn>
+              <a:cxn ang="0">
+                <a:pos x="connsiteX45" y="connsiteY45"/>
+              </a:cxn>
+              <a:cxn ang="0">
+                <a:pos x="connsiteX46" y="connsiteY46"/>
+              </a:cxn>
+            </a:cxnLst>
+            <a:rect l="l" t="t" r="r" b="b"/>
+            <a:pathLst>
+              <a:path w="4381009" h="5892104">
+                <a:moveTo>
+                  <a:pt x="0" y="0"/>
+                </a:moveTo>
+                <a:lnTo>
+                  <a:pt x="4157628" y="0"/>
+                </a:lnTo>
+                <a:lnTo>
+                  <a:pt x="4169302" y="68659"/>
+                </a:lnTo>
+                <a:lnTo>
+                  <a:pt x="4191571" y="205472"/>
+                </a:lnTo>
+                <a:lnTo>
+                  <a:pt x="4213368" y="342890"/>
+                </a:lnTo>
+                <a:lnTo>
+                  <a:pt x="4232030" y="480913"/>
+                </a:lnTo>
+                <a:lnTo>
+                  <a:pt x="4250848" y="618332"/>
+                </a:lnTo>
+                <a:lnTo>
+                  <a:pt x="4268412" y="756355"/>
+                </a:lnTo>
+                <a:lnTo>
+                  <a:pt x="4283467" y="892563"/>
+                </a:lnTo>
+                <a:lnTo>
+                  <a:pt x="4297737" y="1030587"/>
+                </a:lnTo>
+                <a:lnTo>
+                  <a:pt x="4310754" y="1168005"/>
+                </a:lnTo>
+                <a:lnTo>
+                  <a:pt x="4322045" y="1303002"/>
+                </a:lnTo>
+                <a:lnTo>
+                  <a:pt x="4333336" y="1439815"/>
+                </a:lnTo>
+                <a:lnTo>
+                  <a:pt x="4342745" y="1574812"/>
+                </a:lnTo>
+                <a:lnTo>
+                  <a:pt x="4350115" y="1709808"/>
+                </a:lnTo>
+                <a:lnTo>
+                  <a:pt x="4357799" y="1844200"/>
+                </a:lnTo>
+                <a:lnTo>
+                  <a:pt x="4364229" y="1977381"/>
+                </a:lnTo>
+                <a:lnTo>
+                  <a:pt x="4368777" y="2109351"/>
+                </a:lnTo>
+                <a:lnTo>
+                  <a:pt x="4372697" y="2241321"/>
+                </a:lnTo>
+                <a:lnTo>
+                  <a:pt x="4376461" y="2372080"/>
+                </a:lnTo>
+                <a:lnTo>
+                  <a:pt x="4378186" y="2501023"/>
+                </a:lnTo>
+                <a:lnTo>
+                  <a:pt x="4380068" y="2629966"/>
+                </a:lnTo>
+                <a:lnTo>
+                  <a:pt x="4381009" y="2757093"/>
+                </a:lnTo>
+                <a:lnTo>
+                  <a:pt x="4380068" y="2883010"/>
+                </a:lnTo>
+                <a:lnTo>
+                  <a:pt x="4380068" y="3007715"/>
+                </a:lnTo>
+                <a:lnTo>
+                  <a:pt x="4378186" y="3131210"/>
+                </a:lnTo>
+                <a:lnTo>
+                  <a:pt x="4375363" y="3252283"/>
+                </a:lnTo>
+                <a:lnTo>
+                  <a:pt x="4372697" y="3372146"/>
+                </a:lnTo>
+                <a:lnTo>
+                  <a:pt x="4369718" y="3489587"/>
+                </a:lnTo>
+                <a:lnTo>
+                  <a:pt x="4365170" y="3606423"/>
+                </a:lnTo>
+                <a:lnTo>
+                  <a:pt x="4360309" y="3721443"/>
+                </a:lnTo>
+                <a:lnTo>
+                  <a:pt x="4355918" y="3834041"/>
+                </a:lnTo>
+                <a:lnTo>
+                  <a:pt x="4343529" y="4053789"/>
+                </a:lnTo>
+                <a:lnTo>
+                  <a:pt x="4330356" y="4264457"/>
+                </a:lnTo>
+                <a:lnTo>
+                  <a:pt x="4316556" y="4466650"/>
+                </a:lnTo>
+                <a:lnTo>
+                  <a:pt x="4301344" y="4657946"/>
+                </a:lnTo>
+                <a:lnTo>
+                  <a:pt x="4285506" y="4840767"/>
+                </a:lnTo>
+                <a:lnTo>
+                  <a:pt x="4268412" y="5010269"/>
+                </a:lnTo>
+                <a:lnTo>
+                  <a:pt x="4251633" y="5169481"/>
+                </a:lnTo>
+                <a:lnTo>
+                  <a:pt x="4234853" y="5315980"/>
+                </a:lnTo>
+                <a:lnTo>
+                  <a:pt x="4219014" y="5450371"/>
+                </a:lnTo>
+                <a:lnTo>
+                  <a:pt x="4203959" y="5569628"/>
+                </a:lnTo>
+                <a:lnTo>
+                  <a:pt x="4189689" y="5677384"/>
+                </a:lnTo>
+                <a:lnTo>
+                  <a:pt x="4177770" y="5768189"/>
+                </a:lnTo>
+                <a:lnTo>
+                  <a:pt x="4166479" y="5844465"/>
+                </a:lnTo>
+                <a:lnTo>
+                  <a:pt x="4159132" y="5892104"/>
+                </a:lnTo>
+                <a:lnTo>
+                  <a:pt x="0" y="5892104"/>
+                </a:lnTo>
+                <a:close/>
+              </a:path>
+            </a:pathLst>
+          </a:custGeom>
+          <a:solidFill>
+            <a:srgbClr val="404040"/>
+          </a:solidFill>
+          <a:ln>
+            <a:noFill/>
+          </a:ln>
+        </p:spPr>
+        <p:style>
+          <a:lnRef idx="2">
+            <a:schemeClr val="accent1">
+              <a:shade val="50000"/>
+            </a:schemeClr>
+          </a:lnRef>
+          <a:fillRef idx="1">
+            <a:schemeClr val="accent1"/>
+          </a:fillRef>
+          <a:effectRef idx="0">
+            <a:schemeClr val="accent1"/>
+          </a:effectRef>
+          <a:fontRef idx="minor">
+            <a:schemeClr val="lt1"/>
+          </a:fontRef>
+        </p:style>
+        <p:txBody>
+          <a:bodyPr wrap="square" rtlCol="0" anchor="ctr">
+            <a:noAutofit/>
+          </a:bodyPr>
+          <a:lstStyle/>
+          <a:p>
+            <a:pPr marL="0" marR="0" lvl="0" indent="0" algn="ctr" defTabSz="457200" rtl="0" eaLnBrk="1" fontAlgn="auto" latinLnBrk="0" hangingPunct="1">
+              <a:lnSpc>
+                <a:spcPct val="100000"/>
+              </a:lnSpc>
+              <a:spcBef>
+                <a:spcPts val="0"/>
+              </a:spcBef>
+              <a:spcAft>
+                <a:spcPts val="0"/>
+              </a:spcAft>
+              <a:buClrTx/>
+              <a:buSzTx/>
+              <a:buFontTx/>
+              <a:buNone/>
+              <a:tabLst/>
+              <a:defRPr/>
+            </a:pPr>
+            <a:endParaRPr kumimoji="0" lang="en-US" sz="1800" b="0" i="0" u="none" strike="noStrike" kern="1200" cap="none" spc="0" normalizeH="0" baseline="0" noProof="0">
+              <a:ln>
+                <a:noFill/>
+              </a:ln>
+              <a:solidFill>
+                <a:prstClr val="white"/>
+              </a:solidFill>
+              <a:effectLst/>
+              <a:uLnTx/>
+              <a:uFillTx/>
+              <a:latin typeface="Calibri" panose="020F0502020204030204"/>
+              <a:ea typeface="+mn-ea"/>
+              <a:cs typeface="+mn-cs"/>
+            </a:endParaRPr>
+          </a:p>
+        </p:txBody>
+      </p:sp>
+      <p:sp>
+        <p:nvSpPr>
+          <p:cNvPr id="2" name="Title 1">
+            <a:extLst>
+              <a:ext uri="{FF2B5EF4-FFF2-40B4-BE49-F238E27FC236}">
+                <a16:creationId xmlns:a16="http://schemas.microsoft.com/office/drawing/2014/main" id="{9A3DC6D6-33D7-4510-A16D-3BCE52C54008}"/>
+              </a:ext>
+            </a:extLst>
+          </p:cNvPr>
+          <p:cNvSpPr>
+            <a:spLocks noGrp="1"/>
+          </p:cNvSpPr>
+          <p:nvPr>
+            <p:ph type="title"/>
+          </p:nvPr>
+        </p:nvSpPr>
+        <p:spPr>
+          <a:xfrm>
+            <a:off x="863028" y="1012004"/>
+            <a:ext cx="3613721" cy="4795408"/>
+          </a:xfrm>
+        </p:spPr>
+        <p:txBody>
+          <a:bodyPr>
+            <a:normAutofit/>
+          </a:bodyPr>
+          <a:lstStyle/>
+          <a:p>
+            <a:r>
+              <a:rPr lang="en-US" sz="3200" dirty="0">
+                <a:solidFill>
+                  <a:srgbClr val="FFFFFF"/>
+                </a:solidFill>
+              </a:rPr>
+              <a:t>software architecture</a:t>
+            </a:r>
+            <a:endParaRPr lang="pt-PT" sz="3200" dirty="0">
+              <a:solidFill>
+                <a:srgbClr val="FFFFFF"/>
+              </a:solidFill>
+            </a:endParaRPr>
+          </a:p>
+        </p:txBody>
+      </p:sp>
+      <p:graphicFrame>
+        <p:nvGraphicFramePr>
+          <p:cNvPr id="5" name="Content Placeholder 2">
+            <a:extLst>
+              <a:ext uri="{FF2B5EF4-FFF2-40B4-BE49-F238E27FC236}">
+                <a16:creationId xmlns:a16="http://schemas.microsoft.com/office/drawing/2014/main" id="{97686B0B-22F0-4907-9C4D-17825D02DB50}"/>
+              </a:ext>
+            </a:extLst>
+          </p:cNvPr>
+          <p:cNvGraphicFramePr>
+            <a:graphicFrameLocks noGrp="1"/>
+          </p:cNvGraphicFramePr>
+          <p:nvPr>
+            <p:ph idx="1"/>
+            <p:extLst>
+              <p:ext uri="{D42A27DB-BD31-4B8C-83A1-F6EECF244321}">
+                <p14:modId xmlns:p14="http://schemas.microsoft.com/office/powerpoint/2010/main" val="1371431277"/>
+              </p:ext>
+            </p:extLst>
+          </p:nvPr>
+        </p:nvGraphicFramePr>
+        <p:xfrm>
+          <a:off x="5194300" y="470924"/>
+          <a:ext cx="6513604" cy="5885426"/>
+        </p:xfrm>
+        <a:graphic>
+          <a:graphicData uri="http://schemas.openxmlformats.org/drawingml/2006/diagram">
+            <dgm:relIds xmlns:dgm="http://schemas.openxmlformats.org/drawingml/2006/diagram" xmlns:r="http://schemas.openxmlformats.org/officeDocument/2006/relationships" r:dm="rId2" r:lo="rId3" r:qs="rId4" r:cs="rId5"/>
+          </a:graphicData>
+        </a:graphic>
+      </p:graphicFrame>
+    </p:spTree>
+    <p:extLst>
+      <p:ext uri="{BB962C8B-B14F-4D97-AF65-F5344CB8AC3E}">
+        <p14:creationId xmlns:p14="http://schemas.microsoft.com/office/powerpoint/2010/main" val="1204732157"/>
+      </p:ext>
+    </p:extLst>
+  </p:cSld>
+  <p:clrMapOvr>
+    <a:masterClrMapping/>
+  </p:clrMapOvr>
+</p:sld>
+</file>
+
 <file path=ppt/theme/theme1.xml><?xml version="1.0" encoding="utf-8"?>
 <a:theme xmlns:a="http://schemas.openxmlformats.org/drawingml/2006/main" name="Office Theme">
   <a:themeElements>

</xml_diff>